<commit_message>
Presentation updates by Roger
</commit_message>
<xml_diff>
--- a/Week_12/ML_model.pptx
+++ b/Week_12/ML_model.pptx
@@ -5,7 +5,7 @@
     <p:sldMasterId id="2147483684" r:id="rId1"/>
   </p:sldMasterIdLst>
   <p:notesMasterIdLst>
-    <p:notesMasterId r:id="rId9"/>
+    <p:notesMasterId r:id="rId12"/>
   </p:notesMasterIdLst>
   <p:sldIdLst>
     <p:sldId id="256" r:id="rId2"/>
@@ -14,7 +14,10 @@
     <p:sldId id="272" r:id="rId5"/>
     <p:sldId id="274" r:id="rId6"/>
     <p:sldId id="273" r:id="rId7"/>
-    <p:sldId id="268" r:id="rId8"/>
+    <p:sldId id="275" r:id="rId8"/>
+    <p:sldId id="276" r:id="rId9"/>
+    <p:sldId id="277" r:id="rId10"/>
+    <p:sldId id="268" r:id="rId11"/>
   </p:sldIdLst>
   <p:sldSz cx="12192000" cy="6858000"/>
   <p:notesSz cx="6858000" cy="9144000"/>
@@ -124,13 +127,298 @@
 <file path=ppt/revisionInfo.xml><?xml version="1.0" encoding="utf-8"?>
 <p1510:revInfo xmlns:a="http://schemas.openxmlformats.org/drawingml/2006/main" xmlns:r="http://schemas.openxmlformats.org/officeDocument/2006/relationships" xmlns:p1510="http://schemas.microsoft.com/office/powerpoint/2015/10/main">
   <p1510:revLst>
-    <p1510:client id="{1F239C82-AFC1-45CC-A017-1A691C60E705}" v="28" dt="2021-05-04T13:17:37.774"/>
+    <p1510:client id="{9B8180F1-73D3-4CC1-B735-808662D4AF27}" v="19" dt="2021-05-09T23:09:42.512"/>
   </p1510:revLst>
 </p1510:revInfo>
 </file>
 
 <file path=ppt/changesInfos/changesInfo1.xml><?xml version="1.0" encoding="utf-8"?>
 <pc:chgInfo xmlns:a="http://schemas.openxmlformats.org/drawingml/2006/main" xmlns:r="http://schemas.openxmlformats.org/officeDocument/2006/relationships" xmlns:ac="http://schemas.microsoft.com/office/drawing/2013/main/command" xmlns:pc="http://schemas.microsoft.com/office/powerpoint/2013/main/command">
+  <pc:docChgLst>
+    <pc:chgData name="Roger Burek-Bors" userId="52318fc02a824a34" providerId="LiveId" clId="{9B8180F1-73D3-4CC1-B735-808662D4AF27}"/>
+    <pc:docChg chg="undo custSel addSld modSld">
+      <pc:chgData name="Roger Burek-Bors" userId="52318fc02a824a34" providerId="LiveId" clId="{9B8180F1-73D3-4CC1-B735-808662D4AF27}" dt="2021-05-09T23:09:42.511" v="101" actId="1076"/>
+      <pc:docMkLst>
+        <pc:docMk/>
+      </pc:docMkLst>
+      <pc:sldChg chg="modSp mod">
+        <pc:chgData name="Roger Burek-Bors" userId="52318fc02a824a34" providerId="LiveId" clId="{9B8180F1-73D3-4CC1-B735-808662D4AF27}" dt="2021-05-09T22:58:23.261" v="61" actId="115"/>
+        <pc:sldMkLst>
+          <pc:docMk/>
+          <pc:sldMk cId="1899016330" sldId="269"/>
+        </pc:sldMkLst>
+        <pc:spChg chg="mod">
+          <ac:chgData name="Roger Burek-Bors" userId="52318fc02a824a34" providerId="LiveId" clId="{9B8180F1-73D3-4CC1-B735-808662D4AF27}" dt="2021-05-09T22:58:23.261" v="61" actId="115"/>
+          <ac:spMkLst>
+            <pc:docMk/>
+            <pc:sldMk cId="1899016330" sldId="269"/>
+            <ac:spMk id="3" creationId="{CDC6F948-2F33-47A0-AE55-62E355ACC532}"/>
+          </ac:spMkLst>
+        </pc:spChg>
+      </pc:sldChg>
+      <pc:sldChg chg="addSp delSp modSp add mod">
+        <pc:chgData name="Roger Burek-Bors" userId="52318fc02a824a34" providerId="LiveId" clId="{9B8180F1-73D3-4CC1-B735-808662D4AF27}" dt="2021-05-09T22:55:44.032" v="56" actId="13822"/>
+        <pc:sldMkLst>
+          <pc:docMk/>
+          <pc:sldMk cId="4073393256" sldId="275"/>
+        </pc:sldMkLst>
+        <pc:spChg chg="add del mod">
+          <ac:chgData name="Roger Burek-Bors" userId="52318fc02a824a34" providerId="LiveId" clId="{9B8180F1-73D3-4CC1-B735-808662D4AF27}" dt="2021-05-09T22:35:38.006" v="7" actId="478"/>
+          <ac:spMkLst>
+            <pc:docMk/>
+            <pc:sldMk cId="4073393256" sldId="275"/>
+            <ac:spMk id="3" creationId="{60DD795A-5393-4E1A-8076-C0A3E3DF60CB}"/>
+          </ac:spMkLst>
+        </pc:spChg>
+        <pc:spChg chg="mod">
+          <ac:chgData name="Roger Burek-Bors" userId="52318fc02a824a34" providerId="LiveId" clId="{9B8180F1-73D3-4CC1-B735-808662D4AF27}" dt="2021-05-09T22:28:46.245" v="4" actId="20577"/>
+          <ac:spMkLst>
+            <pc:docMk/>
+            <pc:sldMk cId="4073393256" sldId="275"/>
+            <ac:spMk id="4" creationId="{F0FEE1CD-BF08-48FA-8526-5BEB92660675}"/>
+          </ac:spMkLst>
+        </pc:spChg>
+        <pc:spChg chg="add mod">
+          <ac:chgData name="Roger Burek-Bors" userId="52318fc02a824a34" providerId="LiveId" clId="{9B8180F1-73D3-4CC1-B735-808662D4AF27}" dt="2021-05-09T22:44:10.598" v="21" actId="1076"/>
+          <ac:spMkLst>
+            <pc:docMk/>
+            <pc:sldMk cId="4073393256" sldId="275"/>
+            <ac:spMk id="7" creationId="{84633142-0C34-4246-A6E5-FB457C75BE20}"/>
+          </ac:spMkLst>
+        </pc:spChg>
+        <pc:spChg chg="add mod">
+          <ac:chgData name="Roger Burek-Bors" userId="52318fc02a824a34" providerId="LiveId" clId="{9B8180F1-73D3-4CC1-B735-808662D4AF27}" dt="2021-05-09T22:49:52.594" v="48" actId="1076"/>
+          <ac:spMkLst>
+            <pc:docMk/>
+            <pc:sldMk cId="4073393256" sldId="275"/>
+            <ac:spMk id="8" creationId="{A5ACEE68-3626-4430-878A-B677A5B22862}"/>
+          </ac:spMkLst>
+        </pc:spChg>
+        <pc:spChg chg="add del">
+          <ac:chgData name="Roger Burek-Bors" userId="52318fc02a824a34" providerId="LiveId" clId="{9B8180F1-73D3-4CC1-B735-808662D4AF27}" dt="2021-05-09T22:48:16.088" v="31"/>
+          <ac:spMkLst>
+            <pc:docMk/>
+            <pc:sldMk cId="4073393256" sldId="275"/>
+            <ac:spMk id="10" creationId="{9A53A96C-6715-4A11-BC9A-DC9300CB1E33}"/>
+          </ac:spMkLst>
+        </pc:spChg>
+        <pc:picChg chg="add del">
+          <ac:chgData name="Roger Burek-Bors" userId="52318fc02a824a34" providerId="LiveId" clId="{9B8180F1-73D3-4CC1-B735-808662D4AF27}" dt="2021-05-09T22:35:59.193" v="11"/>
+          <ac:picMkLst>
+            <pc:docMk/>
+            <pc:sldMk cId="4073393256" sldId="275"/>
+            <ac:picMk id="5" creationId="{F02EEAC9-DC32-4AD6-AB57-90E72E476DDF}"/>
+          </ac:picMkLst>
+        </pc:picChg>
+        <pc:picChg chg="add del">
+          <ac:chgData name="Roger Burek-Bors" userId="52318fc02a824a34" providerId="LiveId" clId="{9B8180F1-73D3-4CC1-B735-808662D4AF27}" dt="2021-05-09T22:39:00.598" v="13"/>
+          <ac:picMkLst>
+            <pc:docMk/>
+            <pc:sldMk cId="4073393256" sldId="275"/>
+            <ac:picMk id="6" creationId="{84608738-B649-44CC-96CF-C14D9DFE8331}"/>
+          </ac:picMkLst>
+        </pc:picChg>
+        <pc:picChg chg="del">
+          <ac:chgData name="Roger Burek-Bors" userId="52318fc02a824a34" providerId="LiveId" clId="{9B8180F1-73D3-4CC1-B735-808662D4AF27}" dt="2021-05-09T22:35:34.826" v="5" actId="478"/>
+          <ac:picMkLst>
+            <pc:docMk/>
+            <pc:sldMk cId="4073393256" sldId="275"/>
+            <ac:picMk id="9" creationId="{6361E66F-B716-4127-9D97-D893A4AD5022}"/>
+          </ac:picMkLst>
+        </pc:picChg>
+        <pc:picChg chg="add mod">
+          <ac:chgData name="Roger Burek-Bors" userId="52318fc02a824a34" providerId="LiveId" clId="{9B8180F1-73D3-4CC1-B735-808662D4AF27}" dt="2021-05-09T22:55:11.083" v="53" actId="1076"/>
+          <ac:picMkLst>
+            <pc:docMk/>
+            <pc:sldMk cId="4073393256" sldId="275"/>
+            <ac:picMk id="12" creationId="{8811EF0E-EAD5-4150-9212-06C917D325D2}"/>
+          </ac:picMkLst>
+        </pc:picChg>
+        <pc:picChg chg="add mod">
+          <ac:chgData name="Roger Burek-Bors" userId="52318fc02a824a34" providerId="LiveId" clId="{9B8180F1-73D3-4CC1-B735-808662D4AF27}" dt="2021-05-09T22:55:07.870" v="52" actId="1076"/>
+          <ac:picMkLst>
+            <pc:docMk/>
+            <pc:sldMk cId="4073393256" sldId="275"/>
+            <ac:picMk id="14" creationId="{C190F1C2-2BCE-4E4A-B9BB-4170D4565660}"/>
+          </ac:picMkLst>
+        </pc:picChg>
+        <pc:picChg chg="del">
+          <ac:chgData name="Roger Burek-Bors" userId="52318fc02a824a34" providerId="LiveId" clId="{9B8180F1-73D3-4CC1-B735-808662D4AF27}" dt="2021-05-09T22:35:36.551" v="6" actId="478"/>
+          <ac:picMkLst>
+            <pc:docMk/>
+            <pc:sldMk cId="4073393256" sldId="275"/>
+            <ac:picMk id="15" creationId="{4F01EC7C-C3D0-45B5-942C-D133F90C7ACB}"/>
+          </ac:picMkLst>
+        </pc:picChg>
+        <pc:picChg chg="add mod">
+          <ac:chgData name="Roger Burek-Bors" userId="52318fc02a824a34" providerId="LiveId" clId="{9B8180F1-73D3-4CC1-B735-808662D4AF27}" dt="2021-05-09T22:39:19.129" v="16" actId="1076"/>
+          <ac:picMkLst>
+            <pc:docMk/>
+            <pc:sldMk cId="4073393256" sldId="275"/>
+            <ac:picMk id="1026" creationId="{7A4F59AF-9517-4EF3-95EE-82F113A2E533}"/>
+          </ac:picMkLst>
+        </pc:picChg>
+        <pc:cxnChg chg="add mod">
+          <ac:chgData name="Roger Burek-Bors" userId="52318fc02a824a34" providerId="LiveId" clId="{9B8180F1-73D3-4CC1-B735-808662D4AF27}" dt="2021-05-09T22:55:44.032" v="56" actId="13822"/>
+          <ac:cxnSpMkLst>
+            <pc:docMk/>
+            <pc:sldMk cId="4073393256" sldId="275"/>
+            <ac:cxnSpMk id="17" creationId="{EE7F8E62-2286-4B13-A3BB-D666F7C9BB1E}"/>
+          </ac:cxnSpMkLst>
+        </pc:cxnChg>
+        <pc:cxnChg chg="add mod">
+          <ac:chgData name="Roger Burek-Bors" userId="52318fc02a824a34" providerId="LiveId" clId="{9B8180F1-73D3-4CC1-B735-808662D4AF27}" dt="2021-05-09T22:55:44.032" v="56" actId="13822"/>
+          <ac:cxnSpMkLst>
+            <pc:docMk/>
+            <pc:sldMk cId="4073393256" sldId="275"/>
+            <ac:cxnSpMk id="19" creationId="{17DF3BEB-D38A-4733-99A8-FE0A1B83E937}"/>
+          </ac:cxnSpMkLst>
+        </pc:cxnChg>
+      </pc:sldChg>
+      <pc:sldChg chg="addSp delSp modSp add mod">
+        <pc:chgData name="Roger Burek-Bors" userId="52318fc02a824a34" providerId="LiveId" clId="{9B8180F1-73D3-4CC1-B735-808662D4AF27}" dt="2021-05-09T23:01:45.197" v="75" actId="1076"/>
+        <pc:sldMkLst>
+          <pc:docMk/>
+          <pc:sldMk cId="3328903446" sldId="276"/>
+        </pc:sldMkLst>
+        <pc:spChg chg="del">
+          <ac:chgData name="Roger Burek-Bors" userId="52318fc02a824a34" providerId="LiveId" clId="{9B8180F1-73D3-4CC1-B735-808662D4AF27}" dt="2021-05-09T22:57:54.548" v="59" actId="478"/>
+          <ac:spMkLst>
+            <pc:docMk/>
+            <pc:sldMk cId="3328903446" sldId="276"/>
+            <ac:spMk id="7" creationId="{84633142-0C34-4246-A6E5-FB457C75BE20}"/>
+          </ac:spMkLst>
+        </pc:spChg>
+        <pc:spChg chg="del">
+          <ac:chgData name="Roger Burek-Bors" userId="52318fc02a824a34" providerId="LiveId" clId="{9B8180F1-73D3-4CC1-B735-808662D4AF27}" dt="2021-05-09T22:57:54.548" v="59" actId="478"/>
+          <ac:spMkLst>
+            <pc:docMk/>
+            <pc:sldMk cId="3328903446" sldId="276"/>
+            <ac:spMk id="8" creationId="{A5ACEE68-3626-4430-878A-B677A5B22862}"/>
+          </ac:spMkLst>
+        </pc:spChg>
+        <pc:spChg chg="add del">
+          <ac:chgData name="Roger Burek-Bors" userId="52318fc02a824a34" providerId="LiveId" clId="{9B8180F1-73D3-4CC1-B735-808662D4AF27}" dt="2021-05-09T22:59:32.413" v="63" actId="22"/>
+          <ac:spMkLst>
+            <pc:docMk/>
+            <pc:sldMk cId="3328903446" sldId="276"/>
+            <ac:spMk id="11" creationId="{00F50B0A-DEE4-4C89-AB88-DFE773CB76B0}"/>
+          </ac:spMkLst>
+        </pc:spChg>
+        <pc:spChg chg="add mod">
+          <ac:chgData name="Roger Burek-Bors" userId="52318fc02a824a34" providerId="LiveId" clId="{9B8180F1-73D3-4CC1-B735-808662D4AF27}" dt="2021-05-09T23:01:45.197" v="75" actId="1076"/>
+          <ac:spMkLst>
+            <pc:docMk/>
+            <pc:sldMk cId="3328903446" sldId="276"/>
+            <ac:spMk id="13" creationId="{32C7B46D-C3CE-42B5-B2B1-74F5BB5C628D}"/>
+          </ac:spMkLst>
+        </pc:spChg>
+        <pc:picChg chg="del">
+          <ac:chgData name="Roger Burek-Bors" userId="52318fc02a824a34" providerId="LiveId" clId="{9B8180F1-73D3-4CC1-B735-808662D4AF27}" dt="2021-05-09T22:57:54.548" v="59" actId="478"/>
+          <ac:picMkLst>
+            <pc:docMk/>
+            <pc:sldMk cId="3328903446" sldId="276"/>
+            <ac:picMk id="12" creationId="{8811EF0E-EAD5-4150-9212-06C917D325D2}"/>
+          </ac:picMkLst>
+        </pc:picChg>
+        <pc:picChg chg="del">
+          <ac:chgData name="Roger Burek-Bors" userId="52318fc02a824a34" providerId="LiveId" clId="{9B8180F1-73D3-4CC1-B735-808662D4AF27}" dt="2021-05-09T22:57:54.548" v="59" actId="478"/>
+          <ac:picMkLst>
+            <pc:docMk/>
+            <pc:sldMk cId="3328903446" sldId="276"/>
+            <ac:picMk id="14" creationId="{C190F1C2-2BCE-4E4A-B9BB-4170D4565660}"/>
+          </ac:picMkLst>
+        </pc:picChg>
+        <pc:picChg chg="del">
+          <ac:chgData name="Roger Burek-Bors" userId="52318fc02a824a34" providerId="LiveId" clId="{9B8180F1-73D3-4CC1-B735-808662D4AF27}" dt="2021-05-09T22:57:52.449" v="58" actId="478"/>
+          <ac:picMkLst>
+            <pc:docMk/>
+            <pc:sldMk cId="3328903446" sldId="276"/>
+            <ac:picMk id="1026" creationId="{7A4F59AF-9517-4EF3-95EE-82F113A2E533}"/>
+          </ac:picMkLst>
+        </pc:picChg>
+        <pc:cxnChg chg="del mod">
+          <ac:chgData name="Roger Burek-Bors" userId="52318fc02a824a34" providerId="LiveId" clId="{9B8180F1-73D3-4CC1-B735-808662D4AF27}" dt="2021-05-09T22:57:54.548" v="59" actId="478"/>
+          <ac:cxnSpMkLst>
+            <pc:docMk/>
+            <pc:sldMk cId="3328903446" sldId="276"/>
+            <ac:cxnSpMk id="17" creationId="{EE7F8E62-2286-4B13-A3BB-D666F7C9BB1E}"/>
+          </ac:cxnSpMkLst>
+        </pc:cxnChg>
+        <pc:cxnChg chg="del mod">
+          <ac:chgData name="Roger Burek-Bors" userId="52318fc02a824a34" providerId="LiveId" clId="{9B8180F1-73D3-4CC1-B735-808662D4AF27}" dt="2021-05-09T22:57:54.548" v="59" actId="478"/>
+          <ac:cxnSpMkLst>
+            <pc:docMk/>
+            <pc:sldMk cId="3328903446" sldId="276"/>
+            <ac:cxnSpMk id="19" creationId="{17DF3BEB-D38A-4733-99A8-FE0A1B83E937}"/>
+          </ac:cxnSpMkLst>
+        </pc:cxnChg>
+      </pc:sldChg>
+      <pc:sldChg chg="addSp delSp modSp add mod">
+        <pc:chgData name="Roger Burek-Bors" userId="52318fc02a824a34" providerId="LiveId" clId="{9B8180F1-73D3-4CC1-B735-808662D4AF27}" dt="2021-05-09T23:09:42.511" v="101" actId="1076"/>
+        <pc:sldMkLst>
+          <pc:docMk/>
+          <pc:sldMk cId="3527806478" sldId="277"/>
+        </pc:sldMkLst>
+        <pc:spChg chg="mod">
+          <ac:chgData name="Roger Burek-Bors" userId="52318fc02a824a34" providerId="LiveId" clId="{9B8180F1-73D3-4CC1-B735-808662D4AF27}" dt="2021-05-09T23:04:30.907" v="83" actId="20577"/>
+          <ac:spMkLst>
+            <pc:docMk/>
+            <pc:sldMk cId="3527806478" sldId="277"/>
+            <ac:spMk id="4" creationId="{F0FEE1CD-BF08-48FA-8526-5BEB92660675}"/>
+          </ac:spMkLst>
+        </pc:spChg>
+        <pc:spChg chg="add del">
+          <ac:chgData name="Roger Burek-Bors" userId="52318fc02a824a34" providerId="LiveId" clId="{9B8180F1-73D3-4CC1-B735-808662D4AF27}" dt="2021-05-09T23:08:39.439" v="92" actId="22"/>
+          <ac:spMkLst>
+            <pc:docMk/>
+            <pc:sldMk cId="3527806478" sldId="277"/>
+            <ac:spMk id="10" creationId="{2ADDEAD8-BB4C-48D3-B578-E253EDEE1280}"/>
+          </ac:spMkLst>
+        </pc:spChg>
+        <pc:spChg chg="del">
+          <ac:chgData name="Roger Burek-Bors" userId="52318fc02a824a34" providerId="LiveId" clId="{9B8180F1-73D3-4CC1-B735-808662D4AF27}" dt="2021-05-09T23:06:40.434" v="84" actId="478"/>
+          <ac:spMkLst>
+            <pc:docMk/>
+            <pc:sldMk cId="3527806478" sldId="277"/>
+            <ac:spMk id="13" creationId="{32C7B46D-C3CE-42B5-B2B1-74F5BB5C628D}"/>
+          </ac:spMkLst>
+        </pc:spChg>
+        <pc:picChg chg="add mod">
+          <ac:chgData name="Roger Burek-Bors" userId="52318fc02a824a34" providerId="LiveId" clId="{9B8180F1-73D3-4CC1-B735-808662D4AF27}" dt="2021-05-09T23:09:42.511" v="101" actId="1076"/>
+          <ac:picMkLst>
+            <pc:docMk/>
+            <pc:sldMk cId="3527806478" sldId="277"/>
+            <ac:picMk id="3" creationId="{EE5819C0-DC31-45ED-8BAD-7F483C0C9544}"/>
+          </ac:picMkLst>
+        </pc:picChg>
+        <pc:picChg chg="add mod">
+          <ac:chgData name="Roger Burek-Bors" userId="52318fc02a824a34" providerId="LiveId" clId="{9B8180F1-73D3-4CC1-B735-808662D4AF27}" dt="2021-05-09T23:09:42.511" v="101" actId="1076"/>
+          <ac:picMkLst>
+            <pc:docMk/>
+            <pc:sldMk cId="3527806478" sldId="277"/>
+            <ac:picMk id="6" creationId="{AD89079A-877A-48AF-A317-E74147F52C39}"/>
+          </ac:picMkLst>
+        </pc:picChg>
+        <pc:picChg chg="add mod">
+          <ac:chgData name="Roger Burek-Bors" userId="52318fc02a824a34" providerId="LiveId" clId="{9B8180F1-73D3-4CC1-B735-808662D4AF27}" dt="2021-05-09T23:09:42.511" v="101" actId="1076"/>
+          <ac:picMkLst>
+            <pc:docMk/>
+            <pc:sldMk cId="3527806478" sldId="277"/>
+            <ac:picMk id="9" creationId="{BB4D2EE0-ED84-42A1-8B0B-A8896ACC10AB}"/>
+          </ac:picMkLst>
+        </pc:picChg>
+        <pc:picChg chg="add mod">
+          <ac:chgData name="Roger Burek-Bors" userId="52318fc02a824a34" providerId="LiveId" clId="{9B8180F1-73D3-4CC1-B735-808662D4AF27}" dt="2021-05-09T23:09:42.511" v="101" actId="1076"/>
+          <ac:picMkLst>
+            <pc:docMk/>
+            <pc:sldMk cId="3527806478" sldId="277"/>
+            <ac:picMk id="2050" creationId="{DE5DEEC8-78C9-4F82-9BCE-54E75BF5C4B9}"/>
+          </ac:picMkLst>
+        </pc:picChg>
+      </pc:sldChg>
+    </pc:docChg>
+  </pc:docChgLst>
   <pc:docChgLst>
     <pc:chgData name="Roger Burek-Bors" userId="52318fc02a824a34" providerId="LiveId" clId="{6F86E068-8AAC-44F8-AFA9-D35EEACD5653}"/>
     <pc:docChg chg="undo custSel modSld">
@@ -1751,7 +2039,7 @@
           <a:p>
             <a:fld id="{2BDA1FB4-8E38-4CEB-9ECB-65C04D5EAEF4}" type="datetimeFigureOut">
               <a:rPr lang="en-US" smtClean="0"/>
-              <a:t>5/9/2021</a:t>
+              <a:t>5/10/2021</a:t>
             </a:fld>
             <a:endParaRPr lang="en-US"/>
           </a:p>
@@ -2150,7 +2438,7 @@
           <a:p>
             <a:fld id="{C764DE79-268F-4C1A-8933-263129D2AF90}" type="datetimeFigureOut">
               <a:rPr lang="en-US" dirty="0"/>
-              <a:t>5/9/2021</a:t>
+              <a:t>5/10/2021</a:t>
             </a:fld>
             <a:endParaRPr lang="en-US"/>
           </a:p>
@@ -2320,7 +2608,7 @@
           <a:p>
             <a:fld id="{C764DE79-268F-4C1A-8933-263129D2AF90}" type="datetimeFigureOut">
               <a:rPr lang="en-US" dirty="0"/>
-              <a:t>5/9/2021</a:t>
+              <a:t>5/10/2021</a:t>
             </a:fld>
             <a:endParaRPr lang="en-US"/>
           </a:p>
@@ -2500,7 +2788,7 @@
           <a:p>
             <a:fld id="{C764DE79-268F-4C1A-8933-263129D2AF90}" type="datetimeFigureOut">
               <a:rPr lang="en-US" dirty="0"/>
-              <a:t>5/9/2021</a:t>
+              <a:t>5/10/2021</a:t>
             </a:fld>
             <a:endParaRPr lang="en-US"/>
           </a:p>
@@ -2670,7 +2958,7 @@
           <a:p>
             <a:fld id="{C764DE79-268F-4C1A-8933-263129D2AF90}" type="datetimeFigureOut">
               <a:rPr lang="en-US" dirty="0"/>
-              <a:t>5/9/2021</a:t>
+              <a:t>5/10/2021</a:t>
             </a:fld>
             <a:endParaRPr lang="en-US"/>
           </a:p>
@@ -2916,7 +3204,7 @@
           <a:p>
             <a:fld id="{C764DE79-268F-4C1A-8933-263129D2AF90}" type="datetimeFigureOut">
               <a:rPr lang="en-US" dirty="0"/>
-              <a:t>5/9/2021</a:t>
+              <a:t>5/10/2021</a:t>
             </a:fld>
             <a:endParaRPr lang="en-US"/>
           </a:p>
@@ -3148,7 +3436,7 @@
           <a:p>
             <a:fld id="{C764DE79-268F-4C1A-8933-263129D2AF90}" type="datetimeFigureOut">
               <a:rPr lang="en-US" dirty="0"/>
-              <a:t>5/9/2021</a:t>
+              <a:t>5/10/2021</a:t>
             </a:fld>
             <a:endParaRPr lang="en-US"/>
           </a:p>
@@ -3515,7 +3803,7 @@
           <a:p>
             <a:fld id="{C764DE79-268F-4C1A-8933-263129D2AF90}" type="datetimeFigureOut">
               <a:rPr lang="en-US" dirty="0"/>
-              <a:t>5/9/2021</a:t>
+              <a:t>5/10/2021</a:t>
             </a:fld>
             <a:endParaRPr lang="en-US"/>
           </a:p>
@@ -3633,7 +3921,7 @@
           <a:p>
             <a:fld id="{C764DE79-268F-4C1A-8933-263129D2AF90}" type="datetimeFigureOut">
               <a:rPr lang="en-US" dirty="0"/>
-              <a:t>5/9/2021</a:t>
+              <a:t>5/10/2021</a:t>
             </a:fld>
             <a:endParaRPr lang="en-US"/>
           </a:p>
@@ -3728,7 +4016,7 @@
           <a:p>
             <a:fld id="{C764DE79-268F-4C1A-8933-263129D2AF90}" type="datetimeFigureOut">
               <a:rPr lang="en-US" dirty="0"/>
-              <a:t>5/9/2021</a:t>
+              <a:t>5/10/2021</a:t>
             </a:fld>
             <a:endParaRPr lang="en-US"/>
           </a:p>
@@ -4005,7 +4293,7 @@
           <a:p>
             <a:fld id="{C764DE79-268F-4C1A-8933-263129D2AF90}" type="datetimeFigureOut">
               <a:rPr lang="en-US" dirty="0"/>
-              <a:t>5/9/2021</a:t>
+              <a:t>5/10/2021</a:t>
             </a:fld>
             <a:endParaRPr lang="en-US"/>
           </a:p>
@@ -4262,7 +4550,7 @@
           <a:p>
             <a:fld id="{C764DE79-268F-4C1A-8933-263129D2AF90}" type="datetimeFigureOut">
               <a:rPr lang="en-US" dirty="0"/>
-              <a:t>5/9/2021</a:t>
+              <a:t>5/10/2021</a:t>
             </a:fld>
             <a:endParaRPr lang="en-US"/>
           </a:p>
@@ -4475,7 +4763,7 @@
           <a:p>
             <a:fld id="{C764DE79-268F-4C1A-8933-263129D2AF90}" type="datetimeFigureOut">
               <a:rPr lang="en-US" dirty="0"/>
-              <a:t>5/9/2021</a:t>
+              <a:t>5/10/2021</a:t>
             </a:fld>
             <a:endParaRPr lang="en-US"/>
           </a:p>
@@ -5055,6 +5343,155 @@
 </p:sld>
 </file>
 
+<file path=ppt/slides/slide10.xml><?xml version="1.0" encoding="utf-8"?>
+<p:sld xmlns:a="http://schemas.openxmlformats.org/drawingml/2006/main" xmlns:r="http://schemas.openxmlformats.org/officeDocument/2006/relationships" xmlns:p="http://schemas.openxmlformats.org/presentationml/2006/main">
+  <p:cSld>
+    <p:spTree>
+      <p:nvGrpSpPr>
+        <p:cNvPr id="1" name=""/>
+        <p:cNvGrpSpPr/>
+        <p:nvPr/>
+      </p:nvGrpSpPr>
+      <p:grpSpPr>
+        <a:xfrm>
+          <a:off x="0" y="0"/>
+          <a:ext cx="0" cy="0"/>
+          <a:chOff x="0" y="0"/>
+          <a:chExt cx="0" cy="0"/>
+        </a:xfrm>
+      </p:grpSpPr>
+      <p:sp>
+        <p:nvSpPr>
+          <p:cNvPr id="2" name="Title 1">
+            <a:extLst>
+              <a:ext uri="{FF2B5EF4-FFF2-40B4-BE49-F238E27FC236}">
+                <a16:creationId xmlns:a16="http://schemas.microsoft.com/office/drawing/2014/main" id="{E8B8F26E-9345-4747-9094-972E38700A17}"/>
+              </a:ext>
+            </a:extLst>
+          </p:cNvPr>
+          <p:cNvSpPr>
+            <a:spLocks noGrp="1"/>
+          </p:cNvSpPr>
+          <p:nvPr>
+            <p:ph type="ctrTitle"/>
+          </p:nvPr>
+        </p:nvSpPr>
+        <p:spPr>
+          <a:xfrm rot="5400000">
+            <a:off x="-562431" y="562430"/>
+            <a:ext cx="6858002" cy="5733142"/>
+          </a:xfrm>
+          <a:solidFill>
+            <a:srgbClr val="3B3B3B"/>
+          </a:solidFill>
+        </p:spPr>
+        <p:txBody>
+          <a:bodyPr vert="vert270" anchor="t" anchorCtr="0"/>
+          <a:lstStyle/>
+          <a:p>
+            <a:endParaRPr lang="en-US" b="1" dirty="0">
+              <a:solidFill>
+                <a:srgbClr val="FF6600"/>
+              </a:solidFill>
+            </a:endParaRPr>
+          </a:p>
+        </p:txBody>
+      </p:sp>
+      <p:pic>
+        <p:nvPicPr>
+          <p:cNvPr id="4" name="Picture 3">
+            <a:extLst>
+              <a:ext uri="{FF2B5EF4-FFF2-40B4-BE49-F238E27FC236}">
+                <a16:creationId xmlns:a16="http://schemas.microsoft.com/office/drawing/2014/main" id="{7A465064-0714-5743-882B-8875105A7023}"/>
+              </a:ext>
+            </a:extLst>
+          </p:cNvPr>
+          <p:cNvPicPr>
+            <a:picLocks noChangeAspect="1"/>
+          </p:cNvPicPr>
+          <p:nvPr/>
+        </p:nvPicPr>
+        <p:blipFill>
+          <a:blip r:embed="rId2" cstate="print">
+            <a:extLst>
+              <a:ext uri="{28A0092B-C50C-407E-A947-70E740481C1C}">
+                <a14:useLocalDpi xmlns:a14="http://schemas.microsoft.com/office/drawing/2010/main" val="0"/>
+              </a:ext>
+            </a:extLst>
+          </a:blip>
+          <a:stretch>
+            <a:fillRect/>
+          </a:stretch>
+        </p:blipFill>
+        <p:spPr>
+          <a:xfrm>
+            <a:off x="0" y="5863771"/>
+            <a:ext cx="1654627" cy="994232"/>
+          </a:xfrm>
+          <a:prstGeom prst="rect">
+            <a:avLst/>
+          </a:prstGeom>
+        </p:spPr>
+      </p:pic>
+      <p:sp>
+        <p:nvSpPr>
+          <p:cNvPr id="6" name="Subtitle 5">
+            <a:extLst>
+              <a:ext uri="{FF2B5EF4-FFF2-40B4-BE49-F238E27FC236}">
+                <a16:creationId xmlns:a16="http://schemas.microsoft.com/office/drawing/2014/main" id="{2D4BA697-580E-5544-8F2F-194AD99B859F}"/>
+              </a:ext>
+            </a:extLst>
+          </p:cNvPr>
+          <p:cNvSpPr>
+            <a:spLocks noGrp="1"/>
+          </p:cNvSpPr>
+          <p:nvPr>
+            <p:ph type="subTitle" idx="1"/>
+          </p:nvPr>
+        </p:nvSpPr>
+        <p:spPr>
+          <a:xfrm>
+            <a:off x="5152570" y="2481943"/>
+            <a:ext cx="5558973" cy="1655762"/>
+          </a:xfrm>
+        </p:spPr>
+        <p:txBody>
+          <a:bodyPr>
+            <a:normAutofit/>
+          </a:bodyPr>
+          <a:lstStyle/>
+          <a:p>
+            <a:r>
+              <a:rPr lang="en-US" sz="6600" dirty="0">
+                <a:solidFill>
+                  <a:srgbClr val="FF6600"/>
+                </a:solidFill>
+              </a:rPr>
+              <a:t>Thank You</a:t>
+            </a:r>
+          </a:p>
+          <a:p>
+            <a:endParaRPr lang="en-US" sz="6600" dirty="0">
+              <a:solidFill>
+                <a:srgbClr val="FF6600"/>
+              </a:solidFill>
+            </a:endParaRPr>
+          </a:p>
+        </p:txBody>
+      </p:sp>
+    </p:spTree>
+    <p:extLst>
+      <p:ext uri="{BB962C8B-B14F-4D97-AF65-F5344CB8AC3E}">
+        <p14:creationId xmlns:p14="http://schemas.microsoft.com/office/powerpoint/2010/main" val="116821060"/>
+      </p:ext>
+    </p:extLst>
+  </p:cSld>
+  <p:clrMapOvr>
+    <a:masterClrMapping/>
+  </p:clrMapOvr>
+</p:sld>
+</file>
+
 <file path=ppt/slides/slide2.xml><?xml version="1.0" encoding="utf-8"?>
 <p:sld xmlns:a="http://schemas.openxmlformats.org/drawingml/2006/main" xmlns:r="http://schemas.openxmlformats.org/officeDocument/2006/relationships" xmlns:p="http://schemas.openxmlformats.org/presentationml/2006/main">
   <p:cSld>
@@ -5139,8 +5576,12 @@
           <a:p>
             <a:pPr lvl="1" algn="just"/>
             <a:r>
+              <a:rPr lang="en-US" b="1" u="sng" dirty="0"/>
+              <a:t>The highest model accuracy and precision were attained using the logistic regression statistical model</a:t>
+            </a:r>
+            <a:r>
               <a:rPr lang="en-US" dirty="0"/>
-              <a:t>The highest model accuracy and precision were attained using the logistic regression statistical model.</a:t>
+              <a:t>.</a:t>
             </a:r>
           </a:p>
         </p:txBody>
@@ -6224,36 +6665,258 @@
       </p:grpSpPr>
       <p:sp>
         <p:nvSpPr>
-          <p:cNvPr id="2" name="Title 1">
+          <p:cNvPr id="4" name="Title 1">
             <a:extLst>
               <a:ext uri="{FF2B5EF4-FFF2-40B4-BE49-F238E27FC236}">
-                <a16:creationId xmlns:a16="http://schemas.microsoft.com/office/drawing/2014/main" id="{E8B8F26E-9345-4747-9094-972E38700A17}"/>
+                <a16:creationId xmlns:a16="http://schemas.microsoft.com/office/drawing/2014/main" id="{F0FEE1CD-BF08-48FA-8526-5BEB92660675}"/>
               </a:ext>
             </a:extLst>
           </p:cNvPr>
-          <p:cNvSpPr>
-            <a:spLocks noGrp="1"/>
+          <p:cNvSpPr txBox="1">
+            <a:spLocks/>
           </p:cNvSpPr>
-          <p:nvPr>
-            <p:ph type="ctrTitle"/>
-          </p:nvPr>
+          <p:nvPr/>
         </p:nvSpPr>
         <p:spPr>
           <a:xfrm rot="5400000">
-            <a:off x="-562431" y="562430"/>
-            <a:ext cx="6858002" cy="5733142"/>
+            <a:off x="5488405" y="-5488406"/>
+            <a:ext cx="1215190" cy="12192001"/>
           </a:xfrm>
+          <a:prstGeom prst="rect">
+            <a:avLst/>
+          </a:prstGeom>
           <a:solidFill>
             <a:srgbClr val="3B3B3B"/>
           </a:solidFill>
         </p:spPr>
         <p:txBody>
-          <a:bodyPr vert="vert270" anchor="t" anchorCtr="0"/>
+          <a:bodyPr vert="vert270" lIns="91440" tIns="45720" rIns="91440" bIns="45720" rtlCol="0" anchor="ctr" anchorCtr="0">
+            <a:normAutofit/>
+          </a:bodyPr>
+          <a:lstStyle>
+            <a:lvl1pPr algn="l" defTabSz="914400" rtl="0" eaLnBrk="1" latinLnBrk="0" hangingPunct="1">
+              <a:lnSpc>
+                <a:spcPct val="90000"/>
+              </a:lnSpc>
+              <a:spcBef>
+                <a:spcPct val="0"/>
+              </a:spcBef>
+              <a:buNone/>
+              <a:defRPr sz="4400" kern="1200">
+                <a:solidFill>
+                  <a:schemeClr val="tx1"/>
+                </a:solidFill>
+                <a:latin typeface="+mj-lt"/>
+                <a:ea typeface="+mj-ea"/>
+                <a:cs typeface="+mj-cs"/>
+              </a:defRPr>
+            </a:lvl1pPr>
+          </a:lstStyle>
+          <a:p>
+            <a:pPr marL="0" marR="0" lvl="0" indent="0" algn="ctr" defTabSz="914400" rtl="0" eaLnBrk="1" fontAlgn="auto" latinLnBrk="0" hangingPunct="1">
+              <a:lnSpc>
+                <a:spcPct val="90000"/>
+              </a:lnSpc>
+              <a:spcBef>
+                <a:spcPct val="0"/>
+              </a:spcBef>
+              <a:spcAft>
+                <a:spcPts val="0"/>
+              </a:spcAft>
+              <a:buClrTx/>
+              <a:buSzTx/>
+              <a:buFontTx/>
+              <a:buNone/>
+              <a:tabLst/>
+              <a:defRPr/>
+            </a:pPr>
+            <a:r>
+              <a:rPr kumimoji="0" lang="pl-PL" sz="4400" b="1" i="0" u="none" strike="noStrike" kern="1200" cap="none" spc="0" normalizeH="0" baseline="0" noProof="0" dirty="0">
+                <a:ln>
+                  <a:noFill/>
+                </a:ln>
+                <a:solidFill>
+                  <a:srgbClr val="FF6600"/>
+                </a:solidFill>
+                <a:effectLst/>
+                <a:uLnTx/>
+                <a:uFillTx/>
+                <a:latin typeface="Calibri Light" panose="020F0302020204030204"/>
+                <a:ea typeface="+mj-ea"/>
+                <a:cs typeface="+mj-cs"/>
+              </a:rPr>
+              <a:t>KNN </a:t>
+            </a:r>
+            <a:r>
+              <a:rPr kumimoji="0" lang="en-US" sz="4400" b="1" i="0" u="none" strike="noStrike" kern="1200" cap="none" spc="0" normalizeH="0" baseline="0" noProof="0" dirty="0">
+                <a:ln>
+                  <a:noFill/>
+                </a:ln>
+                <a:solidFill>
+                  <a:srgbClr val="FF6600"/>
+                </a:solidFill>
+                <a:effectLst/>
+                <a:uLnTx/>
+                <a:uFillTx/>
+                <a:latin typeface="Calibri Light" panose="020F0302020204030204"/>
+                <a:ea typeface="+mj-ea"/>
+                <a:cs typeface="+mj-cs"/>
+              </a:rPr>
+              <a:t>Model Results</a:t>
+            </a:r>
+          </a:p>
+        </p:txBody>
+      </p:sp>
+      <p:pic>
+        <p:nvPicPr>
+          <p:cNvPr id="1026" name="Picture 2">
+            <a:extLst>
+              <a:ext uri="{FF2B5EF4-FFF2-40B4-BE49-F238E27FC236}">
+                <a16:creationId xmlns:a16="http://schemas.microsoft.com/office/drawing/2014/main" id="{7A4F59AF-9517-4EF3-95EE-82F113A2E533}"/>
+              </a:ext>
+            </a:extLst>
+          </p:cNvPr>
+          <p:cNvPicPr>
+            <a:picLocks noChangeAspect="1" noChangeArrowheads="1"/>
+          </p:cNvPicPr>
+          <p:nvPr/>
+        </p:nvPicPr>
+        <p:blipFill>
+          <a:blip r:embed="rId2">
+            <a:extLst>
+              <a:ext uri="{28A0092B-C50C-407E-A947-70E740481C1C}">
+                <a14:useLocalDpi xmlns:a14="http://schemas.microsoft.com/office/drawing/2010/main" val="0"/>
+              </a:ext>
+            </a:extLst>
+          </a:blip>
+          <a:srcRect/>
+          <a:stretch>
+            <a:fillRect/>
+          </a:stretch>
+        </p:blipFill>
+        <p:spPr bwMode="auto">
+          <a:xfrm>
+            <a:off x="166622" y="1782865"/>
+            <a:ext cx="6971572" cy="4603868"/>
+          </a:xfrm>
+          <a:prstGeom prst="rect">
+            <a:avLst/>
+          </a:prstGeom>
+          <a:noFill/>
+          <a:extLst>
+            <a:ext uri="{909E8E84-426E-40DD-AFC4-6F175D3DCCD1}">
+              <a14:hiddenFill xmlns:a14="http://schemas.microsoft.com/office/drawing/2010/main">
+                <a:solidFill>
+                  <a:srgbClr val="FFFFFF"/>
+                </a:solidFill>
+              </a14:hiddenFill>
+            </a:ext>
+          </a:extLst>
+        </p:spPr>
+      </p:pic>
+      <p:sp>
+        <p:nvSpPr>
+          <p:cNvPr id="7" name="Owal 6">
+            <a:extLst>
+              <a:ext uri="{FF2B5EF4-FFF2-40B4-BE49-F238E27FC236}">
+                <a16:creationId xmlns:a16="http://schemas.microsoft.com/office/drawing/2014/main" id="{84633142-0C34-4246-A6E5-FB457C75BE20}"/>
+              </a:ext>
+            </a:extLst>
+          </p:cNvPr>
+          <p:cNvSpPr/>
+          <p:nvPr/>
+        </p:nvSpPr>
+        <p:spPr>
+          <a:xfrm>
+            <a:off x="6507619" y="2968283"/>
+            <a:ext cx="450166" cy="460717"/>
+          </a:xfrm>
+          <a:prstGeom prst="ellipse">
+            <a:avLst/>
+          </a:prstGeom>
+          <a:noFill/>
+          <a:ln>
+            <a:solidFill>
+              <a:srgbClr val="FF0000"/>
+            </a:solidFill>
+          </a:ln>
+        </p:spPr>
+        <p:style>
+          <a:lnRef idx="2">
+            <a:schemeClr val="accent1">
+              <a:shade val="50000"/>
+            </a:schemeClr>
+          </a:lnRef>
+          <a:fillRef idx="1">
+            <a:schemeClr val="accent1"/>
+          </a:fillRef>
+          <a:effectRef idx="0">
+            <a:schemeClr val="accent1"/>
+          </a:effectRef>
+          <a:fontRef idx="minor">
+            <a:schemeClr val="lt1"/>
+          </a:fontRef>
+        </p:style>
+        <p:txBody>
+          <a:bodyPr rtlCol="0" anchor="ctr"/>
           <a:lstStyle/>
           <a:p>
-            <a:endParaRPr lang="en-US" b="1" dirty="0">
+            <a:pPr algn="ctr"/>
+            <a:endParaRPr lang="en-US"/>
+          </a:p>
+        </p:txBody>
+      </p:sp>
+      <p:sp>
+        <p:nvSpPr>
+          <p:cNvPr id="8" name="pole tekstowe 7">
+            <a:extLst>
+              <a:ext uri="{FF2B5EF4-FFF2-40B4-BE49-F238E27FC236}">
+                <a16:creationId xmlns:a16="http://schemas.microsoft.com/office/drawing/2014/main" id="{A5ACEE68-3626-4430-878A-B677A5B22862}"/>
+              </a:ext>
+            </a:extLst>
+          </p:cNvPr>
+          <p:cNvSpPr txBox="1"/>
+          <p:nvPr/>
+        </p:nvSpPr>
+        <p:spPr>
+          <a:xfrm>
+            <a:off x="6211605" y="3386380"/>
+            <a:ext cx="1042194" cy="523220"/>
+          </a:xfrm>
+          <a:prstGeom prst="rect">
+            <a:avLst/>
+          </a:prstGeom>
+          <a:noFill/>
+        </p:spPr>
+        <p:txBody>
+          <a:bodyPr wrap="square" rtlCol="0">
+            <a:spAutoFit/>
+          </a:bodyPr>
+          <a:lstStyle/>
+          <a:p>
+            <a:pPr algn="ctr"/>
+            <a:r>
+              <a:rPr lang="pl-PL" sz="1400" dirty="0">
+                <a:solidFill>
+                  <a:srgbClr val="FF0000"/>
+                </a:solidFill>
+              </a:rPr>
+              <a:t>Best</a:t>
+            </a:r>
+          </a:p>
+          <a:p>
+            <a:pPr algn="ctr"/>
+            <a:r>
+              <a:rPr lang="pl-PL" sz="1400" dirty="0">
+                <a:solidFill>
+                  <a:srgbClr val="FF0000"/>
+                </a:solidFill>
+              </a:rPr>
+              <a:t> 0.7930</a:t>
+            </a:r>
+            <a:endParaRPr lang="en-US" sz="1400" dirty="0">
               <a:solidFill>
-                <a:srgbClr val="FF6600"/>
+                <a:srgbClr val="FF0000"/>
               </a:solidFill>
             </a:endParaRPr>
           </a:p>
@@ -6261,10 +6924,10 @@
       </p:sp>
       <p:pic>
         <p:nvPicPr>
-          <p:cNvPr id="4" name="Picture 3">
+          <p:cNvPr id="12" name="Obraz 11">
             <a:extLst>
               <a:ext uri="{FF2B5EF4-FFF2-40B4-BE49-F238E27FC236}">
-                <a16:creationId xmlns:a16="http://schemas.microsoft.com/office/drawing/2014/main" id="{7A465064-0714-5743-882B-8875105A7023}"/>
+                <a16:creationId xmlns:a16="http://schemas.microsoft.com/office/drawing/2014/main" id="{8811EF0E-EAD5-4150-9212-06C917D325D2}"/>
               </a:ext>
             </a:extLst>
           </p:cNvPr>
@@ -6274,77 +6937,688 @@
           <p:nvPr/>
         </p:nvPicPr>
         <p:blipFill>
-          <a:blip r:embed="rId2" cstate="print">
+          <a:blip r:embed="rId3"/>
+          <a:stretch>
+            <a:fillRect/>
+          </a:stretch>
+        </p:blipFill>
+        <p:spPr>
+          <a:xfrm>
+            <a:off x="7992510" y="1944950"/>
+            <a:ext cx="3677163" cy="2514951"/>
+          </a:xfrm>
+          <a:prstGeom prst="rect">
+            <a:avLst/>
+          </a:prstGeom>
+        </p:spPr>
+      </p:pic>
+      <p:pic>
+        <p:nvPicPr>
+          <p:cNvPr id="14" name="Obraz 13">
+            <a:extLst>
+              <a:ext uri="{FF2B5EF4-FFF2-40B4-BE49-F238E27FC236}">
+                <a16:creationId xmlns:a16="http://schemas.microsoft.com/office/drawing/2014/main" id="{C190F1C2-2BCE-4E4A-B9BB-4170D4565660}"/>
+              </a:ext>
+            </a:extLst>
+          </p:cNvPr>
+          <p:cNvPicPr>
+            <a:picLocks noChangeAspect="1"/>
+          </p:cNvPicPr>
+          <p:nvPr/>
+        </p:nvPicPr>
+        <p:blipFill>
+          <a:blip r:embed="rId4"/>
+          <a:stretch>
+            <a:fillRect/>
+          </a:stretch>
+        </p:blipFill>
+        <p:spPr>
+          <a:xfrm>
+            <a:off x="8325931" y="5021415"/>
+            <a:ext cx="3343742" cy="533474"/>
+          </a:xfrm>
+          <a:prstGeom prst="rect">
+            <a:avLst/>
+          </a:prstGeom>
+        </p:spPr>
+      </p:pic>
+      <p:cxnSp>
+        <p:nvCxnSpPr>
+          <p:cNvPr id="17" name="Łącznik prosty ze strzałką 16">
+            <a:extLst>
+              <a:ext uri="{FF2B5EF4-FFF2-40B4-BE49-F238E27FC236}">
+                <a16:creationId xmlns:a16="http://schemas.microsoft.com/office/drawing/2014/main" id="{EE7F8E62-2286-4B13-A3BB-D666F7C9BB1E}"/>
+              </a:ext>
+            </a:extLst>
+          </p:cNvPr>
+          <p:cNvCxnSpPr>
+            <a:stCxn id="7" idx="6"/>
+            <a:endCxn id="12" idx="1"/>
+          </p:cNvCxnSpPr>
+          <p:nvPr/>
+        </p:nvCxnSpPr>
+        <p:spPr>
+          <a:xfrm>
+            <a:off x="6957785" y="3198642"/>
+            <a:ext cx="1034725" cy="3784"/>
+          </a:xfrm>
+          <a:prstGeom prst="straightConnector1">
+            <a:avLst/>
+          </a:prstGeom>
+          <a:ln>
+            <a:tailEnd type="triangle"/>
+          </a:ln>
+        </p:spPr>
+        <p:style>
+          <a:lnRef idx="1">
+            <a:schemeClr val="accent2"/>
+          </a:lnRef>
+          <a:fillRef idx="0">
+            <a:schemeClr val="accent2"/>
+          </a:fillRef>
+          <a:effectRef idx="0">
+            <a:schemeClr val="accent2"/>
+          </a:effectRef>
+          <a:fontRef idx="minor">
+            <a:schemeClr val="tx1"/>
+          </a:fontRef>
+        </p:style>
+      </p:cxnSp>
+      <p:cxnSp>
+        <p:nvCxnSpPr>
+          <p:cNvPr id="19" name="Łącznik prosty ze strzałką 18">
+            <a:extLst>
+              <a:ext uri="{FF2B5EF4-FFF2-40B4-BE49-F238E27FC236}">
+                <a16:creationId xmlns:a16="http://schemas.microsoft.com/office/drawing/2014/main" id="{17DF3BEB-D38A-4733-99A8-FE0A1B83E937}"/>
+              </a:ext>
+            </a:extLst>
+          </p:cNvPr>
+          <p:cNvCxnSpPr>
+            <a:stCxn id="7" idx="5"/>
+          </p:cNvCxnSpPr>
+          <p:nvPr/>
+        </p:nvCxnSpPr>
+        <p:spPr>
+          <a:xfrm>
+            <a:off x="6891860" y="3361530"/>
+            <a:ext cx="1434071" cy="1733488"/>
+          </a:xfrm>
+          <a:prstGeom prst="straightConnector1">
+            <a:avLst/>
+          </a:prstGeom>
+          <a:ln>
+            <a:tailEnd type="triangle"/>
+          </a:ln>
+        </p:spPr>
+        <p:style>
+          <a:lnRef idx="1">
+            <a:schemeClr val="accent2"/>
+          </a:lnRef>
+          <a:fillRef idx="0">
+            <a:schemeClr val="accent2"/>
+          </a:fillRef>
+          <a:effectRef idx="0">
+            <a:schemeClr val="accent2"/>
+          </a:effectRef>
+          <a:fontRef idx="minor">
+            <a:schemeClr val="tx1"/>
+          </a:fontRef>
+        </p:style>
+      </p:cxnSp>
+    </p:spTree>
+    <p:extLst>
+      <p:ext uri="{BB962C8B-B14F-4D97-AF65-F5344CB8AC3E}">
+        <p14:creationId xmlns:p14="http://schemas.microsoft.com/office/powerpoint/2010/main" val="4073393256"/>
+      </p:ext>
+    </p:extLst>
+  </p:cSld>
+  <p:clrMapOvr>
+    <a:masterClrMapping/>
+  </p:clrMapOvr>
+</p:sld>
+</file>
+
+<file path=ppt/slides/slide8.xml><?xml version="1.0" encoding="utf-8"?>
+<p:sld xmlns:a="http://schemas.openxmlformats.org/drawingml/2006/main" xmlns:r="http://schemas.openxmlformats.org/officeDocument/2006/relationships" xmlns:p="http://schemas.openxmlformats.org/presentationml/2006/main">
+  <p:cSld>
+    <p:spTree>
+      <p:nvGrpSpPr>
+        <p:cNvPr id="1" name=""/>
+        <p:cNvGrpSpPr/>
+        <p:nvPr/>
+      </p:nvGrpSpPr>
+      <p:grpSpPr>
+        <a:xfrm>
+          <a:off x="0" y="0"/>
+          <a:ext cx="0" cy="0"/>
+          <a:chOff x="0" y="0"/>
+          <a:chExt cx="0" cy="0"/>
+        </a:xfrm>
+      </p:grpSpPr>
+      <p:sp>
+        <p:nvSpPr>
+          <p:cNvPr id="4" name="Title 1">
+            <a:extLst>
+              <a:ext uri="{FF2B5EF4-FFF2-40B4-BE49-F238E27FC236}">
+                <a16:creationId xmlns:a16="http://schemas.microsoft.com/office/drawing/2014/main" id="{F0FEE1CD-BF08-48FA-8526-5BEB92660675}"/>
+              </a:ext>
+            </a:extLst>
+          </p:cNvPr>
+          <p:cNvSpPr txBox="1">
+            <a:spLocks/>
+          </p:cNvSpPr>
+          <p:nvPr/>
+        </p:nvSpPr>
+        <p:spPr>
+          <a:xfrm rot="5400000">
+            <a:off x="5488405" y="-5488406"/>
+            <a:ext cx="1215190" cy="12192001"/>
+          </a:xfrm>
+          <a:prstGeom prst="rect">
+            <a:avLst/>
+          </a:prstGeom>
+          <a:solidFill>
+            <a:srgbClr val="3B3B3B"/>
+          </a:solidFill>
+        </p:spPr>
+        <p:txBody>
+          <a:bodyPr vert="vert270" lIns="91440" tIns="45720" rIns="91440" bIns="45720" rtlCol="0" anchor="ctr" anchorCtr="0">
+            <a:normAutofit/>
+          </a:bodyPr>
+          <a:lstStyle>
+            <a:lvl1pPr algn="l" defTabSz="914400" rtl="0" eaLnBrk="1" latinLnBrk="0" hangingPunct="1">
+              <a:lnSpc>
+                <a:spcPct val="90000"/>
+              </a:lnSpc>
+              <a:spcBef>
+                <a:spcPct val="0"/>
+              </a:spcBef>
+              <a:buNone/>
+              <a:defRPr sz="4400" kern="1200">
+                <a:solidFill>
+                  <a:schemeClr val="tx1"/>
+                </a:solidFill>
+                <a:latin typeface="+mj-lt"/>
+                <a:ea typeface="+mj-ea"/>
+                <a:cs typeface="+mj-cs"/>
+              </a:defRPr>
+            </a:lvl1pPr>
+          </a:lstStyle>
+          <a:p>
+            <a:pPr marL="0" marR="0" lvl="0" indent="0" algn="ctr" defTabSz="914400" rtl="0" eaLnBrk="1" fontAlgn="auto" latinLnBrk="0" hangingPunct="1">
+              <a:lnSpc>
+                <a:spcPct val="90000"/>
+              </a:lnSpc>
+              <a:spcBef>
+                <a:spcPct val="0"/>
+              </a:spcBef>
+              <a:spcAft>
+                <a:spcPts val="0"/>
+              </a:spcAft>
+              <a:buClrTx/>
+              <a:buSzTx/>
+              <a:buFontTx/>
+              <a:buNone/>
+              <a:tabLst/>
+              <a:defRPr/>
+            </a:pPr>
+            <a:r>
+              <a:rPr kumimoji="0" lang="pl-PL" sz="4400" b="1" i="0" u="none" strike="noStrike" kern="1200" cap="none" spc="0" normalizeH="0" baseline="0" noProof="0" dirty="0">
+                <a:ln>
+                  <a:noFill/>
+                </a:ln>
+                <a:solidFill>
+                  <a:srgbClr val="FF6600"/>
+                </a:solidFill>
+                <a:effectLst/>
+                <a:uLnTx/>
+                <a:uFillTx/>
+                <a:latin typeface="Calibri Light" panose="020F0302020204030204"/>
+                <a:ea typeface="+mj-ea"/>
+                <a:cs typeface="+mj-cs"/>
+              </a:rPr>
+              <a:t>KNN </a:t>
+            </a:r>
+            <a:r>
+              <a:rPr kumimoji="0" lang="en-US" sz="4400" b="1" i="0" u="none" strike="noStrike" kern="1200" cap="none" spc="0" normalizeH="0" baseline="0" noProof="0" dirty="0">
+                <a:ln>
+                  <a:noFill/>
+                </a:ln>
+                <a:solidFill>
+                  <a:srgbClr val="FF6600"/>
+                </a:solidFill>
+                <a:effectLst/>
+                <a:uLnTx/>
+                <a:uFillTx/>
+                <a:latin typeface="Calibri Light" panose="020F0302020204030204"/>
+                <a:ea typeface="+mj-ea"/>
+                <a:cs typeface="+mj-cs"/>
+              </a:rPr>
+              <a:t>Model Results</a:t>
+            </a:r>
+          </a:p>
+        </p:txBody>
+      </p:sp>
+      <p:sp>
+        <p:nvSpPr>
+          <p:cNvPr id="13" name="pole tekstowe 12">
+            <a:extLst>
+              <a:ext uri="{FF2B5EF4-FFF2-40B4-BE49-F238E27FC236}">
+                <a16:creationId xmlns:a16="http://schemas.microsoft.com/office/drawing/2014/main" id="{32C7B46D-C3CE-42B5-B2B1-74F5BB5C628D}"/>
+              </a:ext>
+            </a:extLst>
+          </p:cNvPr>
+          <p:cNvSpPr txBox="1"/>
+          <p:nvPr/>
+        </p:nvSpPr>
+        <p:spPr>
+          <a:xfrm>
+            <a:off x="1580827" y="1704814"/>
+            <a:ext cx="9593450" cy="4401205"/>
+          </a:xfrm>
+          <a:prstGeom prst="rect">
+            <a:avLst/>
+          </a:prstGeom>
+          <a:noFill/>
+        </p:spPr>
+        <p:txBody>
+          <a:bodyPr wrap="square">
+            <a:spAutoFit/>
+          </a:bodyPr>
+          <a:lstStyle/>
+          <a:p>
+            <a:r>
+              <a:rPr lang="en-US" sz="2800" b="1" dirty="0"/>
+              <a:t>Advantages of KNN Algorithm:</a:t>
+            </a:r>
+          </a:p>
+          <a:p>
+            <a:pPr marL="285750" indent="-285750">
+              <a:buFont typeface="Arial" panose="020B0604020202020204" pitchFamily="34" charset="0"/>
+              <a:buChar char="•"/>
+            </a:pPr>
+            <a:r>
+              <a:rPr lang="en-US" sz="2800" dirty="0"/>
+              <a:t>It is simple to implement.</a:t>
+            </a:r>
+          </a:p>
+          <a:p>
+            <a:pPr marL="285750" indent="-285750">
+              <a:buFont typeface="Arial" panose="020B0604020202020204" pitchFamily="34" charset="0"/>
+              <a:buChar char="•"/>
+            </a:pPr>
+            <a:r>
+              <a:rPr lang="en-US" sz="2800" dirty="0"/>
+              <a:t>It is robust to the noisy training data</a:t>
+            </a:r>
+          </a:p>
+          <a:p>
+            <a:pPr marL="285750" indent="-285750">
+              <a:buFont typeface="Arial" panose="020B0604020202020204" pitchFamily="34" charset="0"/>
+              <a:buChar char="•"/>
+            </a:pPr>
+            <a:r>
+              <a:rPr lang="en-US" sz="2800" dirty="0"/>
+              <a:t>It can be more effective if the training data is large.</a:t>
+            </a:r>
+          </a:p>
+          <a:p>
+            <a:endParaRPr lang="pl-PL" sz="2800" dirty="0"/>
+          </a:p>
+          <a:p>
+            <a:r>
+              <a:rPr lang="en-US" sz="2800" b="1" dirty="0"/>
+              <a:t>Disadvantages of KNN Algorithm:</a:t>
+            </a:r>
+          </a:p>
+          <a:p>
+            <a:pPr marL="285750" indent="-285750">
+              <a:buFont typeface="Arial" panose="020B0604020202020204" pitchFamily="34" charset="0"/>
+              <a:buChar char="•"/>
+            </a:pPr>
+            <a:r>
+              <a:rPr lang="en-US" sz="2800" dirty="0"/>
+              <a:t>Always needs to determine the value of K which may be complex some time.</a:t>
+            </a:r>
+          </a:p>
+          <a:p>
+            <a:pPr marL="285750" indent="-285750">
+              <a:buFont typeface="Arial" panose="020B0604020202020204" pitchFamily="34" charset="0"/>
+              <a:buChar char="•"/>
+            </a:pPr>
+            <a:r>
+              <a:rPr lang="en-US" sz="2800" dirty="0"/>
+              <a:t>The computation cost is high because of calculating the distance between the data points for all the training samples.</a:t>
+            </a:r>
+          </a:p>
+        </p:txBody>
+      </p:sp>
+    </p:spTree>
+    <p:extLst>
+      <p:ext uri="{BB962C8B-B14F-4D97-AF65-F5344CB8AC3E}">
+        <p14:creationId xmlns:p14="http://schemas.microsoft.com/office/powerpoint/2010/main" val="3328903446"/>
+      </p:ext>
+    </p:extLst>
+  </p:cSld>
+  <p:clrMapOvr>
+    <a:masterClrMapping/>
+  </p:clrMapOvr>
+</p:sld>
+</file>
+
+<file path=ppt/slides/slide9.xml><?xml version="1.0" encoding="utf-8"?>
+<p:sld xmlns:a="http://schemas.openxmlformats.org/drawingml/2006/main" xmlns:r="http://schemas.openxmlformats.org/officeDocument/2006/relationships" xmlns:p="http://schemas.openxmlformats.org/presentationml/2006/main">
+  <p:cSld>
+    <p:spTree>
+      <p:nvGrpSpPr>
+        <p:cNvPr id="1" name=""/>
+        <p:cNvGrpSpPr/>
+        <p:nvPr/>
+      </p:nvGrpSpPr>
+      <p:grpSpPr>
+        <a:xfrm>
+          <a:off x="0" y="0"/>
+          <a:ext cx="0" cy="0"/>
+          <a:chOff x="0" y="0"/>
+          <a:chExt cx="0" cy="0"/>
+        </a:xfrm>
+      </p:grpSpPr>
+      <p:sp>
+        <p:nvSpPr>
+          <p:cNvPr id="4" name="Title 1">
+            <a:extLst>
+              <a:ext uri="{FF2B5EF4-FFF2-40B4-BE49-F238E27FC236}">
+                <a16:creationId xmlns:a16="http://schemas.microsoft.com/office/drawing/2014/main" id="{F0FEE1CD-BF08-48FA-8526-5BEB92660675}"/>
+              </a:ext>
+            </a:extLst>
+          </p:cNvPr>
+          <p:cNvSpPr txBox="1">
+            <a:spLocks/>
+          </p:cNvSpPr>
+          <p:nvPr/>
+        </p:nvSpPr>
+        <p:spPr>
+          <a:xfrm rot="5400000">
+            <a:off x="5488405" y="-5488406"/>
+            <a:ext cx="1215190" cy="12192001"/>
+          </a:xfrm>
+          <a:prstGeom prst="rect">
+            <a:avLst/>
+          </a:prstGeom>
+          <a:solidFill>
+            <a:srgbClr val="3B3B3B"/>
+          </a:solidFill>
+        </p:spPr>
+        <p:txBody>
+          <a:bodyPr vert="vert270" lIns="91440" tIns="45720" rIns="91440" bIns="45720" rtlCol="0" anchor="ctr" anchorCtr="0">
+            <a:normAutofit/>
+          </a:bodyPr>
+          <a:lstStyle>
+            <a:lvl1pPr algn="l" defTabSz="914400" rtl="0" eaLnBrk="1" latinLnBrk="0" hangingPunct="1">
+              <a:lnSpc>
+                <a:spcPct val="90000"/>
+              </a:lnSpc>
+              <a:spcBef>
+                <a:spcPct val="0"/>
+              </a:spcBef>
+              <a:buNone/>
+              <a:defRPr sz="4400" kern="1200">
+                <a:solidFill>
+                  <a:schemeClr val="tx1"/>
+                </a:solidFill>
+                <a:latin typeface="+mj-lt"/>
+                <a:ea typeface="+mj-ea"/>
+                <a:cs typeface="+mj-cs"/>
+              </a:defRPr>
+            </a:lvl1pPr>
+          </a:lstStyle>
+          <a:p>
+            <a:pPr marL="0" marR="0" lvl="0" indent="0" algn="ctr" defTabSz="914400" rtl="0" eaLnBrk="1" fontAlgn="auto" latinLnBrk="0" hangingPunct="1">
+              <a:lnSpc>
+                <a:spcPct val="90000"/>
+              </a:lnSpc>
+              <a:spcBef>
+                <a:spcPct val="0"/>
+              </a:spcBef>
+              <a:spcAft>
+                <a:spcPts val="0"/>
+              </a:spcAft>
+              <a:buClrTx/>
+              <a:buSzTx/>
+              <a:buFontTx/>
+              <a:buNone/>
+              <a:tabLst/>
+              <a:defRPr/>
+            </a:pPr>
+            <a:r>
+              <a:rPr kumimoji="0" lang="pl-PL" sz="4400" b="1" i="0" u="none" strike="noStrike" kern="1200" cap="none" spc="0" normalizeH="0" baseline="0" noProof="0" dirty="0" err="1">
+                <a:ln>
+                  <a:noFill/>
+                </a:ln>
+                <a:solidFill>
+                  <a:srgbClr val="FF6600"/>
+                </a:solidFill>
+                <a:effectLst/>
+                <a:uLnTx/>
+                <a:uFillTx/>
+                <a:latin typeface="Calibri Light" panose="020F0302020204030204"/>
+                <a:ea typeface="+mj-ea"/>
+                <a:cs typeface="+mj-cs"/>
+              </a:rPr>
+              <a:t>Logistic</a:t>
+            </a:r>
+            <a:r>
+              <a:rPr kumimoji="0" lang="pl-PL" sz="4400" b="1" i="0" u="none" strike="noStrike" kern="1200" cap="none" spc="0" normalizeH="0" baseline="0" noProof="0" dirty="0">
+                <a:ln>
+                  <a:noFill/>
+                </a:ln>
+                <a:solidFill>
+                  <a:srgbClr val="FF6600"/>
+                </a:solidFill>
+                <a:effectLst/>
+                <a:uLnTx/>
+                <a:uFillTx/>
+                <a:latin typeface="Calibri Light" panose="020F0302020204030204"/>
+                <a:ea typeface="+mj-ea"/>
+                <a:cs typeface="+mj-cs"/>
+              </a:rPr>
+              <a:t> </a:t>
+            </a:r>
+            <a:r>
+              <a:rPr kumimoji="0" lang="pl-PL" sz="4400" b="1" i="0" u="none" strike="noStrike" kern="1200" cap="none" spc="0" normalizeH="0" baseline="0" noProof="0" dirty="0" err="1">
+                <a:ln>
+                  <a:noFill/>
+                </a:ln>
+                <a:solidFill>
+                  <a:srgbClr val="FF6600"/>
+                </a:solidFill>
+                <a:effectLst/>
+                <a:uLnTx/>
+                <a:uFillTx/>
+                <a:latin typeface="Calibri Light" panose="020F0302020204030204"/>
+                <a:ea typeface="+mj-ea"/>
+                <a:cs typeface="+mj-cs"/>
+              </a:rPr>
+              <a:t>Regression</a:t>
+            </a:r>
+            <a:r>
+              <a:rPr kumimoji="0" lang="pl-PL" sz="4400" b="1" i="0" u="none" strike="noStrike" kern="1200" cap="none" spc="0" normalizeH="0" baseline="0" noProof="0" dirty="0">
+                <a:ln>
+                  <a:noFill/>
+                </a:ln>
+                <a:solidFill>
+                  <a:srgbClr val="FF6600"/>
+                </a:solidFill>
+                <a:effectLst/>
+                <a:uLnTx/>
+                <a:uFillTx/>
+                <a:latin typeface="Calibri Light" panose="020F0302020204030204"/>
+                <a:ea typeface="+mj-ea"/>
+                <a:cs typeface="+mj-cs"/>
+              </a:rPr>
+              <a:t> </a:t>
+            </a:r>
+            <a:r>
+              <a:rPr kumimoji="0" lang="en-US" sz="4400" b="1" i="0" u="none" strike="noStrike" kern="1200" cap="none" spc="0" normalizeH="0" baseline="0" noProof="0" dirty="0">
+                <a:ln>
+                  <a:noFill/>
+                </a:ln>
+                <a:solidFill>
+                  <a:srgbClr val="FF6600"/>
+                </a:solidFill>
+                <a:effectLst/>
+                <a:uLnTx/>
+                <a:uFillTx/>
+                <a:latin typeface="Calibri Light" panose="020F0302020204030204"/>
+                <a:ea typeface="+mj-ea"/>
+                <a:cs typeface="+mj-cs"/>
+              </a:rPr>
+              <a:t>Model Results</a:t>
+            </a:r>
+          </a:p>
+        </p:txBody>
+      </p:sp>
+      <p:pic>
+        <p:nvPicPr>
+          <p:cNvPr id="3" name="Obraz 2">
+            <a:extLst>
+              <a:ext uri="{FF2B5EF4-FFF2-40B4-BE49-F238E27FC236}">
+                <a16:creationId xmlns:a16="http://schemas.microsoft.com/office/drawing/2014/main" id="{EE5819C0-DC31-45ED-8BAD-7F483C0C9544}"/>
+              </a:ext>
+            </a:extLst>
+          </p:cNvPr>
+          <p:cNvPicPr>
+            <a:picLocks noChangeAspect="1"/>
+          </p:cNvPicPr>
+          <p:nvPr/>
+        </p:nvPicPr>
+        <p:blipFill>
+          <a:blip r:embed="rId2"/>
+          <a:stretch>
+            <a:fillRect/>
+          </a:stretch>
+        </p:blipFill>
+        <p:spPr>
+          <a:xfrm>
+            <a:off x="1578610" y="2863697"/>
+            <a:ext cx="4029637" cy="1381318"/>
+          </a:xfrm>
+          <a:prstGeom prst="rect">
+            <a:avLst/>
+          </a:prstGeom>
+        </p:spPr>
+      </p:pic>
+      <p:pic>
+        <p:nvPicPr>
+          <p:cNvPr id="6" name="Obraz 5">
+            <a:extLst>
+              <a:ext uri="{FF2B5EF4-FFF2-40B4-BE49-F238E27FC236}">
+                <a16:creationId xmlns:a16="http://schemas.microsoft.com/office/drawing/2014/main" id="{AD89079A-877A-48AF-A317-E74147F52C39}"/>
+              </a:ext>
+            </a:extLst>
+          </p:cNvPr>
+          <p:cNvPicPr>
+            <a:picLocks noChangeAspect="1"/>
+          </p:cNvPicPr>
+          <p:nvPr/>
+        </p:nvPicPr>
+        <p:blipFill>
+          <a:blip r:embed="rId3"/>
+          <a:stretch>
+            <a:fillRect/>
+          </a:stretch>
+        </p:blipFill>
+        <p:spPr>
+          <a:xfrm>
+            <a:off x="2265961" y="5600030"/>
+            <a:ext cx="2619741" cy="390580"/>
+          </a:xfrm>
+          <a:prstGeom prst="rect">
+            <a:avLst/>
+          </a:prstGeom>
+        </p:spPr>
+      </p:pic>
+      <p:pic>
+        <p:nvPicPr>
+          <p:cNvPr id="2050" name="Picture 2">
+            <a:extLst>
+              <a:ext uri="{FF2B5EF4-FFF2-40B4-BE49-F238E27FC236}">
+                <a16:creationId xmlns:a16="http://schemas.microsoft.com/office/drawing/2014/main" id="{DE5DEEC8-78C9-4F82-9BCE-54E75BF5C4B9}"/>
+              </a:ext>
+            </a:extLst>
+          </p:cNvPr>
+          <p:cNvPicPr>
+            <a:picLocks noChangeAspect="1" noChangeArrowheads="1"/>
+          </p:cNvPicPr>
+          <p:nvPr/>
+        </p:nvPicPr>
+        <p:blipFill>
+          <a:blip r:embed="rId4">
             <a:extLst>
               <a:ext uri="{28A0092B-C50C-407E-A947-70E740481C1C}">
                 <a14:useLocalDpi xmlns:a14="http://schemas.microsoft.com/office/drawing/2010/main" val="0"/>
               </a:ext>
             </a:extLst>
           </a:blip>
+          <a:srcRect/>
+          <a:stretch>
+            <a:fillRect/>
+          </a:stretch>
+        </p:blipFill>
+        <p:spPr bwMode="auto">
+          <a:xfrm>
+            <a:off x="6847501" y="1711269"/>
+            <a:ext cx="3676650" cy="3686175"/>
+          </a:xfrm>
+          <a:prstGeom prst="rect">
+            <a:avLst/>
+          </a:prstGeom>
+          <a:noFill/>
+          <a:extLst>
+            <a:ext uri="{909E8E84-426E-40DD-AFC4-6F175D3DCCD1}">
+              <a14:hiddenFill xmlns:a14="http://schemas.microsoft.com/office/drawing/2010/main">
+                <a:solidFill>
+                  <a:srgbClr val="FFFFFF"/>
+                </a:solidFill>
+              </a14:hiddenFill>
+            </a:ext>
+          </a:extLst>
+        </p:spPr>
+      </p:pic>
+      <p:pic>
+        <p:nvPicPr>
+          <p:cNvPr id="9" name="Obraz 8">
+            <a:extLst>
+              <a:ext uri="{FF2B5EF4-FFF2-40B4-BE49-F238E27FC236}">
+                <a16:creationId xmlns:a16="http://schemas.microsoft.com/office/drawing/2014/main" id="{BB4D2EE0-ED84-42A1-8B0B-A8896ACC10AB}"/>
+              </a:ext>
+            </a:extLst>
+          </p:cNvPr>
+          <p:cNvPicPr>
+            <a:picLocks noChangeAspect="1"/>
+          </p:cNvPicPr>
+          <p:nvPr/>
+        </p:nvPicPr>
+        <p:blipFill>
+          <a:blip r:embed="rId5"/>
           <a:stretch>
             <a:fillRect/>
           </a:stretch>
         </p:blipFill>
         <p:spPr>
           <a:xfrm>
-            <a:off x="0" y="5863771"/>
-            <a:ext cx="1654627" cy="994232"/>
+            <a:off x="8124445" y="5753072"/>
+            <a:ext cx="1838582" cy="190527"/>
           </a:xfrm>
           <a:prstGeom prst="rect">
             <a:avLst/>
           </a:prstGeom>
         </p:spPr>
       </p:pic>
-      <p:sp>
-        <p:nvSpPr>
-          <p:cNvPr id="6" name="Subtitle 5">
-            <a:extLst>
-              <a:ext uri="{FF2B5EF4-FFF2-40B4-BE49-F238E27FC236}">
-                <a16:creationId xmlns:a16="http://schemas.microsoft.com/office/drawing/2014/main" id="{2D4BA697-580E-5544-8F2F-194AD99B859F}"/>
-              </a:ext>
-            </a:extLst>
-          </p:cNvPr>
-          <p:cNvSpPr>
-            <a:spLocks noGrp="1"/>
-          </p:cNvSpPr>
-          <p:nvPr>
-            <p:ph type="subTitle" idx="1"/>
-          </p:nvPr>
-        </p:nvSpPr>
-        <p:spPr>
-          <a:xfrm>
-            <a:off x="5152570" y="2481943"/>
-            <a:ext cx="5558973" cy="1655762"/>
-          </a:xfrm>
-        </p:spPr>
-        <p:txBody>
-          <a:bodyPr>
-            <a:normAutofit/>
-          </a:bodyPr>
-          <a:lstStyle/>
-          <a:p>
-            <a:r>
-              <a:rPr lang="en-US" sz="6600" dirty="0">
-                <a:solidFill>
-                  <a:srgbClr val="FF6600"/>
-                </a:solidFill>
-              </a:rPr>
-              <a:t>Thank You</a:t>
-            </a:r>
-          </a:p>
-          <a:p>
-            <a:endParaRPr lang="en-US" sz="6600" dirty="0">
-              <a:solidFill>
-                <a:srgbClr val="FF6600"/>
-              </a:solidFill>
-            </a:endParaRPr>
-          </a:p>
-        </p:txBody>
-      </p:sp>
     </p:spTree>
     <p:extLst>
       <p:ext uri="{BB962C8B-B14F-4D97-AF65-F5344CB8AC3E}">
-        <p14:creationId xmlns:p14="http://schemas.microsoft.com/office/powerpoint/2010/main" val="116821060"/>
+        <p14:creationId xmlns:p14="http://schemas.microsoft.com/office/powerpoint/2010/main" val="3527806478"/>
       </p:ext>
     </p:extLst>
   </p:cSld>

</xml_diff>

<commit_message>
Added  missing metrics for RF model
</commit_message>
<xml_diff>
--- a/Week_12/ML_model.pptx
+++ b/Week_12/ML_model.pptx
@@ -5,19 +5,20 @@
     <p:sldMasterId id="2147483684" r:id="rId1"/>
   </p:sldMasterIdLst>
   <p:notesMasterIdLst>
-    <p:notesMasterId r:id="rId12"/>
+    <p:notesMasterId r:id="rId13"/>
   </p:notesMasterIdLst>
   <p:sldIdLst>
     <p:sldId id="256" r:id="rId2"/>
     <p:sldId id="269" r:id="rId3"/>
     <p:sldId id="270" r:id="rId4"/>
-    <p:sldId id="272" r:id="rId5"/>
-    <p:sldId id="274" r:id="rId6"/>
-    <p:sldId id="273" r:id="rId7"/>
-    <p:sldId id="275" r:id="rId8"/>
-    <p:sldId id="276" r:id="rId9"/>
-    <p:sldId id="277" r:id="rId10"/>
-    <p:sldId id="268" r:id="rId11"/>
+    <p:sldId id="278" r:id="rId5"/>
+    <p:sldId id="272" r:id="rId6"/>
+    <p:sldId id="274" r:id="rId7"/>
+    <p:sldId id="273" r:id="rId8"/>
+    <p:sldId id="275" r:id="rId9"/>
+    <p:sldId id="276" r:id="rId10"/>
+    <p:sldId id="277" r:id="rId11"/>
+    <p:sldId id="268" r:id="rId12"/>
   </p:sldIdLst>
   <p:sldSz cx="12192000" cy="6858000"/>
   <p:notesSz cx="6858000" cy="9144000"/>
@@ -135,6 +136,188 @@
 <file path=ppt/changesInfos/changesInfo1.xml><?xml version="1.0" encoding="utf-8"?>
 <pc:chgInfo xmlns:a="http://schemas.openxmlformats.org/drawingml/2006/main" xmlns:r="http://schemas.openxmlformats.org/officeDocument/2006/relationships" xmlns:ac="http://schemas.microsoft.com/office/drawing/2013/main/command" xmlns:pc="http://schemas.microsoft.com/office/powerpoint/2013/main/command">
   <pc:docChgLst>
+    <pc:chgData name="Roger Burek-Bors" userId="52318fc02a824a34" providerId="LiveId" clId="{6F86E068-8AAC-44F8-AFA9-D35EEACD5653}"/>
+    <pc:docChg chg="undo custSel modSld">
+      <pc:chgData name="Roger Burek-Bors" userId="52318fc02a824a34" providerId="LiveId" clId="{6F86E068-8AAC-44F8-AFA9-D35EEACD5653}" dt="2021-03-11T19:35:55.876" v="636" actId="6549"/>
+      <pc:docMkLst>
+        <pc:docMk/>
+      </pc:docMkLst>
+      <pc:sldChg chg="modSp mod">
+        <pc:chgData name="Roger Burek-Bors" userId="52318fc02a824a34" providerId="LiveId" clId="{6F86E068-8AAC-44F8-AFA9-D35EEACD5653}" dt="2021-03-11T17:41:05.254" v="96" actId="790"/>
+        <pc:sldMkLst>
+          <pc:docMk/>
+          <pc:sldMk cId="109857222" sldId="256"/>
+        </pc:sldMkLst>
+        <pc:spChg chg="mod">
+          <ac:chgData name="Roger Burek-Bors" userId="52318fc02a824a34" providerId="LiveId" clId="{6F86E068-8AAC-44F8-AFA9-D35EEACD5653}" dt="2021-03-11T17:41:05.254" v="96" actId="790"/>
+          <ac:spMkLst>
+            <pc:docMk/>
+            <pc:sldMk cId="109857222" sldId="256"/>
+            <ac:spMk id="11" creationId="{00CC22B5-8500-2C45-91DE-A596A6DF1C3B}"/>
+          </ac:spMkLst>
+        </pc:spChg>
+      </pc:sldChg>
+      <pc:sldChg chg="addSp delSp modSp mod">
+        <pc:chgData name="Roger Burek-Bors" userId="52318fc02a824a34" providerId="LiveId" clId="{6F86E068-8AAC-44F8-AFA9-D35EEACD5653}" dt="2021-03-11T19:08:34.666" v="305" actId="1076"/>
+        <pc:sldMkLst>
+          <pc:docMk/>
+          <pc:sldMk cId="116821060" sldId="268"/>
+        </pc:sldMkLst>
+        <pc:spChg chg="add del mod">
+          <ac:chgData name="Roger Burek-Bors" userId="52318fc02a824a34" providerId="LiveId" clId="{6F86E068-8AAC-44F8-AFA9-D35EEACD5653}" dt="2021-03-11T19:08:34.666" v="305" actId="1076"/>
+          <ac:spMkLst>
+            <pc:docMk/>
+            <pc:sldMk cId="116821060" sldId="268"/>
+            <ac:spMk id="2" creationId="{E8B8F26E-9345-4747-9094-972E38700A17}"/>
+          </ac:spMkLst>
+        </pc:spChg>
+      </pc:sldChg>
+      <pc:sldChg chg="modSp mod">
+        <pc:chgData name="Roger Burek-Bors" userId="52318fc02a824a34" providerId="LiveId" clId="{6F86E068-8AAC-44F8-AFA9-D35EEACD5653}" dt="2021-03-11T19:16:34.577" v="383" actId="790"/>
+        <pc:sldMkLst>
+          <pc:docMk/>
+          <pc:sldMk cId="1899016330" sldId="269"/>
+        </pc:sldMkLst>
+        <pc:spChg chg="mod">
+          <ac:chgData name="Roger Burek-Bors" userId="52318fc02a824a34" providerId="LiveId" clId="{6F86E068-8AAC-44F8-AFA9-D35EEACD5653}" dt="2021-03-11T19:16:34.577" v="383" actId="790"/>
+          <ac:spMkLst>
+            <pc:docMk/>
+            <pc:sldMk cId="1899016330" sldId="269"/>
+            <ac:spMk id="3" creationId="{CDC6F948-2F33-47A0-AE55-62E355ACC532}"/>
+          </ac:spMkLst>
+        </pc:spChg>
+      </pc:sldChg>
+      <pc:sldChg chg="modSp mod">
+        <pc:chgData name="Roger Burek-Bors" userId="52318fc02a824a34" providerId="LiveId" clId="{6F86E068-8AAC-44F8-AFA9-D35EEACD5653}" dt="2021-03-11T19:32:59.846" v="544" actId="790"/>
+        <pc:sldMkLst>
+          <pc:docMk/>
+          <pc:sldMk cId="4200854336" sldId="272"/>
+        </pc:sldMkLst>
+        <pc:spChg chg="mod">
+          <ac:chgData name="Roger Burek-Bors" userId="52318fc02a824a34" providerId="LiveId" clId="{6F86E068-8AAC-44F8-AFA9-D35EEACD5653}" dt="2021-03-11T19:32:59.846" v="544" actId="790"/>
+          <ac:spMkLst>
+            <pc:docMk/>
+            <pc:sldMk cId="4200854336" sldId="272"/>
+            <ac:spMk id="4" creationId="{F0FEE1CD-BF08-48FA-8526-5BEB92660675}"/>
+          </ac:spMkLst>
+        </pc:spChg>
+      </pc:sldChg>
+      <pc:sldChg chg="modSp mod">
+        <pc:chgData name="Roger Burek-Bors" userId="52318fc02a824a34" providerId="LiveId" clId="{6F86E068-8AAC-44F8-AFA9-D35EEACD5653}" dt="2021-03-11T19:09:39.378" v="327" actId="313"/>
+        <pc:sldMkLst>
+          <pc:docMk/>
+          <pc:sldMk cId="481083618" sldId="274"/>
+        </pc:sldMkLst>
+        <pc:spChg chg="mod">
+          <ac:chgData name="Roger Burek-Bors" userId="52318fc02a824a34" providerId="LiveId" clId="{6F86E068-8AAC-44F8-AFA9-D35EEACD5653}" dt="2021-03-11T19:09:39.378" v="327" actId="313"/>
+          <ac:spMkLst>
+            <pc:docMk/>
+            <pc:sldMk cId="481083618" sldId="274"/>
+            <ac:spMk id="3" creationId="{CDC6F948-2F33-47A0-AE55-62E355ACC532}"/>
+          </ac:spMkLst>
+        </pc:spChg>
+      </pc:sldChg>
+      <pc:sldChg chg="modSp mod">
+        <pc:chgData name="Roger Burek-Bors" userId="52318fc02a824a34" providerId="LiveId" clId="{6F86E068-8AAC-44F8-AFA9-D35EEACD5653}" dt="2021-03-11T19:32:48.687" v="543" actId="790"/>
+        <pc:sldMkLst>
+          <pc:docMk/>
+          <pc:sldMk cId="3679507724" sldId="278"/>
+        </pc:sldMkLst>
+        <pc:spChg chg="mod">
+          <ac:chgData name="Roger Burek-Bors" userId="52318fc02a824a34" providerId="LiveId" clId="{6F86E068-8AAC-44F8-AFA9-D35EEACD5653}" dt="2021-03-11T19:32:48.687" v="543" actId="790"/>
+          <ac:spMkLst>
+            <pc:docMk/>
+            <pc:sldMk cId="3679507724" sldId="278"/>
+            <ac:spMk id="4" creationId="{F0FEE1CD-BF08-48FA-8526-5BEB92660675}"/>
+          </ac:spMkLst>
+        </pc:spChg>
+      </pc:sldChg>
+      <pc:sldChg chg="modSp mod">
+        <pc:chgData name="Roger Burek-Bors" userId="52318fc02a824a34" providerId="LiveId" clId="{6F86E068-8AAC-44F8-AFA9-D35EEACD5653}" dt="2021-03-11T19:32:39.802" v="542" actId="790"/>
+        <pc:sldMkLst>
+          <pc:docMk/>
+          <pc:sldMk cId="2898413202" sldId="279"/>
+        </pc:sldMkLst>
+        <pc:spChg chg="mod">
+          <ac:chgData name="Roger Burek-Bors" userId="52318fc02a824a34" providerId="LiveId" clId="{6F86E068-8AAC-44F8-AFA9-D35EEACD5653}" dt="2021-03-11T19:32:39.802" v="542" actId="790"/>
+          <ac:spMkLst>
+            <pc:docMk/>
+            <pc:sldMk cId="2898413202" sldId="279"/>
+            <ac:spMk id="4" creationId="{F0FEE1CD-BF08-48FA-8526-5BEB92660675}"/>
+          </ac:spMkLst>
+        </pc:spChg>
+      </pc:sldChg>
+      <pc:sldChg chg="modSp mod">
+        <pc:chgData name="Roger Burek-Bors" userId="52318fc02a824a34" providerId="LiveId" clId="{6F86E068-8AAC-44F8-AFA9-D35EEACD5653}" dt="2021-03-11T19:32:29.618" v="541" actId="790"/>
+        <pc:sldMkLst>
+          <pc:docMk/>
+          <pc:sldMk cId="1290289446" sldId="280"/>
+        </pc:sldMkLst>
+        <pc:spChg chg="mod">
+          <ac:chgData name="Roger Burek-Bors" userId="52318fc02a824a34" providerId="LiveId" clId="{6F86E068-8AAC-44F8-AFA9-D35EEACD5653}" dt="2021-03-11T19:32:29.618" v="541" actId="790"/>
+          <ac:spMkLst>
+            <pc:docMk/>
+            <pc:sldMk cId="1290289446" sldId="280"/>
+            <ac:spMk id="4" creationId="{F0FEE1CD-BF08-48FA-8526-5BEB92660675}"/>
+          </ac:spMkLst>
+        </pc:spChg>
+      </pc:sldChg>
+      <pc:sldChg chg="modSp mod">
+        <pc:chgData name="Roger Burek-Bors" userId="52318fc02a824a34" providerId="LiveId" clId="{6F86E068-8AAC-44F8-AFA9-D35EEACD5653}" dt="2021-03-11T19:32:13.714" v="540" actId="790"/>
+        <pc:sldMkLst>
+          <pc:docMk/>
+          <pc:sldMk cId="3626305797" sldId="281"/>
+        </pc:sldMkLst>
+        <pc:spChg chg="mod">
+          <ac:chgData name="Roger Burek-Bors" userId="52318fc02a824a34" providerId="LiveId" clId="{6F86E068-8AAC-44F8-AFA9-D35EEACD5653}" dt="2021-03-11T19:32:13.714" v="540" actId="790"/>
+          <ac:spMkLst>
+            <pc:docMk/>
+            <pc:sldMk cId="3626305797" sldId="281"/>
+            <ac:spMk id="4" creationId="{F0FEE1CD-BF08-48FA-8526-5BEB92660675}"/>
+          </ac:spMkLst>
+        </pc:spChg>
+      </pc:sldChg>
+      <pc:sldChg chg="modSp mod">
+        <pc:chgData name="Roger Burek-Bors" userId="52318fc02a824a34" providerId="LiveId" clId="{6F86E068-8AAC-44F8-AFA9-D35EEACD5653}" dt="2021-03-11T19:34:18.717" v="575" actId="790"/>
+        <pc:sldMkLst>
+          <pc:docMk/>
+          <pc:sldMk cId="414061104" sldId="282"/>
+        </pc:sldMkLst>
+        <pc:spChg chg="mod">
+          <ac:chgData name="Roger Burek-Bors" userId="52318fc02a824a34" providerId="LiveId" clId="{6F86E068-8AAC-44F8-AFA9-D35EEACD5653}" dt="2021-03-11T19:34:18.717" v="575" actId="790"/>
+          <ac:spMkLst>
+            <pc:docMk/>
+            <pc:sldMk cId="414061104" sldId="282"/>
+            <ac:spMk id="4" creationId="{F0FEE1CD-BF08-48FA-8526-5BEB92660675}"/>
+          </ac:spMkLst>
+        </pc:spChg>
+        <pc:graphicFrameChg chg="mod">
+          <ac:chgData name="Roger Burek-Bors" userId="52318fc02a824a34" providerId="LiveId" clId="{6F86E068-8AAC-44F8-AFA9-D35EEACD5653}" dt="2021-03-11T19:22:28.351" v="390" actId="14100"/>
+          <ac:graphicFrameMkLst>
+            <pc:docMk/>
+            <pc:sldMk cId="414061104" sldId="282"/>
+            <ac:graphicFrameMk id="6" creationId="{0C73F6A4-BD75-466A-91C4-DC593C0E3E0D}"/>
+          </ac:graphicFrameMkLst>
+        </pc:graphicFrameChg>
+      </pc:sldChg>
+      <pc:sldChg chg="modSp mod">
+        <pc:chgData name="Roger Burek-Bors" userId="52318fc02a824a34" providerId="LiveId" clId="{6F86E068-8AAC-44F8-AFA9-D35EEACD5653}" dt="2021-03-11T19:35:55.876" v="636" actId="6549"/>
+        <pc:sldMkLst>
+          <pc:docMk/>
+          <pc:sldMk cId="2824837901" sldId="283"/>
+        </pc:sldMkLst>
+        <pc:spChg chg="mod">
+          <ac:chgData name="Roger Burek-Bors" userId="52318fc02a824a34" providerId="LiveId" clId="{6F86E068-8AAC-44F8-AFA9-D35EEACD5653}" dt="2021-03-11T19:35:55.876" v="636" actId="6549"/>
+          <ac:spMkLst>
+            <pc:docMk/>
+            <pc:sldMk cId="2824837901" sldId="283"/>
+            <ac:spMk id="3" creationId="{CDC6F948-2F33-47A0-AE55-62E355ACC532}"/>
+          </ac:spMkLst>
+        </pc:spChg>
+      </pc:sldChg>
+    </pc:docChg>
+  </pc:docChgLst>
+  <pc:docChgLst>
     <pc:chgData name="Roger Burek-Bors" userId="52318fc02a824a34" providerId="LiveId" clId="{9B8180F1-73D3-4CC1-B735-808662D4AF27}"/>
     <pc:docChg chg="undo custSel addSld modSld">
       <pc:chgData name="Roger Burek-Bors" userId="52318fc02a824a34" providerId="LiveId" clId="{9B8180F1-73D3-4CC1-B735-808662D4AF27}" dt="2021-05-09T23:09:42.511" v="101" actId="1076"/>
@@ -416,188 +599,6 @@
             <ac:picMk id="2050" creationId="{DE5DEEC8-78C9-4F82-9BCE-54E75BF5C4B9}"/>
           </ac:picMkLst>
         </pc:picChg>
-      </pc:sldChg>
-    </pc:docChg>
-  </pc:docChgLst>
-  <pc:docChgLst>
-    <pc:chgData name="Roger Burek-Bors" userId="52318fc02a824a34" providerId="LiveId" clId="{6F86E068-8AAC-44F8-AFA9-D35EEACD5653}"/>
-    <pc:docChg chg="undo custSel modSld">
-      <pc:chgData name="Roger Burek-Bors" userId="52318fc02a824a34" providerId="LiveId" clId="{6F86E068-8AAC-44F8-AFA9-D35EEACD5653}" dt="2021-03-11T19:35:55.876" v="636" actId="6549"/>
-      <pc:docMkLst>
-        <pc:docMk/>
-      </pc:docMkLst>
-      <pc:sldChg chg="modSp mod">
-        <pc:chgData name="Roger Burek-Bors" userId="52318fc02a824a34" providerId="LiveId" clId="{6F86E068-8AAC-44F8-AFA9-D35EEACD5653}" dt="2021-03-11T17:41:05.254" v="96" actId="790"/>
-        <pc:sldMkLst>
-          <pc:docMk/>
-          <pc:sldMk cId="109857222" sldId="256"/>
-        </pc:sldMkLst>
-        <pc:spChg chg="mod">
-          <ac:chgData name="Roger Burek-Bors" userId="52318fc02a824a34" providerId="LiveId" clId="{6F86E068-8AAC-44F8-AFA9-D35EEACD5653}" dt="2021-03-11T17:41:05.254" v="96" actId="790"/>
-          <ac:spMkLst>
-            <pc:docMk/>
-            <pc:sldMk cId="109857222" sldId="256"/>
-            <ac:spMk id="11" creationId="{00CC22B5-8500-2C45-91DE-A596A6DF1C3B}"/>
-          </ac:spMkLst>
-        </pc:spChg>
-      </pc:sldChg>
-      <pc:sldChg chg="addSp delSp modSp mod">
-        <pc:chgData name="Roger Burek-Bors" userId="52318fc02a824a34" providerId="LiveId" clId="{6F86E068-8AAC-44F8-AFA9-D35EEACD5653}" dt="2021-03-11T19:08:34.666" v="305" actId="1076"/>
-        <pc:sldMkLst>
-          <pc:docMk/>
-          <pc:sldMk cId="116821060" sldId="268"/>
-        </pc:sldMkLst>
-        <pc:spChg chg="add del mod">
-          <ac:chgData name="Roger Burek-Bors" userId="52318fc02a824a34" providerId="LiveId" clId="{6F86E068-8AAC-44F8-AFA9-D35EEACD5653}" dt="2021-03-11T19:08:34.666" v="305" actId="1076"/>
-          <ac:spMkLst>
-            <pc:docMk/>
-            <pc:sldMk cId="116821060" sldId="268"/>
-            <ac:spMk id="2" creationId="{E8B8F26E-9345-4747-9094-972E38700A17}"/>
-          </ac:spMkLst>
-        </pc:spChg>
-      </pc:sldChg>
-      <pc:sldChg chg="modSp mod">
-        <pc:chgData name="Roger Burek-Bors" userId="52318fc02a824a34" providerId="LiveId" clId="{6F86E068-8AAC-44F8-AFA9-D35EEACD5653}" dt="2021-03-11T19:16:34.577" v="383" actId="790"/>
-        <pc:sldMkLst>
-          <pc:docMk/>
-          <pc:sldMk cId="1899016330" sldId="269"/>
-        </pc:sldMkLst>
-        <pc:spChg chg="mod">
-          <ac:chgData name="Roger Burek-Bors" userId="52318fc02a824a34" providerId="LiveId" clId="{6F86E068-8AAC-44F8-AFA9-D35EEACD5653}" dt="2021-03-11T19:16:34.577" v="383" actId="790"/>
-          <ac:spMkLst>
-            <pc:docMk/>
-            <pc:sldMk cId="1899016330" sldId="269"/>
-            <ac:spMk id="3" creationId="{CDC6F948-2F33-47A0-AE55-62E355ACC532}"/>
-          </ac:spMkLst>
-        </pc:spChg>
-      </pc:sldChg>
-      <pc:sldChg chg="modSp mod">
-        <pc:chgData name="Roger Burek-Bors" userId="52318fc02a824a34" providerId="LiveId" clId="{6F86E068-8AAC-44F8-AFA9-D35EEACD5653}" dt="2021-03-11T19:32:59.846" v="544" actId="790"/>
-        <pc:sldMkLst>
-          <pc:docMk/>
-          <pc:sldMk cId="4200854336" sldId="272"/>
-        </pc:sldMkLst>
-        <pc:spChg chg="mod">
-          <ac:chgData name="Roger Burek-Bors" userId="52318fc02a824a34" providerId="LiveId" clId="{6F86E068-8AAC-44F8-AFA9-D35EEACD5653}" dt="2021-03-11T19:32:59.846" v="544" actId="790"/>
-          <ac:spMkLst>
-            <pc:docMk/>
-            <pc:sldMk cId="4200854336" sldId="272"/>
-            <ac:spMk id="4" creationId="{F0FEE1CD-BF08-48FA-8526-5BEB92660675}"/>
-          </ac:spMkLst>
-        </pc:spChg>
-      </pc:sldChg>
-      <pc:sldChg chg="modSp mod">
-        <pc:chgData name="Roger Burek-Bors" userId="52318fc02a824a34" providerId="LiveId" clId="{6F86E068-8AAC-44F8-AFA9-D35EEACD5653}" dt="2021-03-11T19:09:39.378" v="327" actId="313"/>
-        <pc:sldMkLst>
-          <pc:docMk/>
-          <pc:sldMk cId="481083618" sldId="274"/>
-        </pc:sldMkLst>
-        <pc:spChg chg="mod">
-          <ac:chgData name="Roger Burek-Bors" userId="52318fc02a824a34" providerId="LiveId" clId="{6F86E068-8AAC-44F8-AFA9-D35EEACD5653}" dt="2021-03-11T19:09:39.378" v="327" actId="313"/>
-          <ac:spMkLst>
-            <pc:docMk/>
-            <pc:sldMk cId="481083618" sldId="274"/>
-            <ac:spMk id="3" creationId="{CDC6F948-2F33-47A0-AE55-62E355ACC532}"/>
-          </ac:spMkLst>
-        </pc:spChg>
-      </pc:sldChg>
-      <pc:sldChg chg="modSp mod">
-        <pc:chgData name="Roger Burek-Bors" userId="52318fc02a824a34" providerId="LiveId" clId="{6F86E068-8AAC-44F8-AFA9-D35EEACD5653}" dt="2021-03-11T19:32:48.687" v="543" actId="790"/>
-        <pc:sldMkLst>
-          <pc:docMk/>
-          <pc:sldMk cId="3679507724" sldId="278"/>
-        </pc:sldMkLst>
-        <pc:spChg chg="mod">
-          <ac:chgData name="Roger Burek-Bors" userId="52318fc02a824a34" providerId="LiveId" clId="{6F86E068-8AAC-44F8-AFA9-D35EEACD5653}" dt="2021-03-11T19:32:48.687" v="543" actId="790"/>
-          <ac:spMkLst>
-            <pc:docMk/>
-            <pc:sldMk cId="3679507724" sldId="278"/>
-            <ac:spMk id="4" creationId="{F0FEE1CD-BF08-48FA-8526-5BEB92660675}"/>
-          </ac:spMkLst>
-        </pc:spChg>
-      </pc:sldChg>
-      <pc:sldChg chg="modSp mod">
-        <pc:chgData name="Roger Burek-Bors" userId="52318fc02a824a34" providerId="LiveId" clId="{6F86E068-8AAC-44F8-AFA9-D35EEACD5653}" dt="2021-03-11T19:32:39.802" v="542" actId="790"/>
-        <pc:sldMkLst>
-          <pc:docMk/>
-          <pc:sldMk cId="2898413202" sldId="279"/>
-        </pc:sldMkLst>
-        <pc:spChg chg="mod">
-          <ac:chgData name="Roger Burek-Bors" userId="52318fc02a824a34" providerId="LiveId" clId="{6F86E068-8AAC-44F8-AFA9-D35EEACD5653}" dt="2021-03-11T19:32:39.802" v="542" actId="790"/>
-          <ac:spMkLst>
-            <pc:docMk/>
-            <pc:sldMk cId="2898413202" sldId="279"/>
-            <ac:spMk id="4" creationId="{F0FEE1CD-BF08-48FA-8526-5BEB92660675}"/>
-          </ac:spMkLst>
-        </pc:spChg>
-      </pc:sldChg>
-      <pc:sldChg chg="modSp mod">
-        <pc:chgData name="Roger Burek-Bors" userId="52318fc02a824a34" providerId="LiveId" clId="{6F86E068-8AAC-44F8-AFA9-D35EEACD5653}" dt="2021-03-11T19:32:29.618" v="541" actId="790"/>
-        <pc:sldMkLst>
-          <pc:docMk/>
-          <pc:sldMk cId="1290289446" sldId="280"/>
-        </pc:sldMkLst>
-        <pc:spChg chg="mod">
-          <ac:chgData name="Roger Burek-Bors" userId="52318fc02a824a34" providerId="LiveId" clId="{6F86E068-8AAC-44F8-AFA9-D35EEACD5653}" dt="2021-03-11T19:32:29.618" v="541" actId="790"/>
-          <ac:spMkLst>
-            <pc:docMk/>
-            <pc:sldMk cId="1290289446" sldId="280"/>
-            <ac:spMk id="4" creationId="{F0FEE1CD-BF08-48FA-8526-5BEB92660675}"/>
-          </ac:spMkLst>
-        </pc:spChg>
-      </pc:sldChg>
-      <pc:sldChg chg="modSp mod">
-        <pc:chgData name="Roger Burek-Bors" userId="52318fc02a824a34" providerId="LiveId" clId="{6F86E068-8AAC-44F8-AFA9-D35EEACD5653}" dt="2021-03-11T19:32:13.714" v="540" actId="790"/>
-        <pc:sldMkLst>
-          <pc:docMk/>
-          <pc:sldMk cId="3626305797" sldId="281"/>
-        </pc:sldMkLst>
-        <pc:spChg chg="mod">
-          <ac:chgData name="Roger Burek-Bors" userId="52318fc02a824a34" providerId="LiveId" clId="{6F86E068-8AAC-44F8-AFA9-D35EEACD5653}" dt="2021-03-11T19:32:13.714" v="540" actId="790"/>
-          <ac:spMkLst>
-            <pc:docMk/>
-            <pc:sldMk cId="3626305797" sldId="281"/>
-            <ac:spMk id="4" creationId="{F0FEE1CD-BF08-48FA-8526-5BEB92660675}"/>
-          </ac:spMkLst>
-        </pc:spChg>
-      </pc:sldChg>
-      <pc:sldChg chg="modSp mod">
-        <pc:chgData name="Roger Burek-Bors" userId="52318fc02a824a34" providerId="LiveId" clId="{6F86E068-8AAC-44F8-AFA9-D35EEACD5653}" dt="2021-03-11T19:34:18.717" v="575" actId="790"/>
-        <pc:sldMkLst>
-          <pc:docMk/>
-          <pc:sldMk cId="414061104" sldId="282"/>
-        </pc:sldMkLst>
-        <pc:spChg chg="mod">
-          <ac:chgData name="Roger Burek-Bors" userId="52318fc02a824a34" providerId="LiveId" clId="{6F86E068-8AAC-44F8-AFA9-D35EEACD5653}" dt="2021-03-11T19:34:18.717" v="575" actId="790"/>
-          <ac:spMkLst>
-            <pc:docMk/>
-            <pc:sldMk cId="414061104" sldId="282"/>
-            <ac:spMk id="4" creationId="{F0FEE1CD-BF08-48FA-8526-5BEB92660675}"/>
-          </ac:spMkLst>
-        </pc:spChg>
-        <pc:graphicFrameChg chg="mod">
-          <ac:chgData name="Roger Burek-Bors" userId="52318fc02a824a34" providerId="LiveId" clId="{6F86E068-8AAC-44F8-AFA9-D35EEACD5653}" dt="2021-03-11T19:22:28.351" v="390" actId="14100"/>
-          <ac:graphicFrameMkLst>
-            <pc:docMk/>
-            <pc:sldMk cId="414061104" sldId="282"/>
-            <ac:graphicFrameMk id="6" creationId="{0C73F6A4-BD75-466A-91C4-DC593C0E3E0D}"/>
-          </ac:graphicFrameMkLst>
-        </pc:graphicFrameChg>
-      </pc:sldChg>
-      <pc:sldChg chg="modSp mod">
-        <pc:chgData name="Roger Burek-Bors" userId="52318fc02a824a34" providerId="LiveId" clId="{6F86E068-8AAC-44F8-AFA9-D35EEACD5653}" dt="2021-03-11T19:35:55.876" v="636" actId="6549"/>
-        <pc:sldMkLst>
-          <pc:docMk/>
-          <pc:sldMk cId="2824837901" sldId="283"/>
-        </pc:sldMkLst>
-        <pc:spChg chg="mod">
-          <ac:chgData name="Roger Burek-Bors" userId="52318fc02a824a34" providerId="LiveId" clId="{6F86E068-8AAC-44F8-AFA9-D35EEACD5653}" dt="2021-03-11T19:35:55.876" v="636" actId="6549"/>
-          <ac:spMkLst>
-            <pc:docMk/>
-            <pc:sldMk cId="2824837901" sldId="283"/>
-            <ac:spMk id="3" creationId="{CDC6F948-2F33-47A0-AE55-62E355ACC532}"/>
-          </ac:spMkLst>
-        </pc:spChg>
       </pc:sldChg>
     </pc:docChg>
   </pc:docChgLst>
@@ -913,591 +914,6 @@
     </pc:docChg>
   </pc:docChgLst>
   <pc:docChgLst>
-    <pc:chgData name="Roger Burek-Bors" userId="52318fc02a824a34" providerId="LiveId" clId="{CE0CDD7B-C3A1-414A-9816-595488E1E4B6}"/>
-    <pc:docChg chg="undo custSel addSld modSld">
-      <pc:chgData name="Roger Burek-Bors" userId="52318fc02a824a34" providerId="LiveId" clId="{CE0CDD7B-C3A1-414A-9816-595488E1E4B6}" dt="2021-03-06T23:02:37.974" v="4491" actId="20577"/>
-      <pc:docMkLst>
-        <pc:docMk/>
-      </pc:docMkLst>
-      <pc:sldChg chg="modSp mod">
-        <pc:chgData name="Roger Burek-Bors" userId="52318fc02a824a34" providerId="LiveId" clId="{CE0CDD7B-C3A1-414A-9816-595488E1E4B6}" dt="2021-03-06T10:26:05.598" v="1214" actId="20577"/>
-        <pc:sldMkLst>
-          <pc:docMk/>
-          <pc:sldMk cId="109857222" sldId="256"/>
-        </pc:sldMkLst>
-        <pc:spChg chg="mod">
-          <ac:chgData name="Roger Burek-Bors" userId="52318fc02a824a34" providerId="LiveId" clId="{CE0CDD7B-C3A1-414A-9816-595488E1E4B6}" dt="2021-03-06T10:26:05.598" v="1214" actId="20577"/>
-          <ac:spMkLst>
-            <pc:docMk/>
-            <pc:sldMk cId="109857222" sldId="256"/>
-            <ac:spMk id="11" creationId="{00CC22B5-8500-2C45-91DE-A596A6DF1C3B}"/>
-          </ac:spMkLst>
-        </pc:spChg>
-      </pc:sldChg>
-      <pc:sldChg chg="addSp delSp modSp new mod">
-        <pc:chgData name="Roger Burek-Bors" userId="52318fc02a824a34" providerId="LiveId" clId="{CE0CDD7B-C3A1-414A-9816-595488E1E4B6}" dt="2021-03-06T22:17:29.718" v="4022" actId="20577"/>
-        <pc:sldMkLst>
-          <pc:docMk/>
-          <pc:sldMk cId="1899016330" sldId="269"/>
-        </pc:sldMkLst>
-        <pc:spChg chg="del">
-          <ac:chgData name="Roger Burek-Bors" userId="52318fc02a824a34" providerId="LiveId" clId="{CE0CDD7B-C3A1-414A-9816-595488E1E4B6}" dt="2021-03-06T08:16:46.801" v="2" actId="478"/>
-          <ac:spMkLst>
-            <pc:docMk/>
-            <pc:sldMk cId="1899016330" sldId="269"/>
-            <ac:spMk id="2" creationId="{2050F080-7170-4879-B84F-2D5EC65696CB}"/>
-          </ac:spMkLst>
-        </pc:spChg>
-        <pc:spChg chg="mod">
-          <ac:chgData name="Roger Burek-Bors" userId="52318fc02a824a34" providerId="LiveId" clId="{CE0CDD7B-C3A1-414A-9816-595488E1E4B6}" dt="2021-03-06T22:17:29.718" v="4022" actId="20577"/>
-          <ac:spMkLst>
-            <pc:docMk/>
-            <pc:sldMk cId="1899016330" sldId="269"/>
-            <ac:spMk id="3" creationId="{CDC6F948-2F33-47A0-AE55-62E355ACC532}"/>
-          </ac:spMkLst>
-        </pc:spChg>
-        <pc:spChg chg="add mod">
-          <ac:chgData name="Roger Burek-Bors" userId="52318fc02a824a34" providerId="LiveId" clId="{CE0CDD7B-C3A1-414A-9816-595488E1E4B6}" dt="2021-03-06T08:18:13.808" v="19"/>
-          <ac:spMkLst>
-            <pc:docMk/>
-            <pc:sldMk cId="1899016330" sldId="269"/>
-            <ac:spMk id="4" creationId="{F0FEE1CD-BF08-48FA-8526-5BEB92660675}"/>
-          </ac:spMkLst>
-        </pc:spChg>
-      </pc:sldChg>
-      <pc:sldChg chg="modSp add mod">
-        <pc:chgData name="Roger Burek-Bors" userId="52318fc02a824a34" providerId="LiveId" clId="{CE0CDD7B-C3A1-414A-9816-595488E1E4B6}" dt="2021-03-06T08:59:48.309" v="330" actId="790"/>
-        <pc:sldMkLst>
-          <pc:docMk/>
-          <pc:sldMk cId="1384039938" sldId="270"/>
-        </pc:sldMkLst>
-        <pc:spChg chg="mod">
-          <ac:chgData name="Roger Burek-Bors" userId="52318fc02a824a34" providerId="LiveId" clId="{CE0CDD7B-C3A1-414A-9816-595488E1E4B6}" dt="2021-03-06T08:59:48.309" v="330" actId="790"/>
-          <ac:spMkLst>
-            <pc:docMk/>
-            <pc:sldMk cId="1384039938" sldId="270"/>
-            <ac:spMk id="3" creationId="{CDC6F948-2F33-47A0-AE55-62E355ACC532}"/>
-          </ac:spMkLst>
-        </pc:spChg>
-        <pc:spChg chg="mod">
-          <ac:chgData name="Roger Burek-Bors" userId="52318fc02a824a34" providerId="LiveId" clId="{CE0CDD7B-C3A1-414A-9816-595488E1E4B6}" dt="2021-03-06T08:18:30.018" v="20"/>
-          <ac:spMkLst>
-            <pc:docMk/>
-            <pc:sldMk cId="1384039938" sldId="270"/>
-            <ac:spMk id="4" creationId="{F0FEE1CD-BF08-48FA-8526-5BEB92660675}"/>
-          </ac:spMkLst>
-        </pc:spChg>
-      </pc:sldChg>
-      <pc:sldChg chg="modSp add mod">
-        <pc:chgData name="Roger Burek-Bors" userId="52318fc02a824a34" providerId="LiveId" clId="{CE0CDD7B-C3A1-414A-9816-595488E1E4B6}" dt="2021-03-06T10:59:18.865" v="1401" actId="790"/>
-        <pc:sldMkLst>
-          <pc:docMk/>
-          <pc:sldMk cId="3712518515" sldId="271"/>
-        </pc:sldMkLst>
-        <pc:spChg chg="mod">
-          <ac:chgData name="Roger Burek-Bors" userId="52318fc02a824a34" providerId="LiveId" clId="{CE0CDD7B-C3A1-414A-9816-595488E1E4B6}" dt="2021-03-06T10:59:18.865" v="1401" actId="790"/>
-          <ac:spMkLst>
-            <pc:docMk/>
-            <pc:sldMk cId="3712518515" sldId="271"/>
-            <ac:spMk id="3" creationId="{CDC6F948-2F33-47A0-AE55-62E355ACC532}"/>
-          </ac:spMkLst>
-        </pc:spChg>
-        <pc:spChg chg="mod">
-          <ac:chgData name="Roger Burek-Bors" userId="52318fc02a824a34" providerId="LiveId" clId="{CE0CDD7B-C3A1-414A-9816-595488E1E4B6}" dt="2021-03-06T08:18:38.911" v="21"/>
-          <ac:spMkLst>
-            <pc:docMk/>
-            <pc:sldMk cId="3712518515" sldId="271"/>
-            <ac:spMk id="4" creationId="{F0FEE1CD-BF08-48FA-8526-5BEB92660675}"/>
-          </ac:spMkLst>
-        </pc:spChg>
-      </pc:sldChg>
-      <pc:sldChg chg="addSp modSp add mod">
-        <pc:chgData name="Roger Burek-Bors" userId="52318fc02a824a34" providerId="LiveId" clId="{CE0CDD7B-C3A1-414A-9816-595488E1E4B6}" dt="2021-03-06T20:40:13.980" v="1926" actId="20577"/>
-        <pc:sldMkLst>
-          <pc:docMk/>
-          <pc:sldMk cId="4200854336" sldId="272"/>
-        </pc:sldMkLst>
-        <pc:spChg chg="mod">
-          <ac:chgData name="Roger Burek-Bors" userId="52318fc02a824a34" providerId="LiveId" clId="{CE0CDD7B-C3A1-414A-9816-595488E1E4B6}" dt="2021-03-06T20:40:13.980" v="1926" actId="20577"/>
-          <ac:spMkLst>
-            <pc:docMk/>
-            <pc:sldMk cId="4200854336" sldId="272"/>
-            <ac:spMk id="3" creationId="{CDC6F948-2F33-47A0-AE55-62E355ACC532}"/>
-          </ac:spMkLst>
-        </pc:spChg>
-        <pc:spChg chg="mod">
-          <ac:chgData name="Roger Burek-Bors" userId="52318fc02a824a34" providerId="LiveId" clId="{CE0CDD7B-C3A1-414A-9816-595488E1E4B6}" dt="2021-03-06T10:27:18.728" v="1223" actId="20577"/>
-          <ac:spMkLst>
-            <pc:docMk/>
-            <pc:sldMk cId="4200854336" sldId="272"/>
-            <ac:spMk id="4" creationId="{F0FEE1CD-BF08-48FA-8526-5BEB92660675}"/>
-          </ac:spMkLst>
-        </pc:spChg>
-        <pc:spChg chg="add mod">
-          <ac:chgData name="Roger Burek-Bors" userId="52318fc02a824a34" providerId="LiveId" clId="{CE0CDD7B-C3A1-414A-9816-595488E1E4B6}" dt="2021-03-06T20:27:56.070" v="1459" actId="122"/>
-          <ac:spMkLst>
-            <pc:docMk/>
-            <pc:sldMk cId="4200854336" sldId="272"/>
-            <ac:spMk id="8" creationId="{3E00D818-545B-486D-93DE-99A9F6CB2B69}"/>
-          </ac:spMkLst>
-        </pc:spChg>
-        <pc:spChg chg="add mod">
-          <ac:chgData name="Roger Burek-Bors" userId="52318fc02a824a34" providerId="LiveId" clId="{CE0CDD7B-C3A1-414A-9816-595488E1E4B6}" dt="2021-03-06T20:28:37.867" v="1481" actId="20577"/>
-          <ac:spMkLst>
-            <pc:docMk/>
-            <pc:sldMk cId="4200854336" sldId="272"/>
-            <ac:spMk id="9" creationId="{F523BA9E-3D67-441D-9B1C-80CEA39F5E2C}"/>
-          </ac:spMkLst>
-        </pc:spChg>
-        <pc:picChg chg="add mod">
-          <ac:chgData name="Roger Burek-Bors" userId="52318fc02a824a34" providerId="LiveId" clId="{CE0CDD7B-C3A1-414A-9816-595488E1E4B6}" dt="2021-03-06T20:27:05.116" v="1413" actId="14100"/>
-          <ac:picMkLst>
-            <pc:docMk/>
-            <pc:sldMk cId="4200854336" sldId="272"/>
-            <ac:picMk id="5" creationId="{E04AD88E-AB73-4501-BA1F-20A03346571A}"/>
-          </ac:picMkLst>
-        </pc:picChg>
-        <pc:picChg chg="add mod">
-          <ac:chgData name="Roger Burek-Bors" userId="52318fc02a824a34" providerId="LiveId" clId="{CE0CDD7B-C3A1-414A-9816-595488E1E4B6}" dt="2021-03-06T20:26:58.032" v="1411" actId="1076"/>
-          <ac:picMkLst>
-            <pc:docMk/>
-            <pc:sldMk cId="4200854336" sldId="272"/>
-            <ac:picMk id="7" creationId="{4B03E726-EE28-4C6F-B7B4-87B349369EB5}"/>
-          </ac:picMkLst>
-        </pc:picChg>
-      </pc:sldChg>
-      <pc:sldChg chg="modSp add mod">
-        <pc:chgData name="Roger Burek-Bors" userId="52318fc02a824a34" providerId="LiveId" clId="{CE0CDD7B-C3A1-414A-9816-595488E1E4B6}" dt="2021-03-06T22:22:50.552" v="4398" actId="1076"/>
-        <pc:sldMkLst>
-          <pc:docMk/>
-          <pc:sldMk cId="3497837162" sldId="273"/>
-        </pc:sldMkLst>
-        <pc:spChg chg="mod">
-          <ac:chgData name="Roger Burek-Bors" userId="52318fc02a824a34" providerId="LiveId" clId="{CE0CDD7B-C3A1-414A-9816-595488E1E4B6}" dt="2021-03-06T22:22:50.552" v="4398" actId="1076"/>
-          <ac:spMkLst>
-            <pc:docMk/>
-            <pc:sldMk cId="3497837162" sldId="273"/>
-            <ac:spMk id="3" creationId="{CDC6F948-2F33-47A0-AE55-62E355ACC532}"/>
-          </ac:spMkLst>
-        </pc:spChg>
-        <pc:spChg chg="mod">
-          <ac:chgData name="Roger Burek-Bors" userId="52318fc02a824a34" providerId="LiveId" clId="{CE0CDD7B-C3A1-414A-9816-595488E1E4B6}" dt="2021-03-06T08:19:04.168" v="23"/>
-          <ac:spMkLst>
-            <pc:docMk/>
-            <pc:sldMk cId="3497837162" sldId="273"/>
-            <ac:spMk id="4" creationId="{F0FEE1CD-BF08-48FA-8526-5BEB92660675}"/>
-          </ac:spMkLst>
-        </pc:spChg>
-      </pc:sldChg>
-      <pc:sldChg chg="modSp add mod">
-        <pc:chgData name="Roger Burek-Bors" userId="52318fc02a824a34" providerId="LiveId" clId="{CE0CDD7B-C3A1-414A-9816-595488E1E4B6}" dt="2021-03-06T23:02:37.974" v="4491" actId="20577"/>
-        <pc:sldMkLst>
-          <pc:docMk/>
-          <pc:sldMk cId="481083618" sldId="274"/>
-        </pc:sldMkLst>
-        <pc:spChg chg="mod">
-          <ac:chgData name="Roger Burek-Bors" userId="52318fc02a824a34" providerId="LiveId" clId="{CE0CDD7B-C3A1-414A-9816-595488E1E4B6}" dt="2021-03-06T23:02:37.974" v="4491" actId="20577"/>
-          <ac:spMkLst>
-            <pc:docMk/>
-            <pc:sldMk cId="481083618" sldId="274"/>
-            <ac:spMk id="3" creationId="{CDC6F948-2F33-47A0-AE55-62E355ACC532}"/>
-          </ac:spMkLst>
-        </pc:spChg>
-        <pc:spChg chg="mod">
-          <ac:chgData name="Roger Burek-Bors" userId="52318fc02a824a34" providerId="LiveId" clId="{CE0CDD7B-C3A1-414A-9816-595488E1E4B6}" dt="2021-03-06T10:34:49.377" v="1256" actId="20577"/>
-          <ac:spMkLst>
-            <pc:docMk/>
-            <pc:sldMk cId="481083618" sldId="274"/>
-            <ac:spMk id="4" creationId="{F0FEE1CD-BF08-48FA-8526-5BEB92660675}"/>
-          </ac:spMkLst>
-        </pc:spChg>
-      </pc:sldChg>
-      <pc:sldChg chg="addSp modSp add mod">
-        <pc:chgData name="Roger Burek-Bors" userId="52318fc02a824a34" providerId="LiveId" clId="{CE0CDD7B-C3A1-414A-9816-595488E1E4B6}" dt="2021-03-06T09:50:28.173" v="917" actId="20577"/>
-        <pc:sldMkLst>
-          <pc:docMk/>
-          <pc:sldMk cId="2276711680" sldId="275"/>
-        </pc:sldMkLst>
-        <pc:spChg chg="mod">
-          <ac:chgData name="Roger Burek-Bors" userId="52318fc02a824a34" providerId="LiveId" clId="{CE0CDD7B-C3A1-414A-9816-595488E1E4B6}" dt="2021-03-06T09:48:39.949" v="908" actId="20577"/>
-          <ac:spMkLst>
-            <pc:docMk/>
-            <pc:sldMk cId="2276711680" sldId="275"/>
-            <ac:spMk id="3" creationId="{CDC6F948-2F33-47A0-AE55-62E355ACC532}"/>
-          </ac:spMkLst>
-        </pc:spChg>
-        <pc:spChg chg="mod">
-          <ac:chgData name="Roger Burek-Bors" userId="52318fc02a824a34" providerId="LiveId" clId="{CE0CDD7B-C3A1-414A-9816-595488E1E4B6}" dt="2021-03-06T09:50:28.173" v="917" actId="20577"/>
-          <ac:spMkLst>
-            <pc:docMk/>
-            <pc:sldMk cId="2276711680" sldId="275"/>
-            <ac:spMk id="4" creationId="{F0FEE1CD-BF08-48FA-8526-5BEB92660675}"/>
-          </ac:spMkLst>
-        </pc:spChg>
-        <pc:picChg chg="add mod">
-          <ac:chgData name="Roger Burek-Bors" userId="52318fc02a824a34" providerId="LiveId" clId="{CE0CDD7B-C3A1-414A-9816-595488E1E4B6}" dt="2021-03-06T09:28:27.934" v="419" actId="1038"/>
-          <ac:picMkLst>
-            <pc:docMk/>
-            <pc:sldMk cId="2276711680" sldId="275"/>
-            <ac:picMk id="5" creationId="{9C092213-4A86-436C-8C28-7631B5B29EBE}"/>
-          </ac:picMkLst>
-        </pc:picChg>
-      </pc:sldChg>
-      <pc:sldChg chg="modSp add mod">
-        <pc:chgData name="Roger Burek-Bors" userId="52318fc02a824a34" providerId="LiveId" clId="{CE0CDD7B-C3A1-414A-9816-595488E1E4B6}" dt="2021-03-06T09:20:47.535" v="378" actId="12"/>
-        <pc:sldMkLst>
-          <pc:docMk/>
-          <pc:sldMk cId="3201505257" sldId="276"/>
-        </pc:sldMkLst>
-        <pc:spChg chg="mod">
-          <ac:chgData name="Roger Burek-Bors" userId="52318fc02a824a34" providerId="LiveId" clId="{CE0CDD7B-C3A1-414A-9816-595488E1E4B6}" dt="2021-03-06T09:20:47.535" v="378" actId="12"/>
-          <ac:spMkLst>
-            <pc:docMk/>
-            <pc:sldMk cId="3201505257" sldId="276"/>
-            <ac:spMk id="3" creationId="{CDC6F948-2F33-47A0-AE55-62E355ACC532}"/>
-          </ac:spMkLst>
-        </pc:spChg>
-        <pc:spChg chg="mod">
-          <ac:chgData name="Roger Burek-Bors" userId="52318fc02a824a34" providerId="LiveId" clId="{CE0CDD7B-C3A1-414A-9816-595488E1E4B6}" dt="2021-03-06T09:15:08.698" v="373" actId="790"/>
-          <ac:spMkLst>
-            <pc:docMk/>
-            <pc:sldMk cId="3201505257" sldId="276"/>
-            <ac:spMk id="4" creationId="{F0FEE1CD-BF08-48FA-8526-5BEB92660675}"/>
-          </ac:spMkLst>
-        </pc:spChg>
-      </pc:sldChg>
-      <pc:sldChg chg="addSp delSp modSp add mod">
-        <pc:chgData name="Roger Burek-Bors" userId="52318fc02a824a34" providerId="LiveId" clId="{CE0CDD7B-C3A1-414A-9816-595488E1E4B6}" dt="2021-03-06T10:16:30.686" v="1210" actId="1035"/>
-        <pc:sldMkLst>
-          <pc:docMk/>
-          <pc:sldMk cId="1898627169" sldId="277"/>
-        </pc:sldMkLst>
-        <pc:spChg chg="mod">
-          <ac:chgData name="Roger Burek-Bors" userId="52318fc02a824a34" providerId="LiveId" clId="{CE0CDD7B-C3A1-414A-9816-595488E1E4B6}" dt="2021-03-06T10:15:59.491" v="1203" actId="1035"/>
-          <ac:spMkLst>
-            <pc:docMk/>
-            <pc:sldMk cId="1898627169" sldId="277"/>
-            <ac:spMk id="3" creationId="{CDC6F948-2F33-47A0-AE55-62E355ACC532}"/>
-          </ac:spMkLst>
-        </pc:spChg>
-        <pc:spChg chg="mod">
-          <ac:chgData name="Roger Burek-Bors" userId="52318fc02a824a34" providerId="LiveId" clId="{CE0CDD7B-C3A1-414A-9816-595488E1E4B6}" dt="2021-03-06T09:50:54.452" v="944" actId="20577"/>
-          <ac:spMkLst>
-            <pc:docMk/>
-            <pc:sldMk cId="1898627169" sldId="277"/>
-            <ac:spMk id="4" creationId="{F0FEE1CD-BF08-48FA-8526-5BEB92660675}"/>
-          </ac:spMkLst>
-        </pc:spChg>
-        <pc:spChg chg="add mod">
-          <ac:chgData name="Roger Burek-Bors" userId="52318fc02a824a34" providerId="LiveId" clId="{CE0CDD7B-C3A1-414A-9816-595488E1E4B6}" dt="2021-03-06T10:16:21.239" v="1208" actId="1036"/>
-          <ac:spMkLst>
-            <pc:docMk/>
-            <pc:sldMk cId="1898627169" sldId="277"/>
-            <ac:spMk id="9" creationId="{86890FC7-D71E-464F-A6EE-FA5C8A0939D1}"/>
-          </ac:spMkLst>
-        </pc:spChg>
-        <pc:spChg chg="add mod">
-          <ac:chgData name="Roger Burek-Bors" userId="52318fc02a824a34" providerId="LiveId" clId="{CE0CDD7B-C3A1-414A-9816-595488E1E4B6}" dt="2021-03-06T10:15:59.491" v="1203" actId="1035"/>
-          <ac:spMkLst>
-            <pc:docMk/>
-            <pc:sldMk cId="1898627169" sldId="277"/>
-            <ac:spMk id="10" creationId="{B0F8B1CA-463D-4F6F-8873-0953CDF30F82}"/>
-          </ac:spMkLst>
-        </pc:spChg>
-        <pc:spChg chg="add mod">
-          <ac:chgData name="Roger Burek-Bors" userId="52318fc02a824a34" providerId="LiveId" clId="{CE0CDD7B-C3A1-414A-9816-595488E1E4B6}" dt="2021-03-06T10:15:49.443" v="1200" actId="1036"/>
-          <ac:spMkLst>
-            <pc:docMk/>
-            <pc:sldMk cId="1898627169" sldId="277"/>
-            <ac:spMk id="11" creationId="{6E73E28B-7C40-4E48-B144-F4D992B71A59}"/>
-          </ac:spMkLst>
-        </pc:spChg>
-        <pc:picChg chg="del">
-          <ac:chgData name="Roger Burek-Bors" userId="52318fc02a824a34" providerId="LiveId" clId="{CE0CDD7B-C3A1-414A-9816-595488E1E4B6}" dt="2021-03-06T09:52:36.390" v="945" actId="478"/>
-          <ac:picMkLst>
-            <pc:docMk/>
-            <pc:sldMk cId="1898627169" sldId="277"/>
-            <ac:picMk id="5" creationId="{9C092213-4A86-436C-8C28-7631B5B29EBE}"/>
-          </ac:picMkLst>
-        </pc:picChg>
-        <pc:picChg chg="add mod">
-          <ac:chgData name="Roger Burek-Bors" userId="52318fc02a824a34" providerId="LiveId" clId="{CE0CDD7B-C3A1-414A-9816-595488E1E4B6}" dt="2021-03-06T10:15:59.491" v="1203" actId="1035"/>
-          <ac:picMkLst>
-            <pc:docMk/>
-            <pc:sldMk cId="1898627169" sldId="277"/>
-            <ac:picMk id="6" creationId="{025EA7C1-B980-4A2B-BF56-F74CFE5975A9}"/>
-          </ac:picMkLst>
-        </pc:picChg>
-        <pc:picChg chg="add mod">
-          <ac:chgData name="Roger Burek-Bors" userId="52318fc02a824a34" providerId="LiveId" clId="{CE0CDD7B-C3A1-414A-9816-595488E1E4B6}" dt="2021-03-06T10:16:30.686" v="1210" actId="1035"/>
-          <ac:picMkLst>
-            <pc:docMk/>
-            <pc:sldMk cId="1898627169" sldId="277"/>
-            <ac:picMk id="8" creationId="{D89AD308-79D0-4F5B-9860-504B18E3E720}"/>
-          </ac:picMkLst>
-        </pc:picChg>
-      </pc:sldChg>
-      <pc:sldChg chg="addSp modSp add mod">
-        <pc:chgData name="Roger Burek-Bors" userId="52318fc02a824a34" providerId="LiveId" clId="{CE0CDD7B-C3A1-414A-9816-595488E1E4B6}" dt="2021-03-06T21:19:05.900" v="2438" actId="6549"/>
-        <pc:sldMkLst>
-          <pc:docMk/>
-          <pc:sldMk cId="3679507724" sldId="278"/>
-        </pc:sldMkLst>
-        <pc:spChg chg="mod">
-          <ac:chgData name="Roger Burek-Bors" userId="52318fc02a824a34" providerId="LiveId" clId="{CE0CDD7B-C3A1-414A-9816-595488E1E4B6}" dt="2021-03-06T21:19:05.900" v="2438" actId="6549"/>
-          <ac:spMkLst>
-            <pc:docMk/>
-            <pc:sldMk cId="3679507724" sldId="278"/>
-            <ac:spMk id="3" creationId="{CDC6F948-2F33-47A0-AE55-62E355ACC532}"/>
-          </ac:spMkLst>
-        </pc:spChg>
-        <pc:spChg chg="mod">
-          <ac:chgData name="Roger Burek-Bors" userId="52318fc02a824a34" providerId="LiveId" clId="{CE0CDD7B-C3A1-414A-9816-595488E1E4B6}" dt="2021-03-06T10:27:58.947" v="1230" actId="20577"/>
-          <ac:spMkLst>
-            <pc:docMk/>
-            <pc:sldMk cId="3679507724" sldId="278"/>
-            <ac:spMk id="4" creationId="{F0FEE1CD-BF08-48FA-8526-5BEB92660675}"/>
-          </ac:spMkLst>
-        </pc:spChg>
-        <pc:picChg chg="add mod">
-          <ac:chgData name="Roger Burek-Bors" userId="52318fc02a824a34" providerId="LiveId" clId="{CE0CDD7B-C3A1-414A-9816-595488E1E4B6}" dt="2021-03-06T20:53:22.625" v="2012" actId="14100"/>
-          <ac:picMkLst>
-            <pc:docMk/>
-            <pc:sldMk cId="3679507724" sldId="278"/>
-            <ac:picMk id="5" creationId="{98E0585E-FC03-49DA-9084-1FECF72001CC}"/>
-          </ac:picMkLst>
-        </pc:picChg>
-      </pc:sldChg>
-      <pc:sldChg chg="modSp add mod">
-        <pc:chgData name="Roger Burek-Bors" userId="52318fc02a824a34" providerId="LiveId" clId="{CE0CDD7B-C3A1-414A-9816-595488E1E4B6}" dt="2021-03-06T21:28:40.172" v="2816" actId="20577"/>
-        <pc:sldMkLst>
-          <pc:docMk/>
-          <pc:sldMk cId="2898413202" sldId="279"/>
-        </pc:sldMkLst>
-        <pc:spChg chg="mod">
-          <ac:chgData name="Roger Burek-Bors" userId="52318fc02a824a34" providerId="LiveId" clId="{CE0CDD7B-C3A1-414A-9816-595488E1E4B6}" dt="2021-03-06T21:28:40.172" v="2816" actId="20577"/>
-          <ac:spMkLst>
-            <pc:docMk/>
-            <pc:sldMk cId="2898413202" sldId="279"/>
-            <ac:spMk id="3" creationId="{CDC6F948-2F33-47A0-AE55-62E355ACC532}"/>
-          </ac:spMkLst>
-        </pc:spChg>
-        <pc:spChg chg="mod">
-          <ac:chgData name="Roger Burek-Bors" userId="52318fc02a824a34" providerId="LiveId" clId="{CE0CDD7B-C3A1-414A-9816-595488E1E4B6}" dt="2021-03-06T10:28:03.831" v="1232" actId="20577"/>
-          <ac:spMkLst>
-            <pc:docMk/>
-            <pc:sldMk cId="2898413202" sldId="279"/>
-            <ac:spMk id="4" creationId="{F0FEE1CD-BF08-48FA-8526-5BEB92660675}"/>
-          </ac:spMkLst>
-        </pc:spChg>
-      </pc:sldChg>
-      <pc:sldChg chg="addSp delSp modSp add mod">
-        <pc:chgData name="Roger Burek-Bors" userId="52318fc02a824a34" providerId="LiveId" clId="{CE0CDD7B-C3A1-414A-9816-595488E1E4B6}" dt="2021-03-06T21:52:35.375" v="2907" actId="14100"/>
-        <pc:sldMkLst>
-          <pc:docMk/>
-          <pc:sldMk cId="1290289446" sldId="280"/>
-        </pc:sldMkLst>
-        <pc:spChg chg="del">
-          <ac:chgData name="Roger Burek-Bors" userId="52318fc02a824a34" providerId="LiveId" clId="{CE0CDD7B-C3A1-414A-9816-595488E1E4B6}" dt="2021-03-06T21:31:17.465" v="2817" actId="478"/>
-          <ac:spMkLst>
-            <pc:docMk/>
-            <pc:sldMk cId="1290289446" sldId="280"/>
-            <ac:spMk id="3" creationId="{CDC6F948-2F33-47A0-AE55-62E355ACC532}"/>
-          </ac:spMkLst>
-        </pc:spChg>
-        <pc:spChg chg="mod">
-          <ac:chgData name="Roger Burek-Bors" userId="52318fc02a824a34" providerId="LiveId" clId="{CE0CDD7B-C3A1-414A-9816-595488E1E4B6}" dt="2021-03-06T10:28:07.441" v="1234" actId="20577"/>
-          <ac:spMkLst>
-            <pc:docMk/>
-            <pc:sldMk cId="1290289446" sldId="280"/>
-            <ac:spMk id="4" creationId="{F0FEE1CD-BF08-48FA-8526-5BEB92660675}"/>
-          </ac:spMkLst>
-        </pc:spChg>
-        <pc:picChg chg="add mod">
-          <ac:chgData name="Roger Burek-Bors" userId="52318fc02a824a34" providerId="LiveId" clId="{CE0CDD7B-C3A1-414A-9816-595488E1E4B6}" dt="2021-03-06T21:52:35.375" v="2907" actId="14100"/>
-          <ac:picMkLst>
-            <pc:docMk/>
-            <pc:sldMk cId="1290289446" sldId="280"/>
-            <ac:picMk id="5" creationId="{DCE17B6A-718D-45CF-909E-9EB4347067BD}"/>
-          </ac:picMkLst>
-        </pc:picChg>
-        <pc:picChg chg="add mod">
-          <ac:chgData name="Roger Burek-Bors" userId="52318fc02a824a34" providerId="LiveId" clId="{CE0CDD7B-C3A1-414A-9816-595488E1E4B6}" dt="2021-03-06T21:38:53.794" v="2825" actId="1076"/>
-          <ac:picMkLst>
-            <pc:docMk/>
-            <pc:sldMk cId="1290289446" sldId="280"/>
-            <ac:picMk id="7" creationId="{74B6F8BA-D934-4B67-8EBE-F760E171C1DB}"/>
-          </ac:picMkLst>
-        </pc:picChg>
-        <pc:picChg chg="add mod">
-          <ac:chgData name="Roger Burek-Bors" userId="52318fc02a824a34" providerId="LiveId" clId="{CE0CDD7B-C3A1-414A-9816-595488E1E4B6}" dt="2021-03-06T21:39:16.908" v="2830" actId="14100"/>
-          <ac:picMkLst>
-            <pc:docMk/>
-            <pc:sldMk cId="1290289446" sldId="280"/>
-            <ac:picMk id="9" creationId="{8BCFA284-C68A-4565-B96D-D6012DAD4993}"/>
-          </ac:picMkLst>
-        </pc:picChg>
-        <pc:picChg chg="add mod">
-          <ac:chgData name="Roger Burek-Bors" userId="52318fc02a824a34" providerId="LiveId" clId="{CE0CDD7B-C3A1-414A-9816-595488E1E4B6}" dt="2021-03-06T21:52:28.253" v="2906" actId="1076"/>
-          <ac:picMkLst>
-            <pc:docMk/>
-            <pc:sldMk cId="1290289446" sldId="280"/>
-            <ac:picMk id="11" creationId="{3B299F46-81F4-4196-A257-5297C1A42360}"/>
-          </ac:picMkLst>
-        </pc:picChg>
-        <pc:picChg chg="add mod">
-          <ac:chgData name="Roger Burek-Bors" userId="52318fc02a824a34" providerId="LiveId" clId="{CE0CDD7B-C3A1-414A-9816-595488E1E4B6}" dt="2021-03-06T21:52:04.552" v="2895" actId="1035"/>
-          <ac:picMkLst>
-            <pc:docMk/>
-            <pc:sldMk cId="1290289446" sldId="280"/>
-            <ac:picMk id="13" creationId="{EF606B0A-43BE-430F-A5D5-B106AF7572AA}"/>
-          </ac:picMkLst>
-        </pc:picChg>
-        <pc:picChg chg="add mod">
-          <ac:chgData name="Roger Burek-Bors" userId="52318fc02a824a34" providerId="LiveId" clId="{CE0CDD7B-C3A1-414A-9816-595488E1E4B6}" dt="2021-03-06T21:52:14.994" v="2904" actId="1076"/>
-          <ac:picMkLst>
-            <pc:docMk/>
-            <pc:sldMk cId="1290289446" sldId="280"/>
-            <ac:picMk id="15" creationId="{9EBC8CDE-7985-4438-8414-61613270DF62}"/>
-          </ac:picMkLst>
-        </pc:picChg>
-        <pc:picChg chg="add mod">
-          <ac:chgData name="Roger Burek-Bors" userId="52318fc02a824a34" providerId="LiveId" clId="{CE0CDD7B-C3A1-414A-9816-595488E1E4B6}" dt="2021-03-06T21:48:56.253" v="2855" actId="1076"/>
-          <ac:picMkLst>
-            <pc:docMk/>
-            <pc:sldMk cId="1290289446" sldId="280"/>
-            <ac:picMk id="17" creationId="{9CE373F2-B6EB-4F66-A022-E6C1073E6E17}"/>
-          </ac:picMkLst>
-        </pc:picChg>
-        <pc:picChg chg="add mod">
-          <ac:chgData name="Roger Burek-Bors" userId="52318fc02a824a34" providerId="LiveId" clId="{CE0CDD7B-C3A1-414A-9816-595488E1E4B6}" dt="2021-03-06T21:48:49.029" v="2854" actId="1076"/>
-          <ac:picMkLst>
-            <pc:docMk/>
-            <pc:sldMk cId="1290289446" sldId="280"/>
-            <ac:picMk id="19" creationId="{2AC43E6A-EF41-4406-8345-E883118028B4}"/>
-          </ac:picMkLst>
-        </pc:picChg>
-        <pc:picChg chg="add mod">
-          <ac:chgData name="Roger Burek-Bors" userId="52318fc02a824a34" providerId="LiveId" clId="{CE0CDD7B-C3A1-414A-9816-595488E1E4B6}" dt="2021-03-06T21:52:14.994" v="2904" actId="1076"/>
-          <ac:picMkLst>
-            <pc:docMk/>
-            <pc:sldMk cId="1290289446" sldId="280"/>
-            <ac:picMk id="21" creationId="{B1EF41AE-55C4-466E-BB0D-966D553CA48D}"/>
-          </ac:picMkLst>
-        </pc:picChg>
-        <pc:picChg chg="add mod">
-          <ac:chgData name="Roger Burek-Bors" userId="52318fc02a824a34" providerId="LiveId" clId="{CE0CDD7B-C3A1-414A-9816-595488E1E4B6}" dt="2021-03-06T21:52:04.552" v="2895" actId="1035"/>
-          <ac:picMkLst>
-            <pc:docMk/>
-            <pc:sldMk cId="1290289446" sldId="280"/>
-            <ac:picMk id="23" creationId="{4D30FDC5-05B4-48EA-9CC7-95299F4E793C}"/>
-          </ac:picMkLst>
-        </pc:picChg>
-        <pc:picChg chg="add mod">
-          <ac:chgData name="Roger Burek-Bors" userId="52318fc02a824a34" providerId="LiveId" clId="{CE0CDD7B-C3A1-414A-9816-595488E1E4B6}" dt="2021-03-06T21:52:28.253" v="2906" actId="1076"/>
-          <ac:picMkLst>
-            <pc:docMk/>
-            <pc:sldMk cId="1290289446" sldId="280"/>
-            <ac:picMk id="25" creationId="{67823BE7-DD39-4020-85C3-2807ACF36B1F}"/>
-          </ac:picMkLst>
-        </pc:picChg>
-      </pc:sldChg>
-      <pc:sldChg chg="addSp delSp modSp add mod">
-        <pc:chgData name="Roger Burek-Bors" userId="52318fc02a824a34" providerId="LiveId" clId="{CE0CDD7B-C3A1-414A-9816-595488E1E4B6}" dt="2021-03-06T22:06:47.038" v="3364" actId="1038"/>
-        <pc:sldMkLst>
-          <pc:docMk/>
-          <pc:sldMk cId="3626305797" sldId="281"/>
-        </pc:sldMkLst>
-        <pc:spChg chg="del">
-          <ac:chgData name="Roger Burek-Bors" userId="52318fc02a824a34" providerId="LiveId" clId="{CE0CDD7B-C3A1-414A-9816-595488E1E4B6}" dt="2021-03-06T21:54:11.303" v="2910" actId="1957"/>
-          <ac:spMkLst>
-            <pc:docMk/>
-            <pc:sldMk cId="3626305797" sldId="281"/>
-            <ac:spMk id="3" creationId="{CDC6F948-2F33-47A0-AE55-62E355ACC532}"/>
-          </ac:spMkLst>
-        </pc:spChg>
-        <pc:spChg chg="mod">
-          <ac:chgData name="Roger Burek-Bors" userId="52318fc02a824a34" providerId="LiveId" clId="{CE0CDD7B-C3A1-414A-9816-595488E1E4B6}" dt="2021-03-06T10:28:12.258" v="1236" actId="20577"/>
-          <ac:spMkLst>
-            <pc:docMk/>
-            <pc:sldMk cId="3626305797" sldId="281"/>
-            <ac:spMk id="4" creationId="{F0FEE1CD-BF08-48FA-8526-5BEB92660675}"/>
-          </ac:spMkLst>
-        </pc:spChg>
-        <pc:spChg chg="add mod">
-          <ac:chgData name="Roger Burek-Bors" userId="52318fc02a824a34" providerId="LiveId" clId="{CE0CDD7B-C3A1-414A-9816-595488E1E4B6}" dt="2021-03-06T22:06:47.038" v="3364" actId="1038"/>
-          <ac:spMkLst>
-            <pc:docMk/>
-            <pc:sldMk cId="3626305797" sldId="281"/>
-            <ac:spMk id="7" creationId="{F5943E24-CE6D-4EA8-9150-F2710DF1E286}"/>
-          </ac:spMkLst>
-        </pc:spChg>
-        <pc:graphicFrameChg chg="add mod">
-          <ac:chgData name="Roger Burek-Bors" userId="52318fc02a824a34" providerId="LiveId" clId="{CE0CDD7B-C3A1-414A-9816-595488E1E4B6}" dt="2021-03-06T22:06:47.038" v="3364" actId="1038"/>
-          <ac:graphicFrameMkLst>
-            <pc:docMk/>
-            <pc:sldMk cId="3626305797" sldId="281"/>
-            <ac:graphicFrameMk id="6" creationId="{551A0D79-1971-4153-A695-B2CD66C645EE}"/>
-          </ac:graphicFrameMkLst>
-        </pc:graphicFrameChg>
-      </pc:sldChg>
-      <pc:sldChg chg="addSp delSp modSp add mod">
-        <pc:chgData name="Roger Burek-Bors" userId="52318fc02a824a34" providerId="LiveId" clId="{CE0CDD7B-C3A1-414A-9816-595488E1E4B6}" dt="2021-03-06T22:57:38.614" v="4473" actId="27918"/>
-        <pc:sldMkLst>
-          <pc:docMk/>
-          <pc:sldMk cId="414061104" sldId="282"/>
-        </pc:sldMkLst>
-        <pc:spChg chg="del">
-          <ac:chgData name="Roger Burek-Bors" userId="52318fc02a824a34" providerId="LiveId" clId="{CE0CDD7B-C3A1-414A-9816-595488E1E4B6}" dt="2021-03-06T22:51:14.023" v="4400" actId="1957"/>
-          <ac:spMkLst>
-            <pc:docMk/>
-            <pc:sldMk cId="414061104" sldId="282"/>
-            <ac:spMk id="3" creationId="{CDC6F948-2F33-47A0-AE55-62E355ACC532}"/>
-          </ac:spMkLst>
-        </pc:spChg>
-        <pc:spChg chg="mod">
-          <ac:chgData name="Roger Burek-Bors" userId="52318fc02a824a34" providerId="LiveId" clId="{CE0CDD7B-C3A1-414A-9816-595488E1E4B6}" dt="2021-03-06T10:28:16.646" v="1238" actId="20577"/>
-          <ac:spMkLst>
-            <pc:docMk/>
-            <pc:sldMk cId="414061104" sldId="282"/>
-            <ac:spMk id="4" creationId="{F0FEE1CD-BF08-48FA-8526-5BEB92660675}"/>
-          </ac:spMkLst>
-        </pc:spChg>
-        <pc:graphicFrameChg chg="add mod">
-          <ac:chgData name="Roger Burek-Bors" userId="52318fc02a824a34" providerId="LiveId" clId="{CE0CDD7B-C3A1-414A-9816-595488E1E4B6}" dt="2021-03-06T22:56:58.142" v="4471" actId="20577"/>
-          <ac:graphicFrameMkLst>
-            <pc:docMk/>
-            <pc:sldMk cId="414061104" sldId="282"/>
-            <ac:graphicFrameMk id="6" creationId="{0C73F6A4-BD75-466A-91C4-DC593C0E3E0D}"/>
-          </ac:graphicFrameMkLst>
-        </pc:graphicFrameChg>
-      </pc:sldChg>
-      <pc:sldChg chg="modSp add mod">
-        <pc:chgData name="Roger Burek-Bors" userId="52318fc02a824a34" providerId="LiveId" clId="{CE0CDD7B-C3A1-414A-9816-595488E1E4B6}" dt="2021-03-06T10:43:29.820" v="1318" actId="790"/>
-        <pc:sldMkLst>
-          <pc:docMk/>
-          <pc:sldMk cId="2824837901" sldId="283"/>
-        </pc:sldMkLst>
-        <pc:spChg chg="mod">
-          <ac:chgData name="Roger Burek-Bors" userId="52318fc02a824a34" providerId="LiveId" clId="{CE0CDD7B-C3A1-414A-9816-595488E1E4B6}" dt="2021-03-06T10:43:29.820" v="1318" actId="790"/>
-          <ac:spMkLst>
-            <pc:docMk/>
-            <pc:sldMk cId="2824837901" sldId="283"/>
-            <ac:spMk id="3" creationId="{CDC6F948-2F33-47A0-AE55-62E355ACC532}"/>
-          </ac:spMkLst>
-        </pc:spChg>
-        <pc:spChg chg="mod">
-          <ac:chgData name="Roger Burek-Bors" userId="52318fc02a824a34" providerId="LiveId" clId="{CE0CDD7B-C3A1-414A-9816-595488E1E4B6}" dt="2021-03-06T10:36:29.792" v="1265" actId="20577"/>
-          <ac:spMkLst>
-            <pc:docMk/>
-            <pc:sldMk cId="2824837901" sldId="283"/>
-            <ac:spMk id="4" creationId="{F0FEE1CD-BF08-48FA-8526-5BEB92660675}"/>
-          </ac:spMkLst>
-        </pc:spChg>
-      </pc:sldChg>
-    </pc:docChg>
-  </pc:docChgLst>
-  <pc:docChgLst>
     <pc:chgData name="Roger Burek-Bors" userId="52318fc02a824a34" providerId="LiveId" clId="{1F239C82-AFC1-45CC-A017-1A691C60E705}"/>
     <pc:docChg chg="undo custSel addSld delSld modSld sldOrd">
       <pc:chgData name="Roger Burek-Bors" userId="52318fc02a824a34" providerId="LiveId" clId="{1F239C82-AFC1-45CC-A017-1A691C60E705}" dt="2021-05-04T13:17:40.855" v="794" actId="1076"/>
@@ -1951,6 +1367,591 @@
             <ac:picMk id="9" creationId="{3CBC7FF4-559B-4FC3-8235-ADCA753D42A7}"/>
           </ac:picMkLst>
         </pc:picChg>
+      </pc:sldChg>
+    </pc:docChg>
+  </pc:docChgLst>
+  <pc:docChgLst>
+    <pc:chgData name="Roger Burek-Bors" userId="52318fc02a824a34" providerId="LiveId" clId="{CE0CDD7B-C3A1-414A-9816-595488E1E4B6}"/>
+    <pc:docChg chg="undo custSel addSld modSld">
+      <pc:chgData name="Roger Burek-Bors" userId="52318fc02a824a34" providerId="LiveId" clId="{CE0CDD7B-C3A1-414A-9816-595488E1E4B6}" dt="2021-03-06T23:02:37.974" v="4491" actId="20577"/>
+      <pc:docMkLst>
+        <pc:docMk/>
+      </pc:docMkLst>
+      <pc:sldChg chg="modSp mod">
+        <pc:chgData name="Roger Burek-Bors" userId="52318fc02a824a34" providerId="LiveId" clId="{CE0CDD7B-C3A1-414A-9816-595488E1E4B6}" dt="2021-03-06T10:26:05.598" v="1214" actId="20577"/>
+        <pc:sldMkLst>
+          <pc:docMk/>
+          <pc:sldMk cId="109857222" sldId="256"/>
+        </pc:sldMkLst>
+        <pc:spChg chg="mod">
+          <ac:chgData name="Roger Burek-Bors" userId="52318fc02a824a34" providerId="LiveId" clId="{CE0CDD7B-C3A1-414A-9816-595488E1E4B6}" dt="2021-03-06T10:26:05.598" v="1214" actId="20577"/>
+          <ac:spMkLst>
+            <pc:docMk/>
+            <pc:sldMk cId="109857222" sldId="256"/>
+            <ac:spMk id="11" creationId="{00CC22B5-8500-2C45-91DE-A596A6DF1C3B}"/>
+          </ac:spMkLst>
+        </pc:spChg>
+      </pc:sldChg>
+      <pc:sldChg chg="addSp delSp modSp new mod">
+        <pc:chgData name="Roger Burek-Bors" userId="52318fc02a824a34" providerId="LiveId" clId="{CE0CDD7B-C3A1-414A-9816-595488E1E4B6}" dt="2021-03-06T22:17:29.718" v="4022" actId="20577"/>
+        <pc:sldMkLst>
+          <pc:docMk/>
+          <pc:sldMk cId="1899016330" sldId="269"/>
+        </pc:sldMkLst>
+        <pc:spChg chg="del">
+          <ac:chgData name="Roger Burek-Bors" userId="52318fc02a824a34" providerId="LiveId" clId="{CE0CDD7B-C3A1-414A-9816-595488E1E4B6}" dt="2021-03-06T08:16:46.801" v="2" actId="478"/>
+          <ac:spMkLst>
+            <pc:docMk/>
+            <pc:sldMk cId="1899016330" sldId="269"/>
+            <ac:spMk id="2" creationId="{2050F080-7170-4879-B84F-2D5EC65696CB}"/>
+          </ac:spMkLst>
+        </pc:spChg>
+        <pc:spChg chg="mod">
+          <ac:chgData name="Roger Burek-Bors" userId="52318fc02a824a34" providerId="LiveId" clId="{CE0CDD7B-C3A1-414A-9816-595488E1E4B6}" dt="2021-03-06T22:17:29.718" v="4022" actId="20577"/>
+          <ac:spMkLst>
+            <pc:docMk/>
+            <pc:sldMk cId="1899016330" sldId="269"/>
+            <ac:spMk id="3" creationId="{CDC6F948-2F33-47A0-AE55-62E355ACC532}"/>
+          </ac:spMkLst>
+        </pc:spChg>
+        <pc:spChg chg="add mod">
+          <ac:chgData name="Roger Burek-Bors" userId="52318fc02a824a34" providerId="LiveId" clId="{CE0CDD7B-C3A1-414A-9816-595488E1E4B6}" dt="2021-03-06T08:18:13.808" v="19"/>
+          <ac:spMkLst>
+            <pc:docMk/>
+            <pc:sldMk cId="1899016330" sldId="269"/>
+            <ac:spMk id="4" creationId="{F0FEE1CD-BF08-48FA-8526-5BEB92660675}"/>
+          </ac:spMkLst>
+        </pc:spChg>
+      </pc:sldChg>
+      <pc:sldChg chg="modSp add mod">
+        <pc:chgData name="Roger Burek-Bors" userId="52318fc02a824a34" providerId="LiveId" clId="{CE0CDD7B-C3A1-414A-9816-595488E1E4B6}" dt="2021-03-06T08:59:48.309" v="330" actId="790"/>
+        <pc:sldMkLst>
+          <pc:docMk/>
+          <pc:sldMk cId="1384039938" sldId="270"/>
+        </pc:sldMkLst>
+        <pc:spChg chg="mod">
+          <ac:chgData name="Roger Burek-Bors" userId="52318fc02a824a34" providerId="LiveId" clId="{CE0CDD7B-C3A1-414A-9816-595488E1E4B6}" dt="2021-03-06T08:59:48.309" v="330" actId="790"/>
+          <ac:spMkLst>
+            <pc:docMk/>
+            <pc:sldMk cId="1384039938" sldId="270"/>
+            <ac:spMk id="3" creationId="{CDC6F948-2F33-47A0-AE55-62E355ACC532}"/>
+          </ac:spMkLst>
+        </pc:spChg>
+        <pc:spChg chg="mod">
+          <ac:chgData name="Roger Burek-Bors" userId="52318fc02a824a34" providerId="LiveId" clId="{CE0CDD7B-C3A1-414A-9816-595488E1E4B6}" dt="2021-03-06T08:18:30.018" v="20"/>
+          <ac:spMkLst>
+            <pc:docMk/>
+            <pc:sldMk cId="1384039938" sldId="270"/>
+            <ac:spMk id="4" creationId="{F0FEE1CD-BF08-48FA-8526-5BEB92660675}"/>
+          </ac:spMkLst>
+        </pc:spChg>
+      </pc:sldChg>
+      <pc:sldChg chg="modSp add mod">
+        <pc:chgData name="Roger Burek-Bors" userId="52318fc02a824a34" providerId="LiveId" clId="{CE0CDD7B-C3A1-414A-9816-595488E1E4B6}" dt="2021-03-06T10:59:18.865" v="1401" actId="790"/>
+        <pc:sldMkLst>
+          <pc:docMk/>
+          <pc:sldMk cId="3712518515" sldId="271"/>
+        </pc:sldMkLst>
+        <pc:spChg chg="mod">
+          <ac:chgData name="Roger Burek-Bors" userId="52318fc02a824a34" providerId="LiveId" clId="{CE0CDD7B-C3A1-414A-9816-595488E1E4B6}" dt="2021-03-06T10:59:18.865" v="1401" actId="790"/>
+          <ac:spMkLst>
+            <pc:docMk/>
+            <pc:sldMk cId="3712518515" sldId="271"/>
+            <ac:spMk id="3" creationId="{CDC6F948-2F33-47A0-AE55-62E355ACC532}"/>
+          </ac:spMkLst>
+        </pc:spChg>
+        <pc:spChg chg="mod">
+          <ac:chgData name="Roger Burek-Bors" userId="52318fc02a824a34" providerId="LiveId" clId="{CE0CDD7B-C3A1-414A-9816-595488E1E4B6}" dt="2021-03-06T08:18:38.911" v="21"/>
+          <ac:spMkLst>
+            <pc:docMk/>
+            <pc:sldMk cId="3712518515" sldId="271"/>
+            <ac:spMk id="4" creationId="{F0FEE1CD-BF08-48FA-8526-5BEB92660675}"/>
+          </ac:spMkLst>
+        </pc:spChg>
+      </pc:sldChg>
+      <pc:sldChg chg="addSp modSp add mod">
+        <pc:chgData name="Roger Burek-Bors" userId="52318fc02a824a34" providerId="LiveId" clId="{CE0CDD7B-C3A1-414A-9816-595488E1E4B6}" dt="2021-03-06T20:40:13.980" v="1926" actId="20577"/>
+        <pc:sldMkLst>
+          <pc:docMk/>
+          <pc:sldMk cId="4200854336" sldId="272"/>
+        </pc:sldMkLst>
+        <pc:spChg chg="mod">
+          <ac:chgData name="Roger Burek-Bors" userId="52318fc02a824a34" providerId="LiveId" clId="{CE0CDD7B-C3A1-414A-9816-595488E1E4B6}" dt="2021-03-06T20:40:13.980" v="1926" actId="20577"/>
+          <ac:spMkLst>
+            <pc:docMk/>
+            <pc:sldMk cId="4200854336" sldId="272"/>
+            <ac:spMk id="3" creationId="{CDC6F948-2F33-47A0-AE55-62E355ACC532}"/>
+          </ac:spMkLst>
+        </pc:spChg>
+        <pc:spChg chg="mod">
+          <ac:chgData name="Roger Burek-Bors" userId="52318fc02a824a34" providerId="LiveId" clId="{CE0CDD7B-C3A1-414A-9816-595488E1E4B6}" dt="2021-03-06T10:27:18.728" v="1223" actId="20577"/>
+          <ac:spMkLst>
+            <pc:docMk/>
+            <pc:sldMk cId="4200854336" sldId="272"/>
+            <ac:spMk id="4" creationId="{F0FEE1CD-BF08-48FA-8526-5BEB92660675}"/>
+          </ac:spMkLst>
+        </pc:spChg>
+        <pc:spChg chg="add mod">
+          <ac:chgData name="Roger Burek-Bors" userId="52318fc02a824a34" providerId="LiveId" clId="{CE0CDD7B-C3A1-414A-9816-595488E1E4B6}" dt="2021-03-06T20:27:56.070" v="1459" actId="122"/>
+          <ac:spMkLst>
+            <pc:docMk/>
+            <pc:sldMk cId="4200854336" sldId="272"/>
+            <ac:spMk id="8" creationId="{3E00D818-545B-486D-93DE-99A9F6CB2B69}"/>
+          </ac:spMkLst>
+        </pc:spChg>
+        <pc:spChg chg="add mod">
+          <ac:chgData name="Roger Burek-Bors" userId="52318fc02a824a34" providerId="LiveId" clId="{CE0CDD7B-C3A1-414A-9816-595488E1E4B6}" dt="2021-03-06T20:28:37.867" v="1481" actId="20577"/>
+          <ac:spMkLst>
+            <pc:docMk/>
+            <pc:sldMk cId="4200854336" sldId="272"/>
+            <ac:spMk id="9" creationId="{F523BA9E-3D67-441D-9B1C-80CEA39F5E2C}"/>
+          </ac:spMkLst>
+        </pc:spChg>
+        <pc:picChg chg="add mod">
+          <ac:chgData name="Roger Burek-Bors" userId="52318fc02a824a34" providerId="LiveId" clId="{CE0CDD7B-C3A1-414A-9816-595488E1E4B6}" dt="2021-03-06T20:27:05.116" v="1413" actId="14100"/>
+          <ac:picMkLst>
+            <pc:docMk/>
+            <pc:sldMk cId="4200854336" sldId="272"/>
+            <ac:picMk id="5" creationId="{E04AD88E-AB73-4501-BA1F-20A03346571A}"/>
+          </ac:picMkLst>
+        </pc:picChg>
+        <pc:picChg chg="add mod">
+          <ac:chgData name="Roger Burek-Bors" userId="52318fc02a824a34" providerId="LiveId" clId="{CE0CDD7B-C3A1-414A-9816-595488E1E4B6}" dt="2021-03-06T20:26:58.032" v="1411" actId="1076"/>
+          <ac:picMkLst>
+            <pc:docMk/>
+            <pc:sldMk cId="4200854336" sldId="272"/>
+            <ac:picMk id="7" creationId="{4B03E726-EE28-4C6F-B7B4-87B349369EB5}"/>
+          </ac:picMkLst>
+        </pc:picChg>
+      </pc:sldChg>
+      <pc:sldChg chg="modSp add mod">
+        <pc:chgData name="Roger Burek-Bors" userId="52318fc02a824a34" providerId="LiveId" clId="{CE0CDD7B-C3A1-414A-9816-595488E1E4B6}" dt="2021-03-06T22:22:50.552" v="4398" actId="1076"/>
+        <pc:sldMkLst>
+          <pc:docMk/>
+          <pc:sldMk cId="3497837162" sldId="273"/>
+        </pc:sldMkLst>
+        <pc:spChg chg="mod">
+          <ac:chgData name="Roger Burek-Bors" userId="52318fc02a824a34" providerId="LiveId" clId="{CE0CDD7B-C3A1-414A-9816-595488E1E4B6}" dt="2021-03-06T22:22:50.552" v="4398" actId="1076"/>
+          <ac:spMkLst>
+            <pc:docMk/>
+            <pc:sldMk cId="3497837162" sldId="273"/>
+            <ac:spMk id="3" creationId="{CDC6F948-2F33-47A0-AE55-62E355ACC532}"/>
+          </ac:spMkLst>
+        </pc:spChg>
+        <pc:spChg chg="mod">
+          <ac:chgData name="Roger Burek-Bors" userId="52318fc02a824a34" providerId="LiveId" clId="{CE0CDD7B-C3A1-414A-9816-595488E1E4B6}" dt="2021-03-06T08:19:04.168" v="23"/>
+          <ac:spMkLst>
+            <pc:docMk/>
+            <pc:sldMk cId="3497837162" sldId="273"/>
+            <ac:spMk id="4" creationId="{F0FEE1CD-BF08-48FA-8526-5BEB92660675}"/>
+          </ac:spMkLst>
+        </pc:spChg>
+      </pc:sldChg>
+      <pc:sldChg chg="modSp add mod">
+        <pc:chgData name="Roger Burek-Bors" userId="52318fc02a824a34" providerId="LiveId" clId="{CE0CDD7B-C3A1-414A-9816-595488E1E4B6}" dt="2021-03-06T23:02:37.974" v="4491" actId="20577"/>
+        <pc:sldMkLst>
+          <pc:docMk/>
+          <pc:sldMk cId="481083618" sldId="274"/>
+        </pc:sldMkLst>
+        <pc:spChg chg="mod">
+          <ac:chgData name="Roger Burek-Bors" userId="52318fc02a824a34" providerId="LiveId" clId="{CE0CDD7B-C3A1-414A-9816-595488E1E4B6}" dt="2021-03-06T23:02:37.974" v="4491" actId="20577"/>
+          <ac:spMkLst>
+            <pc:docMk/>
+            <pc:sldMk cId="481083618" sldId="274"/>
+            <ac:spMk id="3" creationId="{CDC6F948-2F33-47A0-AE55-62E355ACC532}"/>
+          </ac:spMkLst>
+        </pc:spChg>
+        <pc:spChg chg="mod">
+          <ac:chgData name="Roger Burek-Bors" userId="52318fc02a824a34" providerId="LiveId" clId="{CE0CDD7B-C3A1-414A-9816-595488E1E4B6}" dt="2021-03-06T10:34:49.377" v="1256" actId="20577"/>
+          <ac:spMkLst>
+            <pc:docMk/>
+            <pc:sldMk cId="481083618" sldId="274"/>
+            <ac:spMk id="4" creationId="{F0FEE1CD-BF08-48FA-8526-5BEB92660675}"/>
+          </ac:spMkLst>
+        </pc:spChg>
+      </pc:sldChg>
+      <pc:sldChg chg="addSp modSp add mod">
+        <pc:chgData name="Roger Burek-Bors" userId="52318fc02a824a34" providerId="LiveId" clId="{CE0CDD7B-C3A1-414A-9816-595488E1E4B6}" dt="2021-03-06T09:50:28.173" v="917" actId="20577"/>
+        <pc:sldMkLst>
+          <pc:docMk/>
+          <pc:sldMk cId="2276711680" sldId="275"/>
+        </pc:sldMkLst>
+        <pc:spChg chg="mod">
+          <ac:chgData name="Roger Burek-Bors" userId="52318fc02a824a34" providerId="LiveId" clId="{CE0CDD7B-C3A1-414A-9816-595488E1E4B6}" dt="2021-03-06T09:48:39.949" v="908" actId="20577"/>
+          <ac:spMkLst>
+            <pc:docMk/>
+            <pc:sldMk cId="2276711680" sldId="275"/>
+            <ac:spMk id="3" creationId="{CDC6F948-2F33-47A0-AE55-62E355ACC532}"/>
+          </ac:spMkLst>
+        </pc:spChg>
+        <pc:spChg chg="mod">
+          <ac:chgData name="Roger Burek-Bors" userId="52318fc02a824a34" providerId="LiveId" clId="{CE0CDD7B-C3A1-414A-9816-595488E1E4B6}" dt="2021-03-06T09:50:28.173" v="917" actId="20577"/>
+          <ac:spMkLst>
+            <pc:docMk/>
+            <pc:sldMk cId="2276711680" sldId="275"/>
+            <ac:spMk id="4" creationId="{F0FEE1CD-BF08-48FA-8526-5BEB92660675}"/>
+          </ac:spMkLst>
+        </pc:spChg>
+        <pc:picChg chg="add mod">
+          <ac:chgData name="Roger Burek-Bors" userId="52318fc02a824a34" providerId="LiveId" clId="{CE0CDD7B-C3A1-414A-9816-595488E1E4B6}" dt="2021-03-06T09:28:27.934" v="419" actId="1038"/>
+          <ac:picMkLst>
+            <pc:docMk/>
+            <pc:sldMk cId="2276711680" sldId="275"/>
+            <ac:picMk id="5" creationId="{9C092213-4A86-436C-8C28-7631B5B29EBE}"/>
+          </ac:picMkLst>
+        </pc:picChg>
+      </pc:sldChg>
+      <pc:sldChg chg="modSp add mod">
+        <pc:chgData name="Roger Burek-Bors" userId="52318fc02a824a34" providerId="LiveId" clId="{CE0CDD7B-C3A1-414A-9816-595488E1E4B6}" dt="2021-03-06T09:20:47.535" v="378" actId="12"/>
+        <pc:sldMkLst>
+          <pc:docMk/>
+          <pc:sldMk cId="3201505257" sldId="276"/>
+        </pc:sldMkLst>
+        <pc:spChg chg="mod">
+          <ac:chgData name="Roger Burek-Bors" userId="52318fc02a824a34" providerId="LiveId" clId="{CE0CDD7B-C3A1-414A-9816-595488E1E4B6}" dt="2021-03-06T09:20:47.535" v="378" actId="12"/>
+          <ac:spMkLst>
+            <pc:docMk/>
+            <pc:sldMk cId="3201505257" sldId="276"/>
+            <ac:spMk id="3" creationId="{CDC6F948-2F33-47A0-AE55-62E355ACC532}"/>
+          </ac:spMkLst>
+        </pc:spChg>
+        <pc:spChg chg="mod">
+          <ac:chgData name="Roger Burek-Bors" userId="52318fc02a824a34" providerId="LiveId" clId="{CE0CDD7B-C3A1-414A-9816-595488E1E4B6}" dt="2021-03-06T09:15:08.698" v="373" actId="790"/>
+          <ac:spMkLst>
+            <pc:docMk/>
+            <pc:sldMk cId="3201505257" sldId="276"/>
+            <ac:spMk id="4" creationId="{F0FEE1CD-BF08-48FA-8526-5BEB92660675}"/>
+          </ac:spMkLst>
+        </pc:spChg>
+      </pc:sldChg>
+      <pc:sldChg chg="addSp delSp modSp add mod">
+        <pc:chgData name="Roger Burek-Bors" userId="52318fc02a824a34" providerId="LiveId" clId="{CE0CDD7B-C3A1-414A-9816-595488E1E4B6}" dt="2021-03-06T10:16:30.686" v="1210" actId="1035"/>
+        <pc:sldMkLst>
+          <pc:docMk/>
+          <pc:sldMk cId="1898627169" sldId="277"/>
+        </pc:sldMkLst>
+        <pc:spChg chg="mod">
+          <ac:chgData name="Roger Burek-Bors" userId="52318fc02a824a34" providerId="LiveId" clId="{CE0CDD7B-C3A1-414A-9816-595488E1E4B6}" dt="2021-03-06T10:15:59.491" v="1203" actId="1035"/>
+          <ac:spMkLst>
+            <pc:docMk/>
+            <pc:sldMk cId="1898627169" sldId="277"/>
+            <ac:spMk id="3" creationId="{CDC6F948-2F33-47A0-AE55-62E355ACC532}"/>
+          </ac:spMkLst>
+        </pc:spChg>
+        <pc:spChg chg="mod">
+          <ac:chgData name="Roger Burek-Bors" userId="52318fc02a824a34" providerId="LiveId" clId="{CE0CDD7B-C3A1-414A-9816-595488E1E4B6}" dt="2021-03-06T09:50:54.452" v="944" actId="20577"/>
+          <ac:spMkLst>
+            <pc:docMk/>
+            <pc:sldMk cId="1898627169" sldId="277"/>
+            <ac:spMk id="4" creationId="{F0FEE1CD-BF08-48FA-8526-5BEB92660675}"/>
+          </ac:spMkLst>
+        </pc:spChg>
+        <pc:spChg chg="add mod">
+          <ac:chgData name="Roger Burek-Bors" userId="52318fc02a824a34" providerId="LiveId" clId="{CE0CDD7B-C3A1-414A-9816-595488E1E4B6}" dt="2021-03-06T10:16:21.239" v="1208" actId="1036"/>
+          <ac:spMkLst>
+            <pc:docMk/>
+            <pc:sldMk cId="1898627169" sldId="277"/>
+            <ac:spMk id="9" creationId="{86890FC7-D71E-464F-A6EE-FA5C8A0939D1}"/>
+          </ac:spMkLst>
+        </pc:spChg>
+        <pc:spChg chg="add mod">
+          <ac:chgData name="Roger Burek-Bors" userId="52318fc02a824a34" providerId="LiveId" clId="{CE0CDD7B-C3A1-414A-9816-595488E1E4B6}" dt="2021-03-06T10:15:59.491" v="1203" actId="1035"/>
+          <ac:spMkLst>
+            <pc:docMk/>
+            <pc:sldMk cId="1898627169" sldId="277"/>
+            <ac:spMk id="10" creationId="{B0F8B1CA-463D-4F6F-8873-0953CDF30F82}"/>
+          </ac:spMkLst>
+        </pc:spChg>
+        <pc:spChg chg="add mod">
+          <ac:chgData name="Roger Burek-Bors" userId="52318fc02a824a34" providerId="LiveId" clId="{CE0CDD7B-C3A1-414A-9816-595488E1E4B6}" dt="2021-03-06T10:15:49.443" v="1200" actId="1036"/>
+          <ac:spMkLst>
+            <pc:docMk/>
+            <pc:sldMk cId="1898627169" sldId="277"/>
+            <ac:spMk id="11" creationId="{6E73E28B-7C40-4E48-B144-F4D992B71A59}"/>
+          </ac:spMkLst>
+        </pc:spChg>
+        <pc:picChg chg="del">
+          <ac:chgData name="Roger Burek-Bors" userId="52318fc02a824a34" providerId="LiveId" clId="{CE0CDD7B-C3A1-414A-9816-595488E1E4B6}" dt="2021-03-06T09:52:36.390" v="945" actId="478"/>
+          <ac:picMkLst>
+            <pc:docMk/>
+            <pc:sldMk cId="1898627169" sldId="277"/>
+            <ac:picMk id="5" creationId="{9C092213-4A86-436C-8C28-7631B5B29EBE}"/>
+          </ac:picMkLst>
+        </pc:picChg>
+        <pc:picChg chg="add mod">
+          <ac:chgData name="Roger Burek-Bors" userId="52318fc02a824a34" providerId="LiveId" clId="{CE0CDD7B-C3A1-414A-9816-595488E1E4B6}" dt="2021-03-06T10:15:59.491" v="1203" actId="1035"/>
+          <ac:picMkLst>
+            <pc:docMk/>
+            <pc:sldMk cId="1898627169" sldId="277"/>
+            <ac:picMk id="6" creationId="{025EA7C1-B980-4A2B-BF56-F74CFE5975A9}"/>
+          </ac:picMkLst>
+        </pc:picChg>
+        <pc:picChg chg="add mod">
+          <ac:chgData name="Roger Burek-Bors" userId="52318fc02a824a34" providerId="LiveId" clId="{CE0CDD7B-C3A1-414A-9816-595488E1E4B6}" dt="2021-03-06T10:16:30.686" v="1210" actId="1035"/>
+          <ac:picMkLst>
+            <pc:docMk/>
+            <pc:sldMk cId="1898627169" sldId="277"/>
+            <ac:picMk id="8" creationId="{D89AD308-79D0-4F5B-9860-504B18E3E720}"/>
+          </ac:picMkLst>
+        </pc:picChg>
+      </pc:sldChg>
+      <pc:sldChg chg="addSp modSp add mod">
+        <pc:chgData name="Roger Burek-Bors" userId="52318fc02a824a34" providerId="LiveId" clId="{CE0CDD7B-C3A1-414A-9816-595488E1E4B6}" dt="2021-03-06T21:19:05.900" v="2438" actId="6549"/>
+        <pc:sldMkLst>
+          <pc:docMk/>
+          <pc:sldMk cId="3679507724" sldId="278"/>
+        </pc:sldMkLst>
+        <pc:spChg chg="mod">
+          <ac:chgData name="Roger Burek-Bors" userId="52318fc02a824a34" providerId="LiveId" clId="{CE0CDD7B-C3A1-414A-9816-595488E1E4B6}" dt="2021-03-06T21:19:05.900" v="2438" actId="6549"/>
+          <ac:spMkLst>
+            <pc:docMk/>
+            <pc:sldMk cId="3679507724" sldId="278"/>
+            <ac:spMk id="3" creationId="{CDC6F948-2F33-47A0-AE55-62E355ACC532}"/>
+          </ac:spMkLst>
+        </pc:spChg>
+        <pc:spChg chg="mod">
+          <ac:chgData name="Roger Burek-Bors" userId="52318fc02a824a34" providerId="LiveId" clId="{CE0CDD7B-C3A1-414A-9816-595488E1E4B6}" dt="2021-03-06T10:27:58.947" v="1230" actId="20577"/>
+          <ac:spMkLst>
+            <pc:docMk/>
+            <pc:sldMk cId="3679507724" sldId="278"/>
+            <ac:spMk id="4" creationId="{F0FEE1CD-BF08-48FA-8526-5BEB92660675}"/>
+          </ac:spMkLst>
+        </pc:spChg>
+        <pc:picChg chg="add mod">
+          <ac:chgData name="Roger Burek-Bors" userId="52318fc02a824a34" providerId="LiveId" clId="{CE0CDD7B-C3A1-414A-9816-595488E1E4B6}" dt="2021-03-06T20:53:22.625" v="2012" actId="14100"/>
+          <ac:picMkLst>
+            <pc:docMk/>
+            <pc:sldMk cId="3679507724" sldId="278"/>
+            <ac:picMk id="5" creationId="{98E0585E-FC03-49DA-9084-1FECF72001CC}"/>
+          </ac:picMkLst>
+        </pc:picChg>
+      </pc:sldChg>
+      <pc:sldChg chg="modSp add mod">
+        <pc:chgData name="Roger Burek-Bors" userId="52318fc02a824a34" providerId="LiveId" clId="{CE0CDD7B-C3A1-414A-9816-595488E1E4B6}" dt="2021-03-06T21:28:40.172" v="2816" actId="20577"/>
+        <pc:sldMkLst>
+          <pc:docMk/>
+          <pc:sldMk cId="2898413202" sldId="279"/>
+        </pc:sldMkLst>
+        <pc:spChg chg="mod">
+          <ac:chgData name="Roger Burek-Bors" userId="52318fc02a824a34" providerId="LiveId" clId="{CE0CDD7B-C3A1-414A-9816-595488E1E4B6}" dt="2021-03-06T21:28:40.172" v="2816" actId="20577"/>
+          <ac:spMkLst>
+            <pc:docMk/>
+            <pc:sldMk cId="2898413202" sldId="279"/>
+            <ac:spMk id="3" creationId="{CDC6F948-2F33-47A0-AE55-62E355ACC532}"/>
+          </ac:spMkLst>
+        </pc:spChg>
+        <pc:spChg chg="mod">
+          <ac:chgData name="Roger Burek-Bors" userId="52318fc02a824a34" providerId="LiveId" clId="{CE0CDD7B-C3A1-414A-9816-595488E1E4B6}" dt="2021-03-06T10:28:03.831" v="1232" actId="20577"/>
+          <ac:spMkLst>
+            <pc:docMk/>
+            <pc:sldMk cId="2898413202" sldId="279"/>
+            <ac:spMk id="4" creationId="{F0FEE1CD-BF08-48FA-8526-5BEB92660675}"/>
+          </ac:spMkLst>
+        </pc:spChg>
+      </pc:sldChg>
+      <pc:sldChg chg="addSp delSp modSp add mod">
+        <pc:chgData name="Roger Burek-Bors" userId="52318fc02a824a34" providerId="LiveId" clId="{CE0CDD7B-C3A1-414A-9816-595488E1E4B6}" dt="2021-03-06T21:52:35.375" v="2907" actId="14100"/>
+        <pc:sldMkLst>
+          <pc:docMk/>
+          <pc:sldMk cId="1290289446" sldId="280"/>
+        </pc:sldMkLst>
+        <pc:spChg chg="del">
+          <ac:chgData name="Roger Burek-Bors" userId="52318fc02a824a34" providerId="LiveId" clId="{CE0CDD7B-C3A1-414A-9816-595488E1E4B6}" dt="2021-03-06T21:31:17.465" v="2817" actId="478"/>
+          <ac:spMkLst>
+            <pc:docMk/>
+            <pc:sldMk cId="1290289446" sldId="280"/>
+            <ac:spMk id="3" creationId="{CDC6F948-2F33-47A0-AE55-62E355ACC532}"/>
+          </ac:spMkLst>
+        </pc:spChg>
+        <pc:spChg chg="mod">
+          <ac:chgData name="Roger Burek-Bors" userId="52318fc02a824a34" providerId="LiveId" clId="{CE0CDD7B-C3A1-414A-9816-595488E1E4B6}" dt="2021-03-06T10:28:07.441" v="1234" actId="20577"/>
+          <ac:spMkLst>
+            <pc:docMk/>
+            <pc:sldMk cId="1290289446" sldId="280"/>
+            <ac:spMk id="4" creationId="{F0FEE1CD-BF08-48FA-8526-5BEB92660675}"/>
+          </ac:spMkLst>
+        </pc:spChg>
+        <pc:picChg chg="add mod">
+          <ac:chgData name="Roger Burek-Bors" userId="52318fc02a824a34" providerId="LiveId" clId="{CE0CDD7B-C3A1-414A-9816-595488E1E4B6}" dt="2021-03-06T21:52:35.375" v="2907" actId="14100"/>
+          <ac:picMkLst>
+            <pc:docMk/>
+            <pc:sldMk cId="1290289446" sldId="280"/>
+            <ac:picMk id="5" creationId="{DCE17B6A-718D-45CF-909E-9EB4347067BD}"/>
+          </ac:picMkLst>
+        </pc:picChg>
+        <pc:picChg chg="add mod">
+          <ac:chgData name="Roger Burek-Bors" userId="52318fc02a824a34" providerId="LiveId" clId="{CE0CDD7B-C3A1-414A-9816-595488E1E4B6}" dt="2021-03-06T21:38:53.794" v="2825" actId="1076"/>
+          <ac:picMkLst>
+            <pc:docMk/>
+            <pc:sldMk cId="1290289446" sldId="280"/>
+            <ac:picMk id="7" creationId="{74B6F8BA-D934-4B67-8EBE-F760E171C1DB}"/>
+          </ac:picMkLst>
+        </pc:picChg>
+        <pc:picChg chg="add mod">
+          <ac:chgData name="Roger Burek-Bors" userId="52318fc02a824a34" providerId="LiveId" clId="{CE0CDD7B-C3A1-414A-9816-595488E1E4B6}" dt="2021-03-06T21:39:16.908" v="2830" actId="14100"/>
+          <ac:picMkLst>
+            <pc:docMk/>
+            <pc:sldMk cId="1290289446" sldId="280"/>
+            <ac:picMk id="9" creationId="{8BCFA284-C68A-4565-B96D-D6012DAD4993}"/>
+          </ac:picMkLst>
+        </pc:picChg>
+        <pc:picChg chg="add mod">
+          <ac:chgData name="Roger Burek-Bors" userId="52318fc02a824a34" providerId="LiveId" clId="{CE0CDD7B-C3A1-414A-9816-595488E1E4B6}" dt="2021-03-06T21:52:28.253" v="2906" actId="1076"/>
+          <ac:picMkLst>
+            <pc:docMk/>
+            <pc:sldMk cId="1290289446" sldId="280"/>
+            <ac:picMk id="11" creationId="{3B299F46-81F4-4196-A257-5297C1A42360}"/>
+          </ac:picMkLst>
+        </pc:picChg>
+        <pc:picChg chg="add mod">
+          <ac:chgData name="Roger Burek-Bors" userId="52318fc02a824a34" providerId="LiveId" clId="{CE0CDD7B-C3A1-414A-9816-595488E1E4B6}" dt="2021-03-06T21:52:04.552" v="2895" actId="1035"/>
+          <ac:picMkLst>
+            <pc:docMk/>
+            <pc:sldMk cId="1290289446" sldId="280"/>
+            <ac:picMk id="13" creationId="{EF606B0A-43BE-430F-A5D5-B106AF7572AA}"/>
+          </ac:picMkLst>
+        </pc:picChg>
+        <pc:picChg chg="add mod">
+          <ac:chgData name="Roger Burek-Bors" userId="52318fc02a824a34" providerId="LiveId" clId="{CE0CDD7B-C3A1-414A-9816-595488E1E4B6}" dt="2021-03-06T21:52:14.994" v="2904" actId="1076"/>
+          <ac:picMkLst>
+            <pc:docMk/>
+            <pc:sldMk cId="1290289446" sldId="280"/>
+            <ac:picMk id="15" creationId="{9EBC8CDE-7985-4438-8414-61613270DF62}"/>
+          </ac:picMkLst>
+        </pc:picChg>
+        <pc:picChg chg="add mod">
+          <ac:chgData name="Roger Burek-Bors" userId="52318fc02a824a34" providerId="LiveId" clId="{CE0CDD7B-C3A1-414A-9816-595488E1E4B6}" dt="2021-03-06T21:48:56.253" v="2855" actId="1076"/>
+          <ac:picMkLst>
+            <pc:docMk/>
+            <pc:sldMk cId="1290289446" sldId="280"/>
+            <ac:picMk id="17" creationId="{9CE373F2-B6EB-4F66-A022-E6C1073E6E17}"/>
+          </ac:picMkLst>
+        </pc:picChg>
+        <pc:picChg chg="add mod">
+          <ac:chgData name="Roger Burek-Bors" userId="52318fc02a824a34" providerId="LiveId" clId="{CE0CDD7B-C3A1-414A-9816-595488E1E4B6}" dt="2021-03-06T21:48:49.029" v="2854" actId="1076"/>
+          <ac:picMkLst>
+            <pc:docMk/>
+            <pc:sldMk cId="1290289446" sldId="280"/>
+            <ac:picMk id="19" creationId="{2AC43E6A-EF41-4406-8345-E883118028B4}"/>
+          </ac:picMkLst>
+        </pc:picChg>
+        <pc:picChg chg="add mod">
+          <ac:chgData name="Roger Burek-Bors" userId="52318fc02a824a34" providerId="LiveId" clId="{CE0CDD7B-C3A1-414A-9816-595488E1E4B6}" dt="2021-03-06T21:52:14.994" v="2904" actId="1076"/>
+          <ac:picMkLst>
+            <pc:docMk/>
+            <pc:sldMk cId="1290289446" sldId="280"/>
+            <ac:picMk id="21" creationId="{B1EF41AE-55C4-466E-BB0D-966D553CA48D}"/>
+          </ac:picMkLst>
+        </pc:picChg>
+        <pc:picChg chg="add mod">
+          <ac:chgData name="Roger Burek-Bors" userId="52318fc02a824a34" providerId="LiveId" clId="{CE0CDD7B-C3A1-414A-9816-595488E1E4B6}" dt="2021-03-06T21:52:04.552" v="2895" actId="1035"/>
+          <ac:picMkLst>
+            <pc:docMk/>
+            <pc:sldMk cId="1290289446" sldId="280"/>
+            <ac:picMk id="23" creationId="{4D30FDC5-05B4-48EA-9CC7-95299F4E793C}"/>
+          </ac:picMkLst>
+        </pc:picChg>
+        <pc:picChg chg="add mod">
+          <ac:chgData name="Roger Burek-Bors" userId="52318fc02a824a34" providerId="LiveId" clId="{CE0CDD7B-C3A1-414A-9816-595488E1E4B6}" dt="2021-03-06T21:52:28.253" v="2906" actId="1076"/>
+          <ac:picMkLst>
+            <pc:docMk/>
+            <pc:sldMk cId="1290289446" sldId="280"/>
+            <ac:picMk id="25" creationId="{67823BE7-DD39-4020-85C3-2807ACF36B1F}"/>
+          </ac:picMkLst>
+        </pc:picChg>
+      </pc:sldChg>
+      <pc:sldChg chg="addSp delSp modSp add mod">
+        <pc:chgData name="Roger Burek-Bors" userId="52318fc02a824a34" providerId="LiveId" clId="{CE0CDD7B-C3A1-414A-9816-595488E1E4B6}" dt="2021-03-06T22:06:47.038" v="3364" actId="1038"/>
+        <pc:sldMkLst>
+          <pc:docMk/>
+          <pc:sldMk cId="3626305797" sldId="281"/>
+        </pc:sldMkLst>
+        <pc:spChg chg="del">
+          <ac:chgData name="Roger Burek-Bors" userId="52318fc02a824a34" providerId="LiveId" clId="{CE0CDD7B-C3A1-414A-9816-595488E1E4B6}" dt="2021-03-06T21:54:11.303" v="2910" actId="1957"/>
+          <ac:spMkLst>
+            <pc:docMk/>
+            <pc:sldMk cId="3626305797" sldId="281"/>
+            <ac:spMk id="3" creationId="{CDC6F948-2F33-47A0-AE55-62E355ACC532}"/>
+          </ac:spMkLst>
+        </pc:spChg>
+        <pc:spChg chg="mod">
+          <ac:chgData name="Roger Burek-Bors" userId="52318fc02a824a34" providerId="LiveId" clId="{CE0CDD7B-C3A1-414A-9816-595488E1E4B6}" dt="2021-03-06T10:28:12.258" v="1236" actId="20577"/>
+          <ac:spMkLst>
+            <pc:docMk/>
+            <pc:sldMk cId="3626305797" sldId="281"/>
+            <ac:spMk id="4" creationId="{F0FEE1CD-BF08-48FA-8526-5BEB92660675}"/>
+          </ac:spMkLst>
+        </pc:spChg>
+        <pc:spChg chg="add mod">
+          <ac:chgData name="Roger Burek-Bors" userId="52318fc02a824a34" providerId="LiveId" clId="{CE0CDD7B-C3A1-414A-9816-595488E1E4B6}" dt="2021-03-06T22:06:47.038" v="3364" actId="1038"/>
+          <ac:spMkLst>
+            <pc:docMk/>
+            <pc:sldMk cId="3626305797" sldId="281"/>
+            <ac:spMk id="7" creationId="{F5943E24-CE6D-4EA8-9150-F2710DF1E286}"/>
+          </ac:spMkLst>
+        </pc:spChg>
+        <pc:graphicFrameChg chg="add mod">
+          <ac:chgData name="Roger Burek-Bors" userId="52318fc02a824a34" providerId="LiveId" clId="{CE0CDD7B-C3A1-414A-9816-595488E1E4B6}" dt="2021-03-06T22:06:47.038" v="3364" actId="1038"/>
+          <ac:graphicFrameMkLst>
+            <pc:docMk/>
+            <pc:sldMk cId="3626305797" sldId="281"/>
+            <ac:graphicFrameMk id="6" creationId="{551A0D79-1971-4153-A695-B2CD66C645EE}"/>
+          </ac:graphicFrameMkLst>
+        </pc:graphicFrameChg>
+      </pc:sldChg>
+      <pc:sldChg chg="addSp delSp modSp add mod">
+        <pc:chgData name="Roger Burek-Bors" userId="52318fc02a824a34" providerId="LiveId" clId="{CE0CDD7B-C3A1-414A-9816-595488E1E4B6}" dt="2021-03-06T22:57:38.614" v="4473" actId="27918"/>
+        <pc:sldMkLst>
+          <pc:docMk/>
+          <pc:sldMk cId="414061104" sldId="282"/>
+        </pc:sldMkLst>
+        <pc:spChg chg="del">
+          <ac:chgData name="Roger Burek-Bors" userId="52318fc02a824a34" providerId="LiveId" clId="{CE0CDD7B-C3A1-414A-9816-595488E1E4B6}" dt="2021-03-06T22:51:14.023" v="4400" actId="1957"/>
+          <ac:spMkLst>
+            <pc:docMk/>
+            <pc:sldMk cId="414061104" sldId="282"/>
+            <ac:spMk id="3" creationId="{CDC6F948-2F33-47A0-AE55-62E355ACC532}"/>
+          </ac:spMkLst>
+        </pc:spChg>
+        <pc:spChg chg="mod">
+          <ac:chgData name="Roger Burek-Bors" userId="52318fc02a824a34" providerId="LiveId" clId="{CE0CDD7B-C3A1-414A-9816-595488E1E4B6}" dt="2021-03-06T10:28:16.646" v="1238" actId="20577"/>
+          <ac:spMkLst>
+            <pc:docMk/>
+            <pc:sldMk cId="414061104" sldId="282"/>
+            <ac:spMk id="4" creationId="{F0FEE1CD-BF08-48FA-8526-5BEB92660675}"/>
+          </ac:spMkLst>
+        </pc:spChg>
+        <pc:graphicFrameChg chg="add mod">
+          <ac:chgData name="Roger Burek-Bors" userId="52318fc02a824a34" providerId="LiveId" clId="{CE0CDD7B-C3A1-414A-9816-595488E1E4B6}" dt="2021-03-06T22:56:58.142" v="4471" actId="20577"/>
+          <ac:graphicFrameMkLst>
+            <pc:docMk/>
+            <pc:sldMk cId="414061104" sldId="282"/>
+            <ac:graphicFrameMk id="6" creationId="{0C73F6A4-BD75-466A-91C4-DC593C0E3E0D}"/>
+          </ac:graphicFrameMkLst>
+        </pc:graphicFrameChg>
+      </pc:sldChg>
+      <pc:sldChg chg="modSp add mod">
+        <pc:chgData name="Roger Burek-Bors" userId="52318fc02a824a34" providerId="LiveId" clId="{CE0CDD7B-C3A1-414A-9816-595488E1E4B6}" dt="2021-03-06T10:43:29.820" v="1318" actId="790"/>
+        <pc:sldMkLst>
+          <pc:docMk/>
+          <pc:sldMk cId="2824837901" sldId="283"/>
+        </pc:sldMkLst>
+        <pc:spChg chg="mod">
+          <ac:chgData name="Roger Burek-Bors" userId="52318fc02a824a34" providerId="LiveId" clId="{CE0CDD7B-C3A1-414A-9816-595488E1E4B6}" dt="2021-03-06T10:43:29.820" v="1318" actId="790"/>
+          <ac:spMkLst>
+            <pc:docMk/>
+            <pc:sldMk cId="2824837901" sldId="283"/>
+            <ac:spMk id="3" creationId="{CDC6F948-2F33-47A0-AE55-62E355ACC532}"/>
+          </ac:spMkLst>
+        </pc:spChg>
+        <pc:spChg chg="mod">
+          <ac:chgData name="Roger Burek-Bors" userId="52318fc02a824a34" providerId="LiveId" clId="{CE0CDD7B-C3A1-414A-9816-595488E1E4B6}" dt="2021-03-06T10:36:29.792" v="1265" actId="20577"/>
+          <ac:spMkLst>
+            <pc:docMk/>
+            <pc:sldMk cId="2824837901" sldId="283"/>
+            <ac:spMk id="4" creationId="{F0FEE1CD-BF08-48FA-8526-5BEB92660675}"/>
+          </ac:spMkLst>
+        </pc:spChg>
       </pc:sldChg>
     </pc:docChg>
   </pc:docChgLst>
@@ -2039,7 +2040,7 @@
           <a:p>
             <a:fld id="{2BDA1FB4-8E38-4CEB-9ECB-65C04D5EAEF4}" type="datetimeFigureOut">
               <a:rPr lang="en-US" smtClean="0"/>
-              <a:t>5/10/2021</a:t>
+              <a:t>05/10/2021</a:t>
             </a:fld>
             <a:endParaRPr lang="en-US"/>
           </a:p>
@@ -2438,7 +2439,7 @@
           <a:p>
             <a:fld id="{C764DE79-268F-4C1A-8933-263129D2AF90}" type="datetimeFigureOut">
               <a:rPr lang="en-US" dirty="0"/>
-              <a:t>5/10/2021</a:t>
+              <a:t>05/10/2021</a:t>
             </a:fld>
             <a:endParaRPr lang="en-US"/>
           </a:p>
@@ -2608,7 +2609,7 @@
           <a:p>
             <a:fld id="{C764DE79-268F-4C1A-8933-263129D2AF90}" type="datetimeFigureOut">
               <a:rPr lang="en-US" dirty="0"/>
-              <a:t>5/10/2021</a:t>
+              <a:t>05/10/2021</a:t>
             </a:fld>
             <a:endParaRPr lang="en-US"/>
           </a:p>
@@ -2788,7 +2789,7 @@
           <a:p>
             <a:fld id="{C764DE79-268F-4C1A-8933-263129D2AF90}" type="datetimeFigureOut">
               <a:rPr lang="en-US" dirty="0"/>
-              <a:t>5/10/2021</a:t>
+              <a:t>05/10/2021</a:t>
             </a:fld>
             <a:endParaRPr lang="en-US"/>
           </a:p>
@@ -2958,7 +2959,7 @@
           <a:p>
             <a:fld id="{C764DE79-268F-4C1A-8933-263129D2AF90}" type="datetimeFigureOut">
               <a:rPr lang="en-US" dirty="0"/>
-              <a:t>5/10/2021</a:t>
+              <a:t>05/10/2021</a:t>
             </a:fld>
             <a:endParaRPr lang="en-US"/>
           </a:p>
@@ -3204,7 +3205,7 @@
           <a:p>
             <a:fld id="{C764DE79-268F-4C1A-8933-263129D2AF90}" type="datetimeFigureOut">
               <a:rPr lang="en-US" dirty="0"/>
-              <a:t>5/10/2021</a:t>
+              <a:t>05/10/2021</a:t>
             </a:fld>
             <a:endParaRPr lang="en-US"/>
           </a:p>
@@ -3436,7 +3437,7 @@
           <a:p>
             <a:fld id="{C764DE79-268F-4C1A-8933-263129D2AF90}" type="datetimeFigureOut">
               <a:rPr lang="en-US" dirty="0"/>
-              <a:t>5/10/2021</a:t>
+              <a:t>05/10/2021</a:t>
             </a:fld>
             <a:endParaRPr lang="en-US"/>
           </a:p>
@@ -3803,7 +3804,7 @@
           <a:p>
             <a:fld id="{C764DE79-268F-4C1A-8933-263129D2AF90}" type="datetimeFigureOut">
               <a:rPr lang="en-US" dirty="0"/>
-              <a:t>5/10/2021</a:t>
+              <a:t>05/10/2021</a:t>
             </a:fld>
             <a:endParaRPr lang="en-US"/>
           </a:p>
@@ -3921,7 +3922,7 @@
           <a:p>
             <a:fld id="{C764DE79-268F-4C1A-8933-263129D2AF90}" type="datetimeFigureOut">
               <a:rPr lang="en-US" dirty="0"/>
-              <a:t>5/10/2021</a:t>
+              <a:t>05/10/2021</a:t>
             </a:fld>
             <a:endParaRPr lang="en-US"/>
           </a:p>
@@ -4016,7 +4017,7 @@
           <a:p>
             <a:fld id="{C764DE79-268F-4C1A-8933-263129D2AF90}" type="datetimeFigureOut">
               <a:rPr lang="en-US" dirty="0"/>
-              <a:t>5/10/2021</a:t>
+              <a:t>05/10/2021</a:t>
             </a:fld>
             <a:endParaRPr lang="en-US"/>
           </a:p>
@@ -4293,7 +4294,7 @@
           <a:p>
             <a:fld id="{C764DE79-268F-4C1A-8933-263129D2AF90}" type="datetimeFigureOut">
               <a:rPr lang="en-US" dirty="0"/>
-              <a:t>5/10/2021</a:t>
+              <a:t>05/10/2021</a:t>
             </a:fld>
             <a:endParaRPr lang="en-US"/>
           </a:p>
@@ -4550,7 +4551,7 @@
           <a:p>
             <a:fld id="{C764DE79-268F-4C1A-8933-263129D2AF90}" type="datetimeFigureOut">
               <a:rPr lang="en-US" dirty="0"/>
-              <a:t>5/10/2021</a:t>
+              <a:t>05/10/2021</a:t>
             </a:fld>
             <a:endParaRPr lang="en-US"/>
           </a:p>
@@ -4763,7 +4764,7 @@
           <a:p>
             <a:fld id="{C764DE79-268F-4C1A-8933-263129D2AF90}" type="datetimeFigureOut">
               <a:rPr lang="en-US" dirty="0"/>
-              <a:t>5/10/2021</a:t>
+              <a:t>05/10/2021</a:t>
             </a:fld>
             <a:endParaRPr lang="en-US"/>
           </a:p>
@@ -5362,6 +5363,328 @@
       </p:grpSpPr>
       <p:sp>
         <p:nvSpPr>
+          <p:cNvPr id="4" name="Title 1">
+            <a:extLst>
+              <a:ext uri="{FF2B5EF4-FFF2-40B4-BE49-F238E27FC236}">
+                <a16:creationId xmlns:a16="http://schemas.microsoft.com/office/drawing/2014/main" id="{F0FEE1CD-BF08-48FA-8526-5BEB92660675}"/>
+              </a:ext>
+            </a:extLst>
+          </p:cNvPr>
+          <p:cNvSpPr txBox="1">
+            <a:spLocks/>
+          </p:cNvSpPr>
+          <p:nvPr/>
+        </p:nvSpPr>
+        <p:spPr>
+          <a:xfrm rot="5400000">
+            <a:off x="5488405" y="-5488406"/>
+            <a:ext cx="1215190" cy="12192001"/>
+          </a:xfrm>
+          <a:prstGeom prst="rect">
+            <a:avLst/>
+          </a:prstGeom>
+          <a:solidFill>
+            <a:srgbClr val="3B3B3B"/>
+          </a:solidFill>
+        </p:spPr>
+        <p:txBody>
+          <a:bodyPr vert="vert270" lIns="91440" tIns="45720" rIns="91440" bIns="45720" rtlCol="0" anchor="ctr" anchorCtr="0">
+            <a:normAutofit/>
+          </a:bodyPr>
+          <a:lstStyle>
+            <a:lvl1pPr algn="l" defTabSz="914400" rtl="0" eaLnBrk="1" latinLnBrk="0" hangingPunct="1">
+              <a:lnSpc>
+                <a:spcPct val="90000"/>
+              </a:lnSpc>
+              <a:spcBef>
+                <a:spcPct val="0"/>
+              </a:spcBef>
+              <a:buNone/>
+              <a:defRPr sz="4400" kern="1200">
+                <a:solidFill>
+                  <a:schemeClr val="tx1"/>
+                </a:solidFill>
+                <a:latin typeface="+mj-lt"/>
+                <a:ea typeface="+mj-ea"/>
+                <a:cs typeface="+mj-cs"/>
+              </a:defRPr>
+            </a:lvl1pPr>
+          </a:lstStyle>
+          <a:p>
+            <a:pPr marL="0" marR="0" lvl="0" indent="0" algn="ctr" defTabSz="914400" rtl="0" eaLnBrk="1" fontAlgn="auto" latinLnBrk="0" hangingPunct="1">
+              <a:lnSpc>
+                <a:spcPct val="90000"/>
+              </a:lnSpc>
+              <a:spcBef>
+                <a:spcPct val="0"/>
+              </a:spcBef>
+              <a:spcAft>
+                <a:spcPts val="0"/>
+              </a:spcAft>
+              <a:buClrTx/>
+              <a:buSzTx/>
+              <a:buFontTx/>
+              <a:buNone/>
+              <a:tabLst/>
+              <a:defRPr/>
+            </a:pPr>
+            <a:r>
+              <a:rPr kumimoji="0" lang="pl-PL" sz="4400" b="1" i="0" u="none" strike="noStrike" kern="1200" cap="none" spc="0" normalizeH="0" baseline="0" noProof="0" dirty="0" err="1">
+                <a:ln>
+                  <a:noFill/>
+                </a:ln>
+                <a:solidFill>
+                  <a:srgbClr val="FF6600"/>
+                </a:solidFill>
+                <a:effectLst/>
+                <a:uLnTx/>
+                <a:uFillTx/>
+                <a:latin typeface="Calibri Light" panose="020F0302020204030204"/>
+                <a:ea typeface="+mj-ea"/>
+                <a:cs typeface="+mj-cs"/>
+              </a:rPr>
+              <a:t>Logistic</a:t>
+            </a:r>
+            <a:r>
+              <a:rPr kumimoji="0" lang="pl-PL" sz="4400" b="1" i="0" u="none" strike="noStrike" kern="1200" cap="none" spc="0" normalizeH="0" baseline="0" noProof="0" dirty="0">
+                <a:ln>
+                  <a:noFill/>
+                </a:ln>
+                <a:solidFill>
+                  <a:srgbClr val="FF6600"/>
+                </a:solidFill>
+                <a:effectLst/>
+                <a:uLnTx/>
+                <a:uFillTx/>
+                <a:latin typeface="Calibri Light" panose="020F0302020204030204"/>
+                <a:ea typeface="+mj-ea"/>
+                <a:cs typeface="+mj-cs"/>
+              </a:rPr>
+              <a:t> </a:t>
+            </a:r>
+            <a:r>
+              <a:rPr kumimoji="0" lang="pl-PL" sz="4400" b="1" i="0" u="none" strike="noStrike" kern="1200" cap="none" spc="0" normalizeH="0" baseline="0" noProof="0" dirty="0" err="1">
+                <a:ln>
+                  <a:noFill/>
+                </a:ln>
+                <a:solidFill>
+                  <a:srgbClr val="FF6600"/>
+                </a:solidFill>
+                <a:effectLst/>
+                <a:uLnTx/>
+                <a:uFillTx/>
+                <a:latin typeface="Calibri Light" panose="020F0302020204030204"/>
+                <a:ea typeface="+mj-ea"/>
+                <a:cs typeface="+mj-cs"/>
+              </a:rPr>
+              <a:t>Regression</a:t>
+            </a:r>
+            <a:r>
+              <a:rPr kumimoji="0" lang="pl-PL" sz="4400" b="1" i="0" u="none" strike="noStrike" kern="1200" cap="none" spc="0" normalizeH="0" baseline="0" noProof="0" dirty="0">
+                <a:ln>
+                  <a:noFill/>
+                </a:ln>
+                <a:solidFill>
+                  <a:srgbClr val="FF6600"/>
+                </a:solidFill>
+                <a:effectLst/>
+                <a:uLnTx/>
+                <a:uFillTx/>
+                <a:latin typeface="Calibri Light" panose="020F0302020204030204"/>
+                <a:ea typeface="+mj-ea"/>
+                <a:cs typeface="+mj-cs"/>
+              </a:rPr>
+              <a:t> </a:t>
+            </a:r>
+            <a:r>
+              <a:rPr kumimoji="0" lang="en-US" sz="4400" b="1" i="0" u="none" strike="noStrike" kern="1200" cap="none" spc="0" normalizeH="0" baseline="0" noProof="0" dirty="0">
+                <a:ln>
+                  <a:noFill/>
+                </a:ln>
+                <a:solidFill>
+                  <a:srgbClr val="FF6600"/>
+                </a:solidFill>
+                <a:effectLst/>
+                <a:uLnTx/>
+                <a:uFillTx/>
+                <a:latin typeface="Calibri Light" panose="020F0302020204030204"/>
+                <a:ea typeface="+mj-ea"/>
+                <a:cs typeface="+mj-cs"/>
+              </a:rPr>
+              <a:t>Model Results</a:t>
+            </a:r>
+          </a:p>
+        </p:txBody>
+      </p:sp>
+      <p:pic>
+        <p:nvPicPr>
+          <p:cNvPr id="3" name="Obraz 2">
+            <a:extLst>
+              <a:ext uri="{FF2B5EF4-FFF2-40B4-BE49-F238E27FC236}">
+                <a16:creationId xmlns:a16="http://schemas.microsoft.com/office/drawing/2014/main" id="{EE5819C0-DC31-45ED-8BAD-7F483C0C9544}"/>
+              </a:ext>
+            </a:extLst>
+          </p:cNvPr>
+          <p:cNvPicPr>
+            <a:picLocks noChangeAspect="1"/>
+          </p:cNvPicPr>
+          <p:nvPr/>
+        </p:nvPicPr>
+        <p:blipFill>
+          <a:blip r:embed="rId2"/>
+          <a:stretch>
+            <a:fillRect/>
+          </a:stretch>
+        </p:blipFill>
+        <p:spPr>
+          <a:xfrm>
+            <a:off x="1578610" y="2863697"/>
+            <a:ext cx="4029637" cy="1381318"/>
+          </a:xfrm>
+          <a:prstGeom prst="rect">
+            <a:avLst/>
+          </a:prstGeom>
+        </p:spPr>
+      </p:pic>
+      <p:pic>
+        <p:nvPicPr>
+          <p:cNvPr id="6" name="Obraz 5">
+            <a:extLst>
+              <a:ext uri="{FF2B5EF4-FFF2-40B4-BE49-F238E27FC236}">
+                <a16:creationId xmlns:a16="http://schemas.microsoft.com/office/drawing/2014/main" id="{AD89079A-877A-48AF-A317-E74147F52C39}"/>
+              </a:ext>
+            </a:extLst>
+          </p:cNvPr>
+          <p:cNvPicPr>
+            <a:picLocks noChangeAspect="1"/>
+          </p:cNvPicPr>
+          <p:nvPr/>
+        </p:nvPicPr>
+        <p:blipFill>
+          <a:blip r:embed="rId3"/>
+          <a:stretch>
+            <a:fillRect/>
+          </a:stretch>
+        </p:blipFill>
+        <p:spPr>
+          <a:xfrm>
+            <a:off x="2265961" y="5600030"/>
+            <a:ext cx="2619741" cy="390580"/>
+          </a:xfrm>
+          <a:prstGeom prst="rect">
+            <a:avLst/>
+          </a:prstGeom>
+        </p:spPr>
+      </p:pic>
+      <p:pic>
+        <p:nvPicPr>
+          <p:cNvPr id="2050" name="Picture 2">
+            <a:extLst>
+              <a:ext uri="{FF2B5EF4-FFF2-40B4-BE49-F238E27FC236}">
+                <a16:creationId xmlns:a16="http://schemas.microsoft.com/office/drawing/2014/main" id="{DE5DEEC8-78C9-4F82-9BCE-54E75BF5C4B9}"/>
+              </a:ext>
+            </a:extLst>
+          </p:cNvPr>
+          <p:cNvPicPr>
+            <a:picLocks noChangeAspect="1" noChangeArrowheads="1"/>
+          </p:cNvPicPr>
+          <p:nvPr/>
+        </p:nvPicPr>
+        <p:blipFill>
+          <a:blip r:embed="rId4">
+            <a:extLst>
+              <a:ext uri="{28A0092B-C50C-407E-A947-70E740481C1C}">
+                <a14:useLocalDpi xmlns:a14="http://schemas.microsoft.com/office/drawing/2010/main" val="0"/>
+              </a:ext>
+            </a:extLst>
+          </a:blip>
+          <a:srcRect/>
+          <a:stretch>
+            <a:fillRect/>
+          </a:stretch>
+        </p:blipFill>
+        <p:spPr bwMode="auto">
+          <a:xfrm>
+            <a:off x="6847501" y="1711269"/>
+            <a:ext cx="3676650" cy="3686175"/>
+          </a:xfrm>
+          <a:prstGeom prst="rect">
+            <a:avLst/>
+          </a:prstGeom>
+          <a:noFill/>
+          <a:extLst>
+            <a:ext uri="{909E8E84-426E-40DD-AFC4-6F175D3DCCD1}">
+              <a14:hiddenFill xmlns:a14="http://schemas.microsoft.com/office/drawing/2010/main">
+                <a:solidFill>
+                  <a:srgbClr val="FFFFFF"/>
+                </a:solidFill>
+              </a14:hiddenFill>
+            </a:ext>
+          </a:extLst>
+        </p:spPr>
+      </p:pic>
+      <p:pic>
+        <p:nvPicPr>
+          <p:cNvPr id="9" name="Obraz 8">
+            <a:extLst>
+              <a:ext uri="{FF2B5EF4-FFF2-40B4-BE49-F238E27FC236}">
+                <a16:creationId xmlns:a16="http://schemas.microsoft.com/office/drawing/2014/main" id="{BB4D2EE0-ED84-42A1-8B0B-A8896ACC10AB}"/>
+              </a:ext>
+            </a:extLst>
+          </p:cNvPr>
+          <p:cNvPicPr>
+            <a:picLocks noChangeAspect="1"/>
+          </p:cNvPicPr>
+          <p:nvPr/>
+        </p:nvPicPr>
+        <p:blipFill>
+          <a:blip r:embed="rId5"/>
+          <a:stretch>
+            <a:fillRect/>
+          </a:stretch>
+        </p:blipFill>
+        <p:spPr>
+          <a:xfrm>
+            <a:off x="8124445" y="5753072"/>
+            <a:ext cx="1838582" cy="190527"/>
+          </a:xfrm>
+          <a:prstGeom prst="rect">
+            <a:avLst/>
+          </a:prstGeom>
+        </p:spPr>
+      </p:pic>
+    </p:spTree>
+    <p:extLst>
+      <p:ext uri="{BB962C8B-B14F-4D97-AF65-F5344CB8AC3E}">
+        <p14:creationId xmlns:p14="http://schemas.microsoft.com/office/powerpoint/2010/main" val="3527806478"/>
+      </p:ext>
+    </p:extLst>
+  </p:cSld>
+  <p:clrMapOvr>
+    <a:masterClrMapping/>
+  </p:clrMapOvr>
+</p:sld>
+</file>
+
+<file path=ppt/slides/slide11.xml><?xml version="1.0" encoding="utf-8"?>
+<p:sld xmlns:a="http://schemas.openxmlformats.org/drawingml/2006/main" xmlns:r="http://schemas.openxmlformats.org/officeDocument/2006/relationships" xmlns:p="http://schemas.openxmlformats.org/presentationml/2006/main">
+  <p:cSld>
+    <p:spTree>
+      <p:nvGrpSpPr>
+        <p:cNvPr id="1" name=""/>
+        <p:cNvGrpSpPr/>
+        <p:nvPr/>
+      </p:nvGrpSpPr>
+      <p:grpSpPr>
+        <a:xfrm>
+          <a:off x="0" y="0"/>
+          <a:ext cx="0" cy="0"/>
+          <a:chOff x="0" y="0"/>
+          <a:chExt cx="0" cy="0"/>
+        </a:xfrm>
+      </p:grpSpPr>
+      <p:sp>
+        <p:nvSpPr>
           <p:cNvPr id="2" name="Title 1">
             <a:extLst>
               <a:ext uri="{FF2B5EF4-FFF2-40B4-BE49-F238E27FC236}">
@@ -5882,166 +6205,6 @@
       </p:grpSpPr>
       <p:sp>
         <p:nvSpPr>
-          <p:cNvPr id="3" name="Symbol zastępczy zawartości 2">
-            <a:extLst>
-              <a:ext uri="{FF2B5EF4-FFF2-40B4-BE49-F238E27FC236}">
-                <a16:creationId xmlns:a16="http://schemas.microsoft.com/office/drawing/2014/main" id="{CDC6F948-2F33-47A0-AE55-62E355ACC532}"/>
-              </a:ext>
-            </a:extLst>
-          </p:cNvPr>
-          <p:cNvSpPr>
-            <a:spLocks noGrp="1"/>
-          </p:cNvSpPr>
-          <p:nvPr>
-            <p:ph idx="1"/>
-          </p:nvPr>
-        </p:nvSpPr>
-        <p:spPr>
-          <a:xfrm>
-            <a:off x="838199" y="1769641"/>
-            <a:ext cx="10515600" cy="4351338"/>
-          </a:xfrm>
-        </p:spPr>
-        <p:txBody>
-          <a:bodyPr>
-            <a:normAutofit fontScale="92500" lnSpcReduction="20000"/>
-          </a:bodyPr>
-          <a:lstStyle/>
-          <a:p>
-            <a:pPr algn="just"/>
-            <a:r>
-              <a:rPr lang="en-US" dirty="0">
-                <a:solidFill>
-                  <a:srgbClr val="00B050"/>
-                </a:solidFill>
-              </a:rPr>
-              <a:t>Model Trade-offs:</a:t>
-            </a:r>
-          </a:p>
-          <a:p>
-            <a:pPr lvl="1" algn="just"/>
-            <a:r>
-              <a:rPr lang="en-US" dirty="0">
-                <a:solidFill>
-                  <a:srgbClr val="C00000"/>
-                </a:solidFill>
-              </a:rPr>
-              <a:t>Advantages:</a:t>
-            </a:r>
-          </a:p>
-          <a:p>
-            <a:pPr lvl="2" algn="just"/>
-            <a:r>
-              <a:rPr lang="en-US" dirty="0"/>
-              <a:t>Can successfully handle high dimensional data</a:t>
-            </a:r>
-          </a:p>
-          <a:p>
-            <a:pPr lvl="2" algn="just"/>
-            <a:r>
-              <a:rPr lang="en-US" dirty="0"/>
-              <a:t>Can successfully handle imbalanced classes</a:t>
-            </a:r>
-          </a:p>
-          <a:p>
-            <a:pPr lvl="1" algn="just"/>
-            <a:r>
-              <a:rPr lang="en-US" dirty="0">
-                <a:solidFill>
-                  <a:srgbClr val="C00000"/>
-                </a:solidFill>
-              </a:rPr>
-              <a:t>Disadvantages:</a:t>
-            </a:r>
-          </a:p>
-          <a:p>
-            <a:pPr lvl="2" algn="just"/>
-            <a:r>
-              <a:rPr lang="en-US" dirty="0"/>
-              <a:t>Difficult to diagnose and improve</a:t>
-            </a:r>
-          </a:p>
-          <a:p>
-            <a:pPr lvl="2" algn="just"/>
-            <a:r>
-              <a:rPr lang="en-US" dirty="0"/>
-              <a:t>Quite sensitive to outliers – training on dataset with outliers decreased model accuracy</a:t>
-            </a:r>
-          </a:p>
-          <a:p>
-            <a:pPr lvl="2" algn="just"/>
-            <a:r>
-              <a:rPr lang="en-US" dirty="0"/>
-              <a:t>Not suitable for large datasets since the training time will be higher</a:t>
-            </a:r>
-          </a:p>
-          <a:p>
-            <a:pPr algn="just"/>
-            <a:r>
-              <a:rPr lang="en-US" dirty="0">
-                <a:solidFill>
-                  <a:srgbClr val="00B050"/>
-                </a:solidFill>
-              </a:rPr>
-              <a:t>Results obtained:</a:t>
-            </a:r>
-          </a:p>
-          <a:p>
-            <a:pPr lvl="2" algn="just"/>
-            <a:r>
-              <a:rPr lang="en-US" dirty="0"/>
-              <a:t>Accuracy: 84 %</a:t>
-            </a:r>
-          </a:p>
-          <a:p>
-            <a:pPr marL="914400" lvl="2" indent="0" algn="just">
-              <a:buNone/>
-            </a:pPr>
-            <a:r>
-              <a:rPr lang="en-US" dirty="0"/>
-              <a:t>	Techniques applied for improving  worsened the model performance:</a:t>
-            </a:r>
-          </a:p>
-          <a:p>
-            <a:pPr lvl="7" algn="just">
-              <a:buFont typeface="Wingdings" panose="05000000000000000000" pitchFamily="2" charset="2"/>
-              <a:buChar char="Ø"/>
-            </a:pPr>
-            <a:r>
-              <a:rPr lang="en-US" dirty="0" err="1"/>
-              <a:t>Upsampling</a:t>
-            </a:r>
-            <a:endParaRPr lang="en-US" dirty="0"/>
-          </a:p>
-          <a:p>
-            <a:pPr lvl="7" algn="just">
-              <a:buFont typeface="Wingdings" panose="05000000000000000000" pitchFamily="2" charset="2"/>
-              <a:buChar char="Ø"/>
-            </a:pPr>
-            <a:r>
-              <a:rPr lang="en-US" dirty="0" err="1"/>
-              <a:t>Downsampling</a:t>
-            </a:r>
-            <a:endParaRPr lang="en-US" dirty="0"/>
-          </a:p>
-          <a:p>
-            <a:pPr lvl="7" algn="just">
-              <a:buFont typeface="Wingdings" panose="05000000000000000000" pitchFamily="2" charset="2"/>
-              <a:buChar char="Ø"/>
-            </a:pPr>
-            <a:r>
-              <a:rPr lang="en-US" dirty="0"/>
-              <a:t>PCA dimension reduction</a:t>
-            </a:r>
-          </a:p>
-          <a:p>
-            <a:pPr lvl="2" algn="just"/>
-            <a:endParaRPr lang="en-US" dirty="0"/>
-          </a:p>
-        </p:txBody>
-      </p:sp>
-      <p:sp>
-        <p:nvSpPr>
           <p:cNvPr id="4" name="Title 1">
             <a:extLst>
               <a:ext uri="{FF2B5EF4-FFF2-40B4-BE49-F238E27FC236}">
@@ -6090,6 +6253,386 @@
             </a:lvl1pPr>
           </a:lstStyle>
           <a:p>
+            <a:pPr algn="ctr"/>
+            <a:r>
+              <a:rPr lang="en-US" b="1" dirty="0">
+                <a:solidFill>
+                  <a:srgbClr val="FF6600"/>
+                </a:solidFill>
+              </a:rPr>
+              <a:t>Random Forest Model</a:t>
+            </a:r>
+          </a:p>
+        </p:txBody>
+      </p:sp>
+      <p:pic>
+        <p:nvPicPr>
+          <p:cNvPr id="5" name="Picture 4">
+            <a:extLst>
+              <a:ext uri="{FF2B5EF4-FFF2-40B4-BE49-F238E27FC236}">
+                <a16:creationId xmlns:a16="http://schemas.microsoft.com/office/drawing/2014/main" id="{37E506FA-EB80-4D82-99A9-2EB3A392728F}"/>
+              </a:ext>
+            </a:extLst>
+          </p:cNvPr>
+          <p:cNvPicPr>
+            <a:picLocks noChangeAspect="1"/>
+          </p:cNvPicPr>
+          <p:nvPr/>
+        </p:nvPicPr>
+        <p:blipFill>
+          <a:blip r:embed="rId2">
+            <a:extLst>
+              <a:ext uri="{28A0092B-C50C-407E-A947-70E740481C1C}">
+                <a14:useLocalDpi xmlns:a14="http://schemas.microsoft.com/office/drawing/2010/main" val="0"/>
+              </a:ext>
+            </a:extLst>
+          </a:blip>
+          <a:stretch>
+            <a:fillRect/>
+          </a:stretch>
+        </p:blipFill>
+        <p:spPr>
+          <a:xfrm>
+            <a:off x="0" y="1215190"/>
+            <a:ext cx="7137763" cy="3663925"/>
+          </a:xfrm>
+          <a:prstGeom prst="rect">
+            <a:avLst/>
+          </a:prstGeom>
+        </p:spPr>
+      </p:pic>
+      <p:pic>
+        <p:nvPicPr>
+          <p:cNvPr id="7" name="Picture 6">
+            <a:extLst>
+              <a:ext uri="{FF2B5EF4-FFF2-40B4-BE49-F238E27FC236}">
+                <a16:creationId xmlns:a16="http://schemas.microsoft.com/office/drawing/2014/main" id="{D3A36B51-64A7-4635-97A3-CF90A3E3ABF1}"/>
+              </a:ext>
+            </a:extLst>
+          </p:cNvPr>
+          <p:cNvPicPr>
+            <a:picLocks noChangeAspect="1"/>
+          </p:cNvPicPr>
+          <p:nvPr/>
+        </p:nvPicPr>
+        <p:blipFill>
+          <a:blip r:embed="rId3">
+            <a:extLst>
+              <a:ext uri="{28A0092B-C50C-407E-A947-70E740481C1C}">
+                <a14:useLocalDpi xmlns:a14="http://schemas.microsoft.com/office/drawing/2010/main" val="0"/>
+              </a:ext>
+            </a:extLst>
+          </a:blip>
+          <a:stretch>
+            <a:fillRect/>
+          </a:stretch>
+        </p:blipFill>
+        <p:spPr>
+          <a:xfrm>
+            <a:off x="-2" y="4979248"/>
+            <a:ext cx="5509697" cy="1876542"/>
+          </a:xfrm>
+          <a:prstGeom prst="rect">
+            <a:avLst/>
+          </a:prstGeom>
+        </p:spPr>
+      </p:pic>
+      <p:sp>
+        <p:nvSpPr>
+          <p:cNvPr id="9" name="TextBox 8">
+            <a:extLst>
+              <a:ext uri="{FF2B5EF4-FFF2-40B4-BE49-F238E27FC236}">
+                <a16:creationId xmlns:a16="http://schemas.microsoft.com/office/drawing/2014/main" id="{FE13F41A-8AE7-4123-8839-B812EFE1779A}"/>
+              </a:ext>
+            </a:extLst>
+          </p:cNvPr>
+          <p:cNvSpPr txBox="1"/>
+          <p:nvPr/>
+        </p:nvSpPr>
+        <p:spPr>
+          <a:xfrm>
+            <a:off x="6876661" y="5403219"/>
+            <a:ext cx="5169159" cy="923330"/>
+          </a:xfrm>
+          <a:prstGeom prst="rect">
+            <a:avLst/>
+          </a:prstGeom>
+          <a:noFill/>
+        </p:spPr>
+        <p:txBody>
+          <a:bodyPr wrap="square" rtlCol="0">
+            <a:spAutoFit/>
+          </a:bodyPr>
+          <a:lstStyle/>
+          <a:p>
+            <a:pPr marL="285750" indent="-285750">
+              <a:buFont typeface="Arial" panose="020B0604020202020204" pitchFamily="34" charset="0"/>
+              <a:buChar char="•"/>
+            </a:pPr>
+            <a:r>
+              <a:rPr lang="en-US" dirty="0"/>
+              <a:t>0.0 correlates to “Persistent” flag.</a:t>
+            </a:r>
+          </a:p>
+          <a:p>
+            <a:pPr marL="285750" indent="-285750">
+              <a:buFont typeface="Arial" panose="020B0604020202020204" pitchFamily="34" charset="0"/>
+              <a:buChar char="•"/>
+            </a:pPr>
+            <a:r>
+              <a:rPr lang="en-US" dirty="0"/>
+              <a:t>1.0 correlates to “Non-Persistent” flag.</a:t>
+            </a:r>
+          </a:p>
+          <a:p>
+            <a:pPr marL="285750" indent="-285750">
+              <a:buFont typeface="Arial" panose="020B0604020202020204" pitchFamily="34" charset="0"/>
+              <a:buChar char="•"/>
+            </a:pPr>
+            <a:endParaRPr lang="en-US" dirty="0"/>
+          </a:p>
+        </p:txBody>
+      </p:sp>
+    </p:spTree>
+    <p:extLst>
+      <p:ext uri="{BB962C8B-B14F-4D97-AF65-F5344CB8AC3E}">
+        <p14:creationId xmlns:p14="http://schemas.microsoft.com/office/powerpoint/2010/main" val="3715758035"/>
+      </p:ext>
+    </p:extLst>
+  </p:cSld>
+  <p:clrMapOvr>
+    <a:masterClrMapping/>
+  </p:clrMapOvr>
+</p:sld>
+</file>
+
+<file path=ppt/slides/slide5.xml><?xml version="1.0" encoding="utf-8"?>
+<p:sld xmlns:a="http://schemas.openxmlformats.org/drawingml/2006/main" xmlns:r="http://schemas.openxmlformats.org/officeDocument/2006/relationships" xmlns:p="http://schemas.openxmlformats.org/presentationml/2006/main">
+  <p:cSld>
+    <p:spTree>
+      <p:nvGrpSpPr>
+        <p:cNvPr id="1" name=""/>
+        <p:cNvGrpSpPr/>
+        <p:nvPr/>
+      </p:nvGrpSpPr>
+      <p:grpSpPr>
+        <a:xfrm>
+          <a:off x="0" y="0"/>
+          <a:ext cx="0" cy="0"/>
+          <a:chOff x="0" y="0"/>
+          <a:chExt cx="0" cy="0"/>
+        </a:xfrm>
+      </p:grpSpPr>
+      <p:sp>
+        <p:nvSpPr>
+          <p:cNvPr id="3" name="Symbol zastępczy zawartości 2">
+            <a:extLst>
+              <a:ext uri="{FF2B5EF4-FFF2-40B4-BE49-F238E27FC236}">
+                <a16:creationId xmlns:a16="http://schemas.microsoft.com/office/drawing/2014/main" id="{CDC6F948-2F33-47A0-AE55-62E355ACC532}"/>
+              </a:ext>
+            </a:extLst>
+          </p:cNvPr>
+          <p:cNvSpPr>
+            <a:spLocks noGrp="1"/>
+          </p:cNvSpPr>
+          <p:nvPr>
+            <p:ph idx="1"/>
+          </p:nvPr>
+        </p:nvSpPr>
+        <p:spPr>
+          <a:xfrm>
+            <a:off x="838199" y="1769641"/>
+            <a:ext cx="10515600" cy="4351338"/>
+          </a:xfrm>
+        </p:spPr>
+        <p:txBody>
+          <a:bodyPr>
+            <a:normAutofit fontScale="92500" lnSpcReduction="20000"/>
+          </a:bodyPr>
+          <a:lstStyle/>
+          <a:p>
+            <a:pPr algn="just"/>
+            <a:r>
+              <a:rPr lang="en-US" dirty="0">
+                <a:solidFill>
+                  <a:srgbClr val="00B050"/>
+                </a:solidFill>
+              </a:rPr>
+              <a:t>Model Trade-offs:</a:t>
+            </a:r>
+          </a:p>
+          <a:p>
+            <a:pPr lvl="1" algn="just"/>
+            <a:r>
+              <a:rPr lang="en-US" dirty="0">
+                <a:solidFill>
+                  <a:srgbClr val="C00000"/>
+                </a:solidFill>
+              </a:rPr>
+              <a:t>Advantages:</a:t>
+            </a:r>
+          </a:p>
+          <a:p>
+            <a:pPr lvl="2" algn="just"/>
+            <a:r>
+              <a:rPr lang="en-US" dirty="0"/>
+              <a:t>Can successfully handle high dimensional data</a:t>
+            </a:r>
+          </a:p>
+          <a:p>
+            <a:pPr lvl="2" algn="just"/>
+            <a:r>
+              <a:rPr lang="en-US" dirty="0"/>
+              <a:t>Can successfully handle imbalanced classes</a:t>
+            </a:r>
+          </a:p>
+          <a:p>
+            <a:pPr lvl="1" algn="just"/>
+            <a:r>
+              <a:rPr lang="en-US" dirty="0">
+                <a:solidFill>
+                  <a:srgbClr val="C00000"/>
+                </a:solidFill>
+              </a:rPr>
+              <a:t>Disadvantages:</a:t>
+            </a:r>
+          </a:p>
+          <a:p>
+            <a:pPr lvl="2" algn="just"/>
+            <a:r>
+              <a:rPr lang="en-US" dirty="0"/>
+              <a:t>Difficult to diagnose and improve</a:t>
+            </a:r>
+          </a:p>
+          <a:p>
+            <a:pPr lvl="2" algn="just"/>
+            <a:r>
+              <a:rPr lang="en-US" dirty="0"/>
+              <a:t>Quite sensitive to outliers – training on dataset with outliers decreased model accuracy</a:t>
+            </a:r>
+          </a:p>
+          <a:p>
+            <a:pPr lvl="2" algn="just"/>
+            <a:r>
+              <a:rPr lang="en-US" dirty="0"/>
+              <a:t>Not suitable for large datasets since the training time will be higher</a:t>
+            </a:r>
+          </a:p>
+          <a:p>
+            <a:pPr algn="just"/>
+            <a:r>
+              <a:rPr lang="en-US" dirty="0">
+                <a:solidFill>
+                  <a:srgbClr val="00B050"/>
+                </a:solidFill>
+              </a:rPr>
+              <a:t>Results obtained:</a:t>
+            </a:r>
+          </a:p>
+          <a:p>
+            <a:pPr lvl="2" algn="just"/>
+            <a:r>
+              <a:rPr lang="en-US" dirty="0"/>
+              <a:t>Accuracy: 84 %</a:t>
+            </a:r>
+          </a:p>
+          <a:p>
+            <a:pPr marL="914400" lvl="2" indent="0" algn="just">
+              <a:buNone/>
+            </a:pPr>
+            <a:r>
+              <a:rPr lang="en-US" dirty="0"/>
+              <a:t>	Techniques applied for improving  worsened the model performance:</a:t>
+            </a:r>
+          </a:p>
+          <a:p>
+            <a:pPr lvl="7" algn="just">
+              <a:buFont typeface="Wingdings" panose="05000000000000000000" pitchFamily="2" charset="2"/>
+              <a:buChar char="Ø"/>
+            </a:pPr>
+            <a:r>
+              <a:rPr lang="en-US" dirty="0" err="1"/>
+              <a:t>Upsampling</a:t>
+            </a:r>
+            <a:endParaRPr lang="en-US" dirty="0"/>
+          </a:p>
+          <a:p>
+            <a:pPr lvl="7" algn="just">
+              <a:buFont typeface="Wingdings" panose="05000000000000000000" pitchFamily="2" charset="2"/>
+              <a:buChar char="Ø"/>
+            </a:pPr>
+            <a:r>
+              <a:rPr lang="en-US" dirty="0" err="1"/>
+              <a:t>Downsampling</a:t>
+            </a:r>
+            <a:endParaRPr lang="en-US" dirty="0"/>
+          </a:p>
+          <a:p>
+            <a:pPr lvl="7" algn="just">
+              <a:buFont typeface="Wingdings" panose="05000000000000000000" pitchFamily="2" charset="2"/>
+              <a:buChar char="Ø"/>
+            </a:pPr>
+            <a:r>
+              <a:rPr lang="en-US" dirty="0"/>
+              <a:t>PCA dimension reduction</a:t>
+            </a:r>
+          </a:p>
+          <a:p>
+            <a:pPr lvl="2" algn="just"/>
+            <a:endParaRPr lang="en-US" dirty="0"/>
+          </a:p>
+        </p:txBody>
+      </p:sp>
+      <p:sp>
+        <p:nvSpPr>
+          <p:cNvPr id="4" name="Title 1">
+            <a:extLst>
+              <a:ext uri="{FF2B5EF4-FFF2-40B4-BE49-F238E27FC236}">
+                <a16:creationId xmlns:a16="http://schemas.microsoft.com/office/drawing/2014/main" id="{F0FEE1CD-BF08-48FA-8526-5BEB92660675}"/>
+              </a:ext>
+            </a:extLst>
+          </p:cNvPr>
+          <p:cNvSpPr txBox="1">
+            <a:spLocks/>
+          </p:cNvSpPr>
+          <p:nvPr/>
+        </p:nvSpPr>
+        <p:spPr>
+          <a:xfrm rot="5400000">
+            <a:off x="5488404" y="-5488406"/>
+            <a:ext cx="1215190" cy="12192001"/>
+          </a:xfrm>
+          <a:prstGeom prst="rect">
+            <a:avLst/>
+          </a:prstGeom>
+          <a:solidFill>
+            <a:srgbClr val="3B3B3B"/>
+          </a:solidFill>
+        </p:spPr>
+        <p:txBody>
+          <a:bodyPr vert="vert270" lIns="91440" tIns="45720" rIns="91440" bIns="45720" rtlCol="0" anchor="ctr" anchorCtr="0">
+            <a:normAutofit/>
+          </a:bodyPr>
+          <a:lstStyle>
+            <a:lvl1pPr algn="l" defTabSz="914400" rtl="0" eaLnBrk="1" latinLnBrk="0" hangingPunct="1">
+              <a:lnSpc>
+                <a:spcPct val="90000"/>
+              </a:lnSpc>
+              <a:spcBef>
+                <a:spcPct val="0"/>
+              </a:spcBef>
+              <a:buNone/>
+              <a:defRPr sz="4400" kern="1200">
+                <a:solidFill>
+                  <a:schemeClr val="tx1"/>
+                </a:solidFill>
+                <a:latin typeface="+mj-lt"/>
+                <a:ea typeface="+mj-ea"/>
+                <a:cs typeface="+mj-cs"/>
+              </a:defRPr>
+            </a:lvl1pPr>
+          </a:lstStyle>
+          <a:p>
             <a:pPr marL="0" marR="0" lvl="0" indent="0" algn="ctr" defTabSz="914400" rtl="0" eaLnBrk="1" fontAlgn="auto" latinLnBrk="0" hangingPunct="1">
               <a:lnSpc>
                 <a:spcPct val="90000"/>
@@ -6140,7 +6683,7 @@
 </p:sld>
 </file>
 
-<file path=ppt/slides/slide5.xml><?xml version="1.0" encoding="utf-8"?>
+<file path=ppt/slides/slide6.xml><?xml version="1.0" encoding="utf-8"?>
 <p:sld xmlns:a="http://schemas.openxmlformats.org/drawingml/2006/main" xmlns:r="http://schemas.openxmlformats.org/officeDocument/2006/relationships" xmlns:p="http://schemas.openxmlformats.org/presentationml/2006/main">
   <p:cSld>
     <p:spTree>
@@ -6470,7 +7013,7 @@
 </p:sld>
 </file>
 
-<file path=ppt/slides/slide6.xml><?xml version="1.0" encoding="utf-8"?>
+<file path=ppt/slides/slide7.xml><?xml version="1.0" encoding="utf-8"?>
 <p:sld xmlns:a="http://schemas.openxmlformats.org/drawingml/2006/main" xmlns:r="http://schemas.openxmlformats.org/officeDocument/2006/relationships" xmlns:p="http://schemas.openxmlformats.org/presentationml/2006/main">
   <p:cSld>
     <p:spTree>
@@ -6646,7 +7189,7 @@
 </p:sld>
 </file>
 
-<file path=ppt/slides/slide7.xml><?xml version="1.0" encoding="utf-8"?>
+<file path=ppt/slides/slide8.xml><?xml version="1.0" encoding="utf-8"?>
 <p:sld xmlns:a="http://schemas.openxmlformats.org/drawingml/2006/main" xmlns:r="http://schemas.openxmlformats.org/officeDocument/2006/relationships" xmlns:p="http://schemas.openxmlformats.org/presentationml/2006/main">
   <p:cSld>
     <p:spTree>
@@ -7078,7 +7621,7 @@
 </p:sld>
 </file>
 
-<file path=ppt/slides/slide8.xml><?xml version="1.0" encoding="utf-8"?>
+<file path=ppt/slides/slide9.xml><?xml version="1.0" encoding="utf-8"?>
 <p:sld xmlns:a="http://schemas.openxmlformats.org/drawingml/2006/main" xmlns:r="http://schemas.openxmlformats.org/officeDocument/2006/relationships" xmlns:p="http://schemas.openxmlformats.org/presentationml/2006/main">
   <p:cSld>
     <p:spTree>
@@ -7297,328 +7840,6 @@
     <p:extLst>
       <p:ext uri="{BB962C8B-B14F-4D97-AF65-F5344CB8AC3E}">
         <p14:creationId xmlns:p14="http://schemas.microsoft.com/office/powerpoint/2010/main" val="3328903446"/>
-      </p:ext>
-    </p:extLst>
-  </p:cSld>
-  <p:clrMapOvr>
-    <a:masterClrMapping/>
-  </p:clrMapOvr>
-</p:sld>
-</file>
-
-<file path=ppt/slides/slide9.xml><?xml version="1.0" encoding="utf-8"?>
-<p:sld xmlns:a="http://schemas.openxmlformats.org/drawingml/2006/main" xmlns:r="http://schemas.openxmlformats.org/officeDocument/2006/relationships" xmlns:p="http://schemas.openxmlformats.org/presentationml/2006/main">
-  <p:cSld>
-    <p:spTree>
-      <p:nvGrpSpPr>
-        <p:cNvPr id="1" name=""/>
-        <p:cNvGrpSpPr/>
-        <p:nvPr/>
-      </p:nvGrpSpPr>
-      <p:grpSpPr>
-        <a:xfrm>
-          <a:off x="0" y="0"/>
-          <a:ext cx="0" cy="0"/>
-          <a:chOff x="0" y="0"/>
-          <a:chExt cx="0" cy="0"/>
-        </a:xfrm>
-      </p:grpSpPr>
-      <p:sp>
-        <p:nvSpPr>
-          <p:cNvPr id="4" name="Title 1">
-            <a:extLst>
-              <a:ext uri="{FF2B5EF4-FFF2-40B4-BE49-F238E27FC236}">
-                <a16:creationId xmlns:a16="http://schemas.microsoft.com/office/drawing/2014/main" id="{F0FEE1CD-BF08-48FA-8526-5BEB92660675}"/>
-              </a:ext>
-            </a:extLst>
-          </p:cNvPr>
-          <p:cNvSpPr txBox="1">
-            <a:spLocks/>
-          </p:cNvSpPr>
-          <p:nvPr/>
-        </p:nvSpPr>
-        <p:spPr>
-          <a:xfrm rot="5400000">
-            <a:off x="5488405" y="-5488406"/>
-            <a:ext cx="1215190" cy="12192001"/>
-          </a:xfrm>
-          <a:prstGeom prst="rect">
-            <a:avLst/>
-          </a:prstGeom>
-          <a:solidFill>
-            <a:srgbClr val="3B3B3B"/>
-          </a:solidFill>
-        </p:spPr>
-        <p:txBody>
-          <a:bodyPr vert="vert270" lIns="91440" tIns="45720" rIns="91440" bIns="45720" rtlCol="0" anchor="ctr" anchorCtr="0">
-            <a:normAutofit/>
-          </a:bodyPr>
-          <a:lstStyle>
-            <a:lvl1pPr algn="l" defTabSz="914400" rtl="0" eaLnBrk="1" latinLnBrk="0" hangingPunct="1">
-              <a:lnSpc>
-                <a:spcPct val="90000"/>
-              </a:lnSpc>
-              <a:spcBef>
-                <a:spcPct val="0"/>
-              </a:spcBef>
-              <a:buNone/>
-              <a:defRPr sz="4400" kern="1200">
-                <a:solidFill>
-                  <a:schemeClr val="tx1"/>
-                </a:solidFill>
-                <a:latin typeface="+mj-lt"/>
-                <a:ea typeface="+mj-ea"/>
-                <a:cs typeface="+mj-cs"/>
-              </a:defRPr>
-            </a:lvl1pPr>
-          </a:lstStyle>
-          <a:p>
-            <a:pPr marL="0" marR="0" lvl="0" indent="0" algn="ctr" defTabSz="914400" rtl="0" eaLnBrk="1" fontAlgn="auto" latinLnBrk="0" hangingPunct="1">
-              <a:lnSpc>
-                <a:spcPct val="90000"/>
-              </a:lnSpc>
-              <a:spcBef>
-                <a:spcPct val="0"/>
-              </a:spcBef>
-              <a:spcAft>
-                <a:spcPts val="0"/>
-              </a:spcAft>
-              <a:buClrTx/>
-              <a:buSzTx/>
-              <a:buFontTx/>
-              <a:buNone/>
-              <a:tabLst/>
-              <a:defRPr/>
-            </a:pPr>
-            <a:r>
-              <a:rPr kumimoji="0" lang="pl-PL" sz="4400" b="1" i="0" u="none" strike="noStrike" kern="1200" cap="none" spc="0" normalizeH="0" baseline="0" noProof="0" dirty="0" err="1">
-                <a:ln>
-                  <a:noFill/>
-                </a:ln>
-                <a:solidFill>
-                  <a:srgbClr val="FF6600"/>
-                </a:solidFill>
-                <a:effectLst/>
-                <a:uLnTx/>
-                <a:uFillTx/>
-                <a:latin typeface="Calibri Light" panose="020F0302020204030204"/>
-                <a:ea typeface="+mj-ea"/>
-                <a:cs typeface="+mj-cs"/>
-              </a:rPr>
-              <a:t>Logistic</a:t>
-            </a:r>
-            <a:r>
-              <a:rPr kumimoji="0" lang="pl-PL" sz="4400" b="1" i="0" u="none" strike="noStrike" kern="1200" cap="none" spc="0" normalizeH="0" baseline="0" noProof="0" dirty="0">
-                <a:ln>
-                  <a:noFill/>
-                </a:ln>
-                <a:solidFill>
-                  <a:srgbClr val="FF6600"/>
-                </a:solidFill>
-                <a:effectLst/>
-                <a:uLnTx/>
-                <a:uFillTx/>
-                <a:latin typeface="Calibri Light" panose="020F0302020204030204"/>
-                <a:ea typeface="+mj-ea"/>
-                <a:cs typeface="+mj-cs"/>
-              </a:rPr>
-              <a:t> </a:t>
-            </a:r>
-            <a:r>
-              <a:rPr kumimoji="0" lang="pl-PL" sz="4400" b="1" i="0" u="none" strike="noStrike" kern="1200" cap="none" spc="0" normalizeH="0" baseline="0" noProof="0" dirty="0" err="1">
-                <a:ln>
-                  <a:noFill/>
-                </a:ln>
-                <a:solidFill>
-                  <a:srgbClr val="FF6600"/>
-                </a:solidFill>
-                <a:effectLst/>
-                <a:uLnTx/>
-                <a:uFillTx/>
-                <a:latin typeface="Calibri Light" panose="020F0302020204030204"/>
-                <a:ea typeface="+mj-ea"/>
-                <a:cs typeface="+mj-cs"/>
-              </a:rPr>
-              <a:t>Regression</a:t>
-            </a:r>
-            <a:r>
-              <a:rPr kumimoji="0" lang="pl-PL" sz="4400" b="1" i="0" u="none" strike="noStrike" kern="1200" cap="none" spc="0" normalizeH="0" baseline="0" noProof="0" dirty="0">
-                <a:ln>
-                  <a:noFill/>
-                </a:ln>
-                <a:solidFill>
-                  <a:srgbClr val="FF6600"/>
-                </a:solidFill>
-                <a:effectLst/>
-                <a:uLnTx/>
-                <a:uFillTx/>
-                <a:latin typeface="Calibri Light" panose="020F0302020204030204"/>
-                <a:ea typeface="+mj-ea"/>
-                <a:cs typeface="+mj-cs"/>
-              </a:rPr>
-              <a:t> </a:t>
-            </a:r>
-            <a:r>
-              <a:rPr kumimoji="0" lang="en-US" sz="4400" b="1" i="0" u="none" strike="noStrike" kern="1200" cap="none" spc="0" normalizeH="0" baseline="0" noProof="0" dirty="0">
-                <a:ln>
-                  <a:noFill/>
-                </a:ln>
-                <a:solidFill>
-                  <a:srgbClr val="FF6600"/>
-                </a:solidFill>
-                <a:effectLst/>
-                <a:uLnTx/>
-                <a:uFillTx/>
-                <a:latin typeface="Calibri Light" panose="020F0302020204030204"/>
-                <a:ea typeface="+mj-ea"/>
-                <a:cs typeface="+mj-cs"/>
-              </a:rPr>
-              <a:t>Model Results</a:t>
-            </a:r>
-          </a:p>
-        </p:txBody>
-      </p:sp>
-      <p:pic>
-        <p:nvPicPr>
-          <p:cNvPr id="3" name="Obraz 2">
-            <a:extLst>
-              <a:ext uri="{FF2B5EF4-FFF2-40B4-BE49-F238E27FC236}">
-                <a16:creationId xmlns:a16="http://schemas.microsoft.com/office/drawing/2014/main" id="{EE5819C0-DC31-45ED-8BAD-7F483C0C9544}"/>
-              </a:ext>
-            </a:extLst>
-          </p:cNvPr>
-          <p:cNvPicPr>
-            <a:picLocks noChangeAspect="1"/>
-          </p:cNvPicPr>
-          <p:nvPr/>
-        </p:nvPicPr>
-        <p:blipFill>
-          <a:blip r:embed="rId2"/>
-          <a:stretch>
-            <a:fillRect/>
-          </a:stretch>
-        </p:blipFill>
-        <p:spPr>
-          <a:xfrm>
-            <a:off x="1578610" y="2863697"/>
-            <a:ext cx="4029637" cy="1381318"/>
-          </a:xfrm>
-          <a:prstGeom prst="rect">
-            <a:avLst/>
-          </a:prstGeom>
-        </p:spPr>
-      </p:pic>
-      <p:pic>
-        <p:nvPicPr>
-          <p:cNvPr id="6" name="Obraz 5">
-            <a:extLst>
-              <a:ext uri="{FF2B5EF4-FFF2-40B4-BE49-F238E27FC236}">
-                <a16:creationId xmlns:a16="http://schemas.microsoft.com/office/drawing/2014/main" id="{AD89079A-877A-48AF-A317-E74147F52C39}"/>
-              </a:ext>
-            </a:extLst>
-          </p:cNvPr>
-          <p:cNvPicPr>
-            <a:picLocks noChangeAspect="1"/>
-          </p:cNvPicPr>
-          <p:nvPr/>
-        </p:nvPicPr>
-        <p:blipFill>
-          <a:blip r:embed="rId3"/>
-          <a:stretch>
-            <a:fillRect/>
-          </a:stretch>
-        </p:blipFill>
-        <p:spPr>
-          <a:xfrm>
-            <a:off x="2265961" y="5600030"/>
-            <a:ext cx="2619741" cy="390580"/>
-          </a:xfrm>
-          <a:prstGeom prst="rect">
-            <a:avLst/>
-          </a:prstGeom>
-        </p:spPr>
-      </p:pic>
-      <p:pic>
-        <p:nvPicPr>
-          <p:cNvPr id="2050" name="Picture 2">
-            <a:extLst>
-              <a:ext uri="{FF2B5EF4-FFF2-40B4-BE49-F238E27FC236}">
-                <a16:creationId xmlns:a16="http://schemas.microsoft.com/office/drawing/2014/main" id="{DE5DEEC8-78C9-4F82-9BCE-54E75BF5C4B9}"/>
-              </a:ext>
-            </a:extLst>
-          </p:cNvPr>
-          <p:cNvPicPr>
-            <a:picLocks noChangeAspect="1" noChangeArrowheads="1"/>
-          </p:cNvPicPr>
-          <p:nvPr/>
-        </p:nvPicPr>
-        <p:blipFill>
-          <a:blip r:embed="rId4">
-            <a:extLst>
-              <a:ext uri="{28A0092B-C50C-407E-A947-70E740481C1C}">
-                <a14:useLocalDpi xmlns:a14="http://schemas.microsoft.com/office/drawing/2010/main" val="0"/>
-              </a:ext>
-            </a:extLst>
-          </a:blip>
-          <a:srcRect/>
-          <a:stretch>
-            <a:fillRect/>
-          </a:stretch>
-        </p:blipFill>
-        <p:spPr bwMode="auto">
-          <a:xfrm>
-            <a:off x="6847501" y="1711269"/>
-            <a:ext cx="3676650" cy="3686175"/>
-          </a:xfrm>
-          <a:prstGeom prst="rect">
-            <a:avLst/>
-          </a:prstGeom>
-          <a:noFill/>
-          <a:extLst>
-            <a:ext uri="{909E8E84-426E-40DD-AFC4-6F175D3DCCD1}">
-              <a14:hiddenFill xmlns:a14="http://schemas.microsoft.com/office/drawing/2010/main">
-                <a:solidFill>
-                  <a:srgbClr val="FFFFFF"/>
-                </a:solidFill>
-              </a14:hiddenFill>
-            </a:ext>
-          </a:extLst>
-        </p:spPr>
-      </p:pic>
-      <p:pic>
-        <p:nvPicPr>
-          <p:cNvPr id="9" name="Obraz 8">
-            <a:extLst>
-              <a:ext uri="{FF2B5EF4-FFF2-40B4-BE49-F238E27FC236}">
-                <a16:creationId xmlns:a16="http://schemas.microsoft.com/office/drawing/2014/main" id="{BB4D2EE0-ED84-42A1-8B0B-A8896ACC10AB}"/>
-              </a:ext>
-            </a:extLst>
-          </p:cNvPr>
-          <p:cNvPicPr>
-            <a:picLocks noChangeAspect="1"/>
-          </p:cNvPicPr>
-          <p:nvPr/>
-        </p:nvPicPr>
-        <p:blipFill>
-          <a:blip r:embed="rId5"/>
-          <a:stretch>
-            <a:fillRect/>
-          </a:stretch>
-        </p:blipFill>
-        <p:spPr>
-          <a:xfrm>
-            <a:off x="8124445" y="5753072"/>
-            <a:ext cx="1838582" cy="190527"/>
-          </a:xfrm>
-          <a:prstGeom prst="rect">
-            <a:avLst/>
-          </a:prstGeom>
-        </p:spPr>
-      </p:pic>
-    </p:spTree>
-    <p:extLst>
-      <p:ext uri="{BB962C8B-B14F-4D97-AF65-F5344CB8AC3E}">
-        <p14:creationId xmlns:p14="http://schemas.microsoft.com/office/powerpoint/2010/main" val="3527806478"/>
       </p:ext>
     </p:extLst>
   </p:cSld>

</xml_diff>